<commit_message>
Changed some text in the XLPWorkflow PPT
</commit_message>
<xml_diff>
--- a/课程方案/XLP_WorkFLow_CHN.pptx
+++ b/课程方案/XLP_WorkFLow_CHN.pptx
@@ -364,8 +364,8 @@
           <c:showPercent val="0"/>
           <c:showBubbleSize val="0"/>
         </c:dLbls>
-        <c:axId val="-2090108808"/>
-        <c:axId val="-2090105800"/>
+        <c:axId val="-2037216808"/>
+        <c:axId val="-2037301832"/>
       </c:areaChart>
       <c:barChart>
         <c:barDir val="col"/>
@@ -562,11 +562,11 @@
           <c:showBubbleSize val="0"/>
         </c:dLbls>
         <c:gapWidth val="150"/>
-        <c:axId val="-2090099496"/>
-        <c:axId val="-2090102616"/>
+        <c:axId val="-2037295528"/>
+        <c:axId val="-2037298648"/>
       </c:barChart>
       <c:catAx>
-        <c:axId val="-2090108808"/>
+        <c:axId val="-2037216808"/>
         <c:scaling>
           <c:orientation val="minMax"/>
         </c:scaling>
@@ -586,7 +586,7 @@
             <a:endParaRPr lang="en-US"/>
           </a:p>
         </c:txPr>
-        <c:crossAx val="-2090105800"/>
+        <c:crossAx val="-2037301832"/>
         <c:crosses val="autoZero"/>
         <c:auto val="1"/>
         <c:lblAlgn val="ctr"/>
@@ -594,7 +594,7 @@
         <c:noMultiLvlLbl val="0"/>
       </c:catAx>
       <c:valAx>
-        <c:axId val="-2090105800"/>
+        <c:axId val="-2037301832"/>
         <c:scaling>
           <c:orientation val="minMax"/>
         </c:scaling>
@@ -614,12 +614,12 @@
             <a:endParaRPr lang="en-US"/>
           </a:p>
         </c:txPr>
-        <c:crossAx val="-2090108808"/>
+        <c:crossAx val="-2037216808"/>
         <c:crosses val="autoZero"/>
         <c:crossBetween val="between"/>
       </c:valAx>
       <c:valAx>
-        <c:axId val="-2090102616"/>
+        <c:axId val="-2037298648"/>
         <c:scaling>
           <c:orientation val="minMax"/>
         </c:scaling>
@@ -639,12 +639,12 @@
             <a:endParaRPr lang="en-US"/>
           </a:p>
         </c:txPr>
-        <c:crossAx val="-2090099496"/>
+        <c:crossAx val="-2037295528"/>
         <c:crosses val="max"/>
         <c:crossBetween val="between"/>
       </c:valAx>
       <c:catAx>
-        <c:axId val="-2090099496"/>
+        <c:axId val="-2037295528"/>
         <c:scaling>
           <c:orientation val="minMax"/>
         </c:scaling>
@@ -654,7 +654,7 @@
         <c:majorTickMark val="out"/>
         <c:minorTickMark val="none"/>
         <c:tickLblPos val="nextTo"/>
-        <c:crossAx val="-2090102616"/>
+        <c:crossAx val="-2037298648"/>
         <c:crosses val="autoZero"/>
         <c:auto val="1"/>
         <c:lblAlgn val="ctr"/>
@@ -3103,6 +3103,13 @@
         </dgm:presLayoutVars>
       </dgm:prSet>
       <dgm:spPr/>
+      <dgm:t>
+        <a:bodyPr/>
+        <a:lstStyle/>
+        <a:p>
+          <a:endParaRPr lang="en-US"/>
+        </a:p>
+      </dgm:t>
     </dgm:pt>
     <dgm:pt modelId="{351DDE3E-D29A-0B46-B096-75738EF159A6}" type="pres">
       <dgm:prSet presAssocID="{B0B06208-82B1-3845-B39F-89BE7EAFC5BA}" presName="parSpace" presStyleCnt="0"/>
@@ -3115,11 +3122,18 @@
         </dgm:presLayoutVars>
       </dgm:prSet>
       <dgm:spPr/>
+      <dgm:t>
+        <a:bodyPr/>
+        <a:lstStyle/>
+        <a:p>
+          <a:endParaRPr lang="en-US"/>
+        </a:p>
+      </dgm:t>
     </dgm:pt>
   </dgm:ptLst>
   <dgm:cxnLst>
+    <dgm:cxn modelId="{064A51B4-D252-D24D-8D66-2FBC392EA00B}" type="presOf" srcId="{B84EC3F0-D70D-7E4D-B3A6-70158428CCCB}" destId="{C885F437-B21A-FB48-9FAF-8D0D2F3649EB}" srcOrd="0" destOrd="0" presId="urn:microsoft.com/office/officeart/2005/8/layout/hChevron3"/>
     <dgm:cxn modelId="{5DE8386C-20B3-CC43-B6F2-1080AE288166}" srcId="{76DEE7ED-3A10-B949-9EB4-A7A0654C92E7}" destId="{2D6FBD64-17FC-4A4F-9F1B-9D740E6290C5}" srcOrd="1" destOrd="0" parTransId="{D5AFBB3C-C9C7-EE49-884F-19240F9D3AE9}" sibTransId="{B0B06208-82B1-3845-B39F-89BE7EAFC5BA}"/>
-    <dgm:cxn modelId="{064A51B4-D252-D24D-8D66-2FBC392EA00B}" type="presOf" srcId="{B84EC3F0-D70D-7E4D-B3A6-70158428CCCB}" destId="{C885F437-B21A-FB48-9FAF-8D0D2F3649EB}" srcOrd="0" destOrd="0" presId="urn:microsoft.com/office/officeart/2005/8/layout/hChevron3"/>
     <dgm:cxn modelId="{E2C8B914-59D2-5442-A41A-5DE7FF5442A3}" type="presOf" srcId="{76DEE7ED-3A10-B949-9EB4-A7A0654C92E7}" destId="{7933EC29-BA51-794A-B078-22E65B88C17E}" srcOrd="0" destOrd="0" presId="urn:microsoft.com/office/officeart/2005/8/layout/hChevron3"/>
     <dgm:cxn modelId="{9B94AE1F-12C1-1B4A-A410-9056DC402E86}" type="presOf" srcId="{2D6FBD64-17FC-4A4F-9F1B-9D740E6290C5}" destId="{EA1AD719-A19B-294F-9E3D-B7979601EE99}" srcOrd="0" destOrd="0" presId="urn:microsoft.com/office/officeart/2005/8/layout/hChevron3"/>
     <dgm:cxn modelId="{D1A77362-A038-834C-A569-9726FD026527}" srcId="{76DEE7ED-3A10-B949-9EB4-A7A0654C92E7}" destId="{4BEEAB4D-03EF-6F44-9E75-171DCECA5069}" srcOrd="0" destOrd="0" parTransId="{CC34A88C-3CCD-F84E-BEC0-1D1EBF67611E}" sibTransId="{0432BAC6-D4FC-2240-9E34-7CEAC825AFEC}"/>
@@ -3652,11 +3666,7 @@
           </a:r>
           <a:r>
             <a:rPr lang="zh-CN" altLang="en-US" dirty="0" smtClean="0"/>
-            <a:t>日</a:t>
-          </a:r>
-          <a:r>
-            <a:rPr lang="zh-CN" altLang="en-US" dirty="0" smtClean="0"/>
-            <a:t>－</a:t>
+            <a:t>日－</a:t>
           </a:r>
           <a:r>
             <a:rPr lang="en-US" altLang="zh-CN" dirty="0" smtClean="0"/>
@@ -5806,11 +5816,7 @@
           </a:r>
           <a:r>
             <a:rPr lang="zh-CN" altLang="en-US" sz="1600" kern="1200" dirty="0" smtClean="0"/>
-            <a:t>日</a:t>
-          </a:r>
-          <a:r>
-            <a:rPr lang="zh-CN" altLang="en-US" sz="1600" kern="1200" dirty="0" smtClean="0"/>
-            <a:t>－</a:t>
+            <a:t>日－</a:t>
           </a:r>
           <a:r>
             <a:rPr lang="en-US" altLang="zh-CN" sz="1600" kern="1200" dirty="0" smtClean="0"/>
@@ -10296,7 +10302,7 @@
             <a:fld id="{5DCF01CD-BBCB-784E-AF43-2E7C0D198A93}" type="datetimeFigureOut">
               <a:rPr lang="en-US" smtClean="0"/>
               <a:pPr/>
-              <a:t>13-12-24</a:t>
+              <a:t>24/12/13</a:t>
             </a:fld>
             <a:endParaRPr lang="en-US"/>
           </a:p>
@@ -10464,7 +10470,7 @@
             <a:fld id="{7389D1EB-23EB-D046-9CA8-EB2F5A4E7ACB}" type="datetimeFigureOut">
               <a:rPr lang="en-US" smtClean="0"/>
               <a:pPr/>
-              <a:t>13-12-24</a:t>
+              <a:t>24/12/13</a:t>
             </a:fld>
             <a:endParaRPr lang="en-US"/>
           </a:p>
@@ -11100,7 +11106,7 @@
             <a:fld id="{1A1B34FB-08E0-7B49-A4FB-B491A83AAC7A}" type="datetime1">
               <a:rPr lang="en-HK" smtClean="0"/>
               <a:pPr/>
-              <a:t>13-12-24</a:t>
+              <a:t>24/12/13</a:t>
             </a:fld>
             <a:endParaRPr lang="en-US"/>
           </a:p>
@@ -11278,7 +11284,7 @@
             <a:fld id="{2C22D744-8B4C-B041-A7D2-4DF98F9AA572}" type="datetime1">
               <a:rPr lang="en-HK" smtClean="0"/>
               <a:pPr/>
-              <a:t>13-12-24</a:t>
+              <a:t>24/12/13</a:t>
             </a:fld>
             <a:endParaRPr lang="en-US"/>
           </a:p>
@@ -11460,7 +11466,7 @@
             <a:fld id="{27EAC437-70CA-D148-BCF2-DBFFD5ECB045}" type="datetime1">
               <a:rPr lang="en-HK" smtClean="0"/>
               <a:pPr/>
-              <a:t>13-12-24</a:t>
+              <a:t>24/12/13</a:t>
             </a:fld>
             <a:endParaRPr lang="en-US"/>
           </a:p>
@@ -11632,7 +11638,7 @@
             <a:fld id="{31DC336B-EE1D-0541-BD9A-6D7D3B8B9687}" type="datetime1">
               <a:rPr lang="en-HK" smtClean="0"/>
               <a:pPr/>
-              <a:t>13-12-24</a:t>
+              <a:t>24/12/13</a:t>
             </a:fld>
             <a:endParaRPr lang="en-US"/>
           </a:p>
@@ -11910,7 +11916,7 @@
             <a:fld id="{CB8A3765-53CE-674D-AE48-DD5246E73140}" type="datetime1">
               <a:rPr lang="en-HK" smtClean="0"/>
               <a:pPr/>
-              <a:t>13-12-24</a:t>
+              <a:t>24/12/13</a:t>
             </a:fld>
             <a:endParaRPr lang="en-US"/>
           </a:p>
@@ -12200,7 +12206,7 @@
             <a:fld id="{ACA19C97-71A8-0E47-85B2-819AC38C3395}" type="datetime1">
               <a:rPr lang="en-HK" smtClean="0"/>
               <a:pPr/>
-              <a:t>13-12-24</a:t>
+              <a:t>24/12/13</a:t>
             </a:fld>
             <a:endParaRPr lang="en-US"/>
           </a:p>
@@ -12624,7 +12630,7 @@
             <a:fld id="{B5E9F2A7-FED5-F042-9A67-6471A4F9AD82}" type="datetime1">
               <a:rPr lang="en-HK" smtClean="0"/>
               <a:pPr/>
-              <a:t>13-12-24</a:t>
+              <a:t>24/12/13</a:t>
             </a:fld>
             <a:endParaRPr lang="en-US"/>
           </a:p>
@@ -12744,7 +12750,7 @@
             <a:fld id="{E61ABB95-E20D-524C-A6CE-7861E511A8C6}" type="datetime1">
               <a:rPr lang="en-HK" smtClean="0"/>
               <a:pPr/>
-              <a:t>13-12-24</a:t>
+              <a:t>24/12/13</a:t>
             </a:fld>
             <a:endParaRPr lang="en-US"/>
           </a:p>
@@ -12841,7 +12847,7 @@
             <a:fld id="{4379A31E-49B0-3449-918C-B3229090BCFB}" type="datetime1">
               <a:rPr lang="en-HK" smtClean="0"/>
               <a:pPr/>
-              <a:t>13-12-24</a:t>
+              <a:t>24/12/13</a:t>
             </a:fld>
             <a:endParaRPr lang="en-US"/>
           </a:p>
@@ -13120,7 +13126,7 @@
             <a:fld id="{FC69E589-26EE-8749-8089-6F072687BF9B}" type="datetime1">
               <a:rPr lang="en-HK" smtClean="0"/>
               <a:pPr/>
-              <a:t>13-12-24</a:t>
+              <a:t>24/12/13</a:t>
             </a:fld>
             <a:endParaRPr lang="en-US"/>
           </a:p>
@@ -13375,7 +13381,7 @@
             <a:fld id="{0DF88A71-17CA-6347-A4B5-ECB359A47EE8}" type="datetime1">
               <a:rPr lang="en-HK" smtClean="0"/>
               <a:pPr/>
-              <a:t>13-12-24</a:t>
+              <a:t>24/12/13</a:t>
             </a:fld>
             <a:endParaRPr lang="en-US"/>
           </a:p>
@@ -13590,7 +13596,7 @@
             <a:fld id="{F0829251-2DFF-494B-BF2C-1EA8B1A68D0E}" type="datetime1">
               <a:rPr lang="en-HK" smtClean="0"/>
               <a:pPr/>
-              <a:t>13-12-24</a:t>
+              <a:t>24/12/13</a:t>
             </a:fld>
             <a:endParaRPr lang="en-US"/>
           </a:p>
@@ -16194,7 +16200,15 @@
           <a:p>
             <a:r>
               <a:rPr lang="zh-CN" altLang="en-US" dirty="0" smtClean="0"/>
-              <a:t>成为钱学森力学班</a:t>
+              <a:t>已</a:t>
+            </a:r>
+            <a:r>
+              <a:rPr lang="zh-CN" altLang="en-US" dirty="0" smtClean="0"/>
+              <a:t>成为钱学</a:t>
+            </a:r>
+            <a:r>
+              <a:rPr lang="zh-CN" altLang="en-US" dirty="0" smtClean="0"/>
+              <a:t>森力学班</a:t>
             </a:r>
             <a:r>
               <a:rPr lang="en-US" altLang="zh-CN" dirty="0" smtClean="0"/>
@@ -16495,11 +16509,7 @@
           <a:p>
             <a:r>
               <a:rPr lang="zh-CN" altLang="en-US" dirty="0" smtClean="0"/>
-              <a:t>大数据时代的协同工作与经验传承</a:t>
-            </a:r>
-            <a:r>
-              <a:rPr lang="zh-CN" altLang="en-US" dirty="0" smtClean="0"/>
-              <a:t>。</a:t>
+              <a:t>大数据时代的协同工作与经验传承。</a:t>
             </a:r>
             <a:endParaRPr lang="en-US" altLang="zh-CN" dirty="0" smtClean="0"/>
           </a:p>
@@ -17194,23 +17204,7 @@
             <a:pPr marL="0" lvl="1"/>
             <a:r>
               <a:rPr lang="zh-CN" altLang="en-US" dirty="0" smtClean="0"/>
-              <a:t>文</a:t>
-            </a:r>
-            <a:r>
-              <a:rPr lang="zh-CN" altLang="en-US" dirty="0" smtClean="0"/>
-              <a:t>／</a:t>
-            </a:r>
-            <a:r>
-              <a:rPr lang="zh-CN" altLang="en-US" dirty="0" smtClean="0"/>
-              <a:t>法</a:t>
-            </a:r>
-            <a:r>
-              <a:rPr lang="zh-CN" altLang="en-US" dirty="0" smtClean="0"/>
-              <a:t>／</a:t>
-            </a:r>
-            <a:r>
-              <a:rPr lang="zh-CN" altLang="en-US" dirty="0" smtClean="0"/>
-              <a:t>商</a:t>
+              <a:t>文／法／商</a:t>
             </a:r>
             <a:r>
               <a:rPr lang="zh-CN" altLang="en-US" dirty="0"/>
@@ -17218,19 +17212,7 @@
             </a:r>
             <a:r>
               <a:rPr lang="zh-CN" altLang="en-US" dirty="0" smtClean="0"/>
-              <a:t>政治</a:t>
-            </a:r>
-            <a:r>
-              <a:rPr lang="zh-CN" altLang="en-US" dirty="0" smtClean="0"/>
-              <a:t>等</a:t>
-            </a:r>
-            <a:r>
-              <a:rPr lang="zh-CN" altLang="en-US" dirty="0" smtClean="0"/>
-              <a:t>专业</a:t>
-            </a:r>
-            <a:r>
-              <a:rPr lang="zh-CN" altLang="en-US" dirty="0" smtClean="0"/>
-              <a:t>学生</a:t>
+              <a:t>政治等专业学生</a:t>
             </a:r>
             <a:endParaRPr lang="en-US" altLang="zh-CN" dirty="0"/>
           </a:p>
@@ -18613,15 +18595,7 @@
           <a:p>
             <a:r>
               <a:rPr lang="en-US" altLang="zh-CN" dirty="0" smtClean="0"/>
-              <a:t>Creative </a:t>
-            </a:r>
-            <a:r>
-              <a:rPr lang="en-US" altLang="zh-CN" dirty="0" smtClean="0"/>
-              <a:t>Common</a:t>
-            </a:r>
-            <a:r>
-              <a:rPr lang="en-US" altLang="zh-CN" dirty="0" smtClean="0"/>
-              <a:t>s </a:t>
+              <a:t>Creative Commons </a:t>
             </a:r>
             <a:r>
               <a:rPr lang="zh-CN" altLang="en-US" dirty="0" smtClean="0"/>
@@ -19009,19 +18983,7 @@
             <a:pPr lvl="1"/>
             <a:r>
               <a:rPr lang="zh-CN" altLang="en-US" dirty="0" smtClean="0"/>
-              <a:t>由</a:t>
-            </a:r>
-            <a:r>
-              <a:rPr lang="zh-CN" altLang="en-US" dirty="0" smtClean="0"/>
-              <a:t>使用者</a:t>
-            </a:r>
-            <a:r>
-              <a:rPr lang="zh-CN" altLang="en-US" dirty="0" smtClean="0"/>
-              <a:t>（</a:t>
-            </a:r>
-            <a:r>
-              <a:rPr lang="zh-CN" altLang="en-US" dirty="0" smtClean="0"/>
-              <a:t>学生</a:t>
+              <a:t>由使用者（学生</a:t>
             </a:r>
             <a:r>
               <a:rPr lang="zh-CN" altLang="zh-CN" dirty="0"/>
@@ -19029,15 +18991,7 @@
             </a:r>
             <a:r>
               <a:rPr lang="zh-CN" altLang="en-US" dirty="0" smtClean="0"/>
-              <a:t>决</a:t>
-            </a:r>
-            <a:r>
-              <a:rPr lang="zh-CN" altLang="en-US" dirty="0" smtClean="0"/>
-              <a:t>定内容与</a:t>
-            </a:r>
-            <a:r>
-              <a:rPr lang="zh-CN" altLang="en-US" dirty="0" smtClean="0"/>
-              <a:t>格式</a:t>
+              <a:t>决定内容与格式</a:t>
             </a:r>
             <a:endParaRPr lang="en-US" altLang="zh-CN" dirty="0" smtClean="0"/>
           </a:p>

</xml_diff>

<commit_message>
Added one page in XLP2014 Workflow PPT
</commit_message>
<xml_diff>
--- a/课程方案/XLP_WorkFLow_CHN.pptx
+++ b/课程方案/XLP_WorkFLow_CHN.pptx
@@ -5,10 +5,10 @@
     <p:sldMasterId id="2147483672" r:id="rId1"/>
   </p:sldMasterIdLst>
   <p:notesMasterIdLst>
-    <p:notesMasterId r:id="rId17"/>
+    <p:notesMasterId r:id="rId18"/>
   </p:notesMasterIdLst>
   <p:handoutMasterIdLst>
-    <p:handoutMasterId r:id="rId18"/>
+    <p:handoutMasterId r:id="rId19"/>
   </p:handoutMasterIdLst>
   <p:sldIdLst>
     <p:sldId id="256" r:id="rId2"/>
@@ -25,7 +25,8 @@
     <p:sldId id="342" r:id="rId13"/>
     <p:sldId id="318" r:id="rId14"/>
     <p:sldId id="364" r:id="rId15"/>
-    <p:sldId id="365" r:id="rId16"/>
+    <p:sldId id="366" r:id="rId16"/>
+    <p:sldId id="365" r:id="rId17"/>
   </p:sldIdLst>
   <p:sldSz cx="9144000" cy="6858000" type="screen4x3"/>
   <p:notesSz cx="6858000" cy="9144000"/>
@@ -364,8 +365,8 @@
           <c:showPercent val="0"/>
           <c:showBubbleSize val="0"/>
         </c:dLbls>
-        <c:axId val="-2044789464"/>
-        <c:axId val="-2034374488"/>
+        <c:axId val="-2129059304"/>
+        <c:axId val="-2129056296"/>
       </c:areaChart>
       <c:barChart>
         <c:barDir val="col"/>
@@ -562,11 +563,11 @@
           <c:showBubbleSize val="0"/>
         </c:dLbls>
         <c:gapWidth val="150"/>
-        <c:axId val="-2034368184"/>
-        <c:axId val="-2034371304"/>
+        <c:axId val="-2129050808"/>
+        <c:axId val="-2129053112"/>
       </c:barChart>
       <c:catAx>
-        <c:axId val="-2044789464"/>
+        <c:axId val="-2129059304"/>
         <c:scaling>
           <c:orientation val="minMax"/>
         </c:scaling>
@@ -586,7 +587,7 @@
             <a:endParaRPr lang="en-US"/>
           </a:p>
         </c:txPr>
-        <c:crossAx val="-2034374488"/>
+        <c:crossAx val="-2129056296"/>
         <c:crosses val="autoZero"/>
         <c:auto val="1"/>
         <c:lblAlgn val="ctr"/>
@@ -594,7 +595,7 @@
         <c:noMultiLvlLbl val="0"/>
       </c:catAx>
       <c:valAx>
-        <c:axId val="-2034374488"/>
+        <c:axId val="-2129056296"/>
         <c:scaling>
           <c:orientation val="minMax"/>
         </c:scaling>
@@ -614,12 +615,12 @@
             <a:endParaRPr lang="en-US"/>
           </a:p>
         </c:txPr>
-        <c:crossAx val="-2044789464"/>
+        <c:crossAx val="-2129059304"/>
         <c:crosses val="autoZero"/>
         <c:crossBetween val="between"/>
       </c:valAx>
       <c:valAx>
-        <c:axId val="-2034371304"/>
+        <c:axId val="-2129053112"/>
         <c:scaling>
           <c:orientation val="minMax"/>
         </c:scaling>
@@ -639,12 +640,12 @@
             <a:endParaRPr lang="en-US"/>
           </a:p>
         </c:txPr>
-        <c:crossAx val="-2034368184"/>
+        <c:crossAx val="-2129050808"/>
         <c:crosses val="max"/>
         <c:crossBetween val="between"/>
       </c:valAx>
       <c:catAx>
-        <c:axId val="-2034368184"/>
+        <c:axId val="-2129050808"/>
         <c:scaling>
           <c:orientation val="minMax"/>
         </c:scaling>
@@ -654,7 +655,7 @@
         <c:majorTickMark val="out"/>
         <c:minorTickMark val="none"/>
         <c:tickLblPos val="nextTo"/>
-        <c:crossAx val="-2034371304"/>
+        <c:crossAx val="-2129053112"/>
         <c:crosses val="autoZero"/>
         <c:auto val="1"/>
         <c:lblAlgn val="ctr"/>
@@ -2204,6 +2205,753 @@
 </file>
 
 <file path=ppt/diagrams/colors3.xml><?xml version="1.0" encoding="utf-8"?>
+<dgm:colorsDef xmlns:dgm="http://schemas.openxmlformats.org/drawingml/2006/diagram" xmlns:a="http://schemas.openxmlformats.org/drawingml/2006/main" uniqueId="urn:microsoft.com/office/officeart/2005/8/colors/accent1_2">
+  <dgm:title val=""/>
+  <dgm:desc val=""/>
+  <dgm:catLst>
+    <dgm:cat type="accent1" pri="11200"/>
+  </dgm:catLst>
+  <dgm:styleLbl name="node0">
+    <dgm:fillClrLst meth="repeat">
+      <a:schemeClr val="accent1"/>
+    </dgm:fillClrLst>
+    <dgm:linClrLst meth="repeat">
+      <a:schemeClr val="lt1"/>
+    </dgm:linClrLst>
+    <dgm:effectClrLst/>
+    <dgm:txLinClrLst/>
+    <dgm:txFillClrLst/>
+    <dgm:txEffectClrLst/>
+  </dgm:styleLbl>
+  <dgm:styleLbl name="alignNode1">
+    <dgm:fillClrLst meth="repeat">
+      <a:schemeClr val="accent1"/>
+    </dgm:fillClrLst>
+    <dgm:linClrLst meth="repeat">
+      <a:schemeClr val="accent1"/>
+    </dgm:linClrLst>
+    <dgm:effectClrLst/>
+    <dgm:txLinClrLst/>
+    <dgm:txFillClrLst/>
+    <dgm:txEffectClrLst/>
+  </dgm:styleLbl>
+  <dgm:styleLbl name="node1">
+    <dgm:fillClrLst meth="repeat">
+      <a:schemeClr val="accent1"/>
+    </dgm:fillClrLst>
+    <dgm:linClrLst meth="repeat">
+      <a:schemeClr val="lt1"/>
+    </dgm:linClrLst>
+    <dgm:effectClrLst/>
+    <dgm:txLinClrLst/>
+    <dgm:txFillClrLst/>
+    <dgm:txEffectClrLst/>
+  </dgm:styleLbl>
+  <dgm:styleLbl name="lnNode1">
+    <dgm:fillClrLst meth="repeat">
+      <a:schemeClr val="accent1"/>
+    </dgm:fillClrLst>
+    <dgm:linClrLst meth="repeat">
+      <a:schemeClr val="lt1"/>
+    </dgm:linClrLst>
+    <dgm:effectClrLst/>
+    <dgm:txLinClrLst/>
+    <dgm:txFillClrLst/>
+    <dgm:txEffectClrLst/>
+  </dgm:styleLbl>
+  <dgm:styleLbl name="vennNode1">
+    <dgm:fillClrLst meth="repeat">
+      <a:schemeClr val="accent1">
+        <a:alpha val="50000"/>
+      </a:schemeClr>
+    </dgm:fillClrLst>
+    <dgm:linClrLst meth="repeat">
+      <a:schemeClr val="lt1"/>
+    </dgm:linClrLst>
+    <dgm:effectClrLst/>
+    <dgm:txLinClrLst/>
+    <dgm:txFillClrLst/>
+    <dgm:txEffectClrLst/>
+  </dgm:styleLbl>
+  <dgm:styleLbl name="node2">
+    <dgm:fillClrLst meth="repeat">
+      <a:schemeClr val="accent1"/>
+    </dgm:fillClrLst>
+    <dgm:linClrLst meth="repeat">
+      <a:schemeClr val="lt1"/>
+    </dgm:linClrLst>
+    <dgm:effectClrLst/>
+    <dgm:txLinClrLst/>
+    <dgm:txFillClrLst/>
+    <dgm:txEffectClrLst/>
+  </dgm:styleLbl>
+  <dgm:styleLbl name="node3">
+    <dgm:fillClrLst meth="repeat">
+      <a:schemeClr val="accent1"/>
+    </dgm:fillClrLst>
+    <dgm:linClrLst meth="repeat">
+      <a:schemeClr val="lt1"/>
+    </dgm:linClrLst>
+    <dgm:effectClrLst/>
+    <dgm:txLinClrLst/>
+    <dgm:txFillClrLst/>
+    <dgm:txEffectClrLst/>
+  </dgm:styleLbl>
+  <dgm:styleLbl name="node4">
+    <dgm:fillClrLst meth="repeat">
+      <a:schemeClr val="accent1"/>
+    </dgm:fillClrLst>
+    <dgm:linClrLst meth="repeat">
+      <a:schemeClr val="lt1"/>
+    </dgm:linClrLst>
+    <dgm:effectClrLst/>
+    <dgm:txLinClrLst/>
+    <dgm:txFillClrLst/>
+    <dgm:txEffectClrLst/>
+  </dgm:styleLbl>
+  <dgm:styleLbl name="fgImgPlace1">
+    <dgm:fillClrLst meth="repeat">
+      <a:schemeClr val="accent1">
+        <a:tint val="50000"/>
+      </a:schemeClr>
+    </dgm:fillClrLst>
+    <dgm:linClrLst meth="repeat">
+      <a:schemeClr val="lt1"/>
+    </dgm:linClrLst>
+    <dgm:effectClrLst/>
+    <dgm:txLinClrLst/>
+    <dgm:txFillClrLst meth="repeat">
+      <a:schemeClr val="lt1"/>
+    </dgm:txFillClrLst>
+    <dgm:txEffectClrLst/>
+  </dgm:styleLbl>
+  <dgm:styleLbl name="alignImgPlace1">
+    <dgm:fillClrLst meth="repeat">
+      <a:schemeClr val="accent1">
+        <a:tint val="50000"/>
+      </a:schemeClr>
+    </dgm:fillClrLst>
+    <dgm:linClrLst meth="repeat">
+      <a:schemeClr val="lt1"/>
+    </dgm:linClrLst>
+    <dgm:effectClrLst/>
+    <dgm:txLinClrLst/>
+    <dgm:txFillClrLst meth="repeat">
+      <a:schemeClr val="lt1"/>
+    </dgm:txFillClrLst>
+    <dgm:txEffectClrLst/>
+  </dgm:styleLbl>
+  <dgm:styleLbl name="bgImgPlace1">
+    <dgm:fillClrLst meth="repeat">
+      <a:schemeClr val="accent1">
+        <a:tint val="50000"/>
+      </a:schemeClr>
+    </dgm:fillClrLst>
+    <dgm:linClrLst meth="repeat">
+      <a:schemeClr val="lt1"/>
+    </dgm:linClrLst>
+    <dgm:effectClrLst/>
+    <dgm:txLinClrLst/>
+    <dgm:txFillClrLst meth="repeat">
+      <a:schemeClr val="lt1"/>
+    </dgm:txFillClrLst>
+    <dgm:txEffectClrLst/>
+  </dgm:styleLbl>
+  <dgm:styleLbl name="sibTrans2D1">
+    <dgm:fillClrLst meth="repeat">
+      <a:schemeClr val="accent1">
+        <a:tint val="60000"/>
+      </a:schemeClr>
+    </dgm:fillClrLst>
+    <dgm:linClrLst meth="repeat">
+      <a:schemeClr val="accent1">
+        <a:tint val="60000"/>
+      </a:schemeClr>
+    </dgm:linClrLst>
+    <dgm:effectClrLst/>
+    <dgm:txLinClrLst/>
+    <dgm:txFillClrLst/>
+    <dgm:txEffectClrLst/>
+  </dgm:styleLbl>
+  <dgm:styleLbl name="fgSibTrans2D1">
+    <dgm:fillClrLst meth="repeat">
+      <a:schemeClr val="accent1">
+        <a:tint val="60000"/>
+      </a:schemeClr>
+    </dgm:fillClrLst>
+    <dgm:linClrLst meth="repeat">
+      <a:schemeClr val="accent1">
+        <a:tint val="60000"/>
+      </a:schemeClr>
+    </dgm:linClrLst>
+    <dgm:effectClrLst/>
+    <dgm:txLinClrLst/>
+    <dgm:txFillClrLst/>
+    <dgm:txEffectClrLst/>
+  </dgm:styleLbl>
+  <dgm:styleLbl name="bgSibTrans2D1">
+    <dgm:fillClrLst meth="repeat">
+      <a:schemeClr val="accent1">
+        <a:tint val="60000"/>
+      </a:schemeClr>
+    </dgm:fillClrLst>
+    <dgm:linClrLst meth="repeat">
+      <a:schemeClr val="accent1">
+        <a:tint val="60000"/>
+      </a:schemeClr>
+    </dgm:linClrLst>
+    <dgm:effectClrLst/>
+    <dgm:txLinClrLst/>
+    <dgm:txFillClrLst/>
+    <dgm:txEffectClrLst/>
+  </dgm:styleLbl>
+  <dgm:styleLbl name="sibTrans1D1">
+    <dgm:fillClrLst meth="repeat">
+      <a:schemeClr val="accent1"/>
+    </dgm:fillClrLst>
+    <dgm:linClrLst meth="repeat">
+      <a:schemeClr val="accent1"/>
+    </dgm:linClrLst>
+    <dgm:effectClrLst/>
+    <dgm:txLinClrLst/>
+    <dgm:txFillClrLst meth="repeat">
+      <a:schemeClr val="tx1"/>
+    </dgm:txFillClrLst>
+    <dgm:txEffectClrLst/>
+  </dgm:styleLbl>
+  <dgm:styleLbl name="callout">
+    <dgm:fillClrLst meth="repeat">
+      <a:schemeClr val="accent1"/>
+    </dgm:fillClrLst>
+    <dgm:linClrLst meth="repeat">
+      <a:schemeClr val="accent1">
+        <a:tint val="50000"/>
+      </a:schemeClr>
+    </dgm:linClrLst>
+    <dgm:effectClrLst/>
+    <dgm:txLinClrLst/>
+    <dgm:txFillClrLst meth="repeat">
+      <a:schemeClr val="tx1"/>
+    </dgm:txFillClrLst>
+    <dgm:txEffectClrLst/>
+  </dgm:styleLbl>
+  <dgm:styleLbl name="asst0">
+    <dgm:fillClrLst meth="repeat">
+      <a:schemeClr val="accent1"/>
+    </dgm:fillClrLst>
+    <dgm:linClrLst meth="repeat">
+      <a:schemeClr val="lt1"/>
+    </dgm:linClrLst>
+    <dgm:effectClrLst/>
+    <dgm:txLinClrLst/>
+    <dgm:txFillClrLst/>
+    <dgm:txEffectClrLst/>
+  </dgm:styleLbl>
+  <dgm:styleLbl name="asst1">
+    <dgm:fillClrLst meth="repeat">
+      <a:schemeClr val="accent1"/>
+    </dgm:fillClrLst>
+    <dgm:linClrLst meth="repeat">
+      <a:schemeClr val="lt1"/>
+    </dgm:linClrLst>
+    <dgm:effectClrLst/>
+    <dgm:txLinClrLst/>
+    <dgm:txFillClrLst/>
+    <dgm:txEffectClrLst/>
+  </dgm:styleLbl>
+  <dgm:styleLbl name="asst2">
+    <dgm:fillClrLst meth="repeat">
+      <a:schemeClr val="accent1"/>
+    </dgm:fillClrLst>
+    <dgm:linClrLst meth="repeat">
+      <a:schemeClr val="lt1"/>
+    </dgm:linClrLst>
+    <dgm:effectClrLst/>
+    <dgm:txLinClrLst/>
+    <dgm:txFillClrLst/>
+    <dgm:txEffectClrLst/>
+  </dgm:styleLbl>
+  <dgm:styleLbl name="asst3">
+    <dgm:fillClrLst meth="repeat">
+      <a:schemeClr val="accent1"/>
+    </dgm:fillClrLst>
+    <dgm:linClrLst meth="repeat">
+      <a:schemeClr val="lt1"/>
+    </dgm:linClrLst>
+    <dgm:effectClrLst/>
+    <dgm:txLinClrLst/>
+    <dgm:txFillClrLst/>
+    <dgm:txEffectClrLst/>
+  </dgm:styleLbl>
+  <dgm:styleLbl name="asst4">
+    <dgm:fillClrLst meth="repeat">
+      <a:schemeClr val="accent1"/>
+    </dgm:fillClrLst>
+    <dgm:linClrLst meth="repeat">
+      <a:schemeClr val="lt1"/>
+    </dgm:linClrLst>
+    <dgm:effectClrLst/>
+    <dgm:txLinClrLst/>
+    <dgm:txFillClrLst/>
+    <dgm:txEffectClrLst/>
+  </dgm:styleLbl>
+  <dgm:styleLbl name="parChTrans2D1">
+    <dgm:fillClrLst meth="repeat">
+      <a:schemeClr val="accent1">
+        <a:tint val="60000"/>
+      </a:schemeClr>
+    </dgm:fillClrLst>
+    <dgm:linClrLst meth="repeat">
+      <a:schemeClr val="accent1">
+        <a:tint val="60000"/>
+      </a:schemeClr>
+    </dgm:linClrLst>
+    <dgm:effectClrLst/>
+    <dgm:txLinClrLst/>
+    <dgm:txFillClrLst meth="repeat">
+      <a:schemeClr val="lt1"/>
+    </dgm:txFillClrLst>
+    <dgm:txEffectClrLst/>
+  </dgm:styleLbl>
+  <dgm:styleLbl name="parChTrans2D2">
+    <dgm:fillClrLst meth="repeat">
+      <a:schemeClr val="accent1"/>
+    </dgm:fillClrLst>
+    <dgm:linClrLst meth="repeat">
+      <a:schemeClr val="accent1"/>
+    </dgm:linClrLst>
+    <dgm:effectClrLst/>
+    <dgm:txLinClrLst/>
+    <dgm:txFillClrLst meth="repeat">
+      <a:schemeClr val="lt1"/>
+    </dgm:txFillClrLst>
+    <dgm:txEffectClrLst/>
+  </dgm:styleLbl>
+  <dgm:styleLbl name="parChTrans2D3">
+    <dgm:fillClrLst meth="repeat">
+      <a:schemeClr val="accent1"/>
+    </dgm:fillClrLst>
+    <dgm:linClrLst meth="repeat">
+      <a:schemeClr val="accent1"/>
+    </dgm:linClrLst>
+    <dgm:effectClrLst/>
+    <dgm:txLinClrLst/>
+    <dgm:txFillClrLst meth="repeat">
+      <a:schemeClr val="lt1"/>
+    </dgm:txFillClrLst>
+    <dgm:txEffectClrLst/>
+  </dgm:styleLbl>
+  <dgm:styleLbl name="parChTrans2D4">
+    <dgm:fillClrLst meth="repeat">
+      <a:schemeClr val="accent1"/>
+    </dgm:fillClrLst>
+    <dgm:linClrLst meth="repeat">
+      <a:schemeClr val="accent1"/>
+    </dgm:linClrLst>
+    <dgm:effectClrLst/>
+    <dgm:txLinClrLst/>
+    <dgm:txFillClrLst meth="repeat">
+      <a:schemeClr val="lt1"/>
+    </dgm:txFillClrLst>
+    <dgm:txEffectClrLst/>
+  </dgm:styleLbl>
+  <dgm:styleLbl name="parChTrans1D1">
+    <dgm:fillClrLst meth="repeat">
+      <a:schemeClr val="accent1"/>
+    </dgm:fillClrLst>
+    <dgm:linClrLst meth="repeat">
+      <a:schemeClr val="accent1">
+        <a:shade val="60000"/>
+      </a:schemeClr>
+    </dgm:linClrLst>
+    <dgm:effectClrLst/>
+    <dgm:txLinClrLst/>
+    <dgm:txFillClrLst meth="repeat">
+      <a:schemeClr val="tx1"/>
+    </dgm:txFillClrLst>
+    <dgm:txEffectClrLst/>
+  </dgm:styleLbl>
+  <dgm:styleLbl name="parChTrans1D2">
+    <dgm:fillClrLst meth="repeat">
+      <a:schemeClr val="accent1"/>
+    </dgm:fillClrLst>
+    <dgm:linClrLst meth="repeat">
+      <a:schemeClr val="accent1">
+        <a:shade val="60000"/>
+      </a:schemeClr>
+    </dgm:linClrLst>
+    <dgm:effectClrLst/>
+    <dgm:txLinClrLst/>
+    <dgm:txFillClrLst meth="repeat">
+      <a:schemeClr val="tx1"/>
+    </dgm:txFillClrLst>
+    <dgm:txEffectClrLst/>
+  </dgm:styleLbl>
+  <dgm:styleLbl name="parChTrans1D3">
+    <dgm:fillClrLst meth="repeat">
+      <a:schemeClr val="accent1"/>
+    </dgm:fillClrLst>
+    <dgm:linClrLst meth="repeat">
+      <a:schemeClr val="accent1">
+        <a:shade val="80000"/>
+      </a:schemeClr>
+    </dgm:linClrLst>
+    <dgm:effectClrLst/>
+    <dgm:txLinClrLst/>
+    <dgm:txFillClrLst meth="repeat">
+      <a:schemeClr val="tx1"/>
+    </dgm:txFillClrLst>
+    <dgm:txEffectClrLst/>
+  </dgm:styleLbl>
+  <dgm:styleLbl name="parChTrans1D4">
+    <dgm:fillClrLst meth="repeat">
+      <a:schemeClr val="accent1"/>
+    </dgm:fillClrLst>
+    <dgm:linClrLst meth="repeat">
+      <a:schemeClr val="accent1">
+        <a:shade val="80000"/>
+      </a:schemeClr>
+    </dgm:linClrLst>
+    <dgm:effectClrLst/>
+    <dgm:txLinClrLst/>
+    <dgm:txFillClrLst meth="repeat">
+      <a:schemeClr val="tx1"/>
+    </dgm:txFillClrLst>
+    <dgm:txEffectClrLst/>
+  </dgm:styleLbl>
+  <dgm:styleLbl name="fgAcc1">
+    <dgm:fillClrLst meth="repeat">
+      <a:schemeClr val="lt1">
+        <a:alpha val="90000"/>
+      </a:schemeClr>
+    </dgm:fillClrLst>
+    <dgm:linClrLst meth="repeat">
+      <a:schemeClr val="accent1"/>
+    </dgm:linClrLst>
+    <dgm:effectClrLst/>
+    <dgm:txLinClrLst/>
+    <dgm:txFillClrLst meth="repeat">
+      <a:schemeClr val="dk1"/>
+    </dgm:txFillClrLst>
+    <dgm:txEffectClrLst/>
+  </dgm:styleLbl>
+  <dgm:styleLbl name="conFgAcc1">
+    <dgm:fillClrLst meth="repeat">
+      <a:schemeClr val="lt1">
+        <a:alpha val="90000"/>
+      </a:schemeClr>
+    </dgm:fillClrLst>
+    <dgm:linClrLst meth="repeat">
+      <a:schemeClr val="accent1"/>
+    </dgm:linClrLst>
+    <dgm:effectClrLst/>
+    <dgm:txLinClrLst/>
+    <dgm:txFillClrLst meth="repeat">
+      <a:schemeClr val="dk1"/>
+    </dgm:txFillClrLst>
+    <dgm:txEffectClrLst/>
+  </dgm:styleLbl>
+  <dgm:styleLbl name="alignAcc1">
+    <dgm:fillClrLst meth="repeat">
+      <a:schemeClr val="lt1">
+        <a:alpha val="90000"/>
+      </a:schemeClr>
+    </dgm:fillClrLst>
+    <dgm:linClrLst meth="repeat">
+      <a:schemeClr val="accent1"/>
+    </dgm:linClrLst>
+    <dgm:effectClrLst/>
+    <dgm:txLinClrLst/>
+    <dgm:txFillClrLst meth="repeat">
+      <a:schemeClr val="dk1"/>
+    </dgm:txFillClrLst>
+    <dgm:txEffectClrLst/>
+  </dgm:styleLbl>
+  <dgm:styleLbl name="trAlignAcc1">
+    <dgm:fillClrLst meth="repeat">
+      <a:schemeClr val="lt1">
+        <a:alpha val="40000"/>
+      </a:schemeClr>
+    </dgm:fillClrLst>
+    <dgm:linClrLst meth="repeat">
+      <a:schemeClr val="accent1"/>
+    </dgm:linClrLst>
+    <dgm:effectClrLst/>
+    <dgm:txLinClrLst/>
+    <dgm:txFillClrLst meth="repeat">
+      <a:schemeClr val="dk1"/>
+    </dgm:txFillClrLst>
+    <dgm:txEffectClrLst/>
+  </dgm:styleLbl>
+  <dgm:styleLbl name="bgAcc1">
+    <dgm:fillClrLst meth="repeat">
+      <a:schemeClr val="lt1">
+        <a:alpha val="90000"/>
+      </a:schemeClr>
+    </dgm:fillClrLst>
+    <dgm:linClrLst meth="repeat">
+      <a:schemeClr val="accent1"/>
+    </dgm:linClrLst>
+    <dgm:effectClrLst/>
+    <dgm:txLinClrLst/>
+    <dgm:txFillClrLst meth="repeat">
+      <a:schemeClr val="dk1"/>
+    </dgm:txFillClrLst>
+    <dgm:txEffectClrLst/>
+  </dgm:styleLbl>
+  <dgm:styleLbl name="solidFgAcc1">
+    <dgm:fillClrLst meth="repeat">
+      <a:schemeClr val="lt1"/>
+    </dgm:fillClrLst>
+    <dgm:linClrLst meth="repeat">
+      <a:schemeClr val="accent1"/>
+    </dgm:linClrLst>
+    <dgm:effectClrLst/>
+    <dgm:txLinClrLst/>
+    <dgm:txFillClrLst meth="repeat">
+      <a:schemeClr val="dk1"/>
+    </dgm:txFillClrLst>
+    <dgm:txEffectClrLst/>
+  </dgm:styleLbl>
+  <dgm:styleLbl name="solidAlignAcc1">
+    <dgm:fillClrLst meth="repeat">
+      <a:schemeClr val="lt1"/>
+    </dgm:fillClrLst>
+    <dgm:linClrLst meth="repeat">
+      <a:schemeClr val="accent1"/>
+    </dgm:linClrLst>
+    <dgm:effectClrLst/>
+    <dgm:txLinClrLst/>
+    <dgm:txFillClrLst meth="repeat">
+      <a:schemeClr val="dk1"/>
+    </dgm:txFillClrLst>
+    <dgm:txEffectClrLst/>
+  </dgm:styleLbl>
+  <dgm:styleLbl name="solidBgAcc1">
+    <dgm:fillClrLst meth="repeat">
+      <a:schemeClr val="lt1"/>
+    </dgm:fillClrLst>
+    <dgm:linClrLst meth="repeat">
+      <a:schemeClr val="accent1"/>
+    </dgm:linClrLst>
+    <dgm:effectClrLst/>
+    <dgm:txLinClrLst/>
+    <dgm:txFillClrLst meth="repeat">
+      <a:schemeClr val="dk1"/>
+    </dgm:txFillClrLst>
+    <dgm:txEffectClrLst/>
+  </dgm:styleLbl>
+  <dgm:styleLbl name="fgAccFollowNode1">
+    <dgm:fillClrLst meth="repeat">
+      <a:schemeClr val="accent1">
+        <a:alpha val="90000"/>
+        <a:tint val="40000"/>
+      </a:schemeClr>
+    </dgm:fillClrLst>
+    <dgm:linClrLst meth="repeat">
+      <a:schemeClr val="accent1">
+        <a:alpha val="90000"/>
+        <a:tint val="40000"/>
+      </a:schemeClr>
+    </dgm:linClrLst>
+    <dgm:effectClrLst/>
+    <dgm:txLinClrLst/>
+    <dgm:txFillClrLst meth="repeat">
+      <a:schemeClr val="dk1"/>
+    </dgm:txFillClrLst>
+    <dgm:txEffectClrLst/>
+  </dgm:styleLbl>
+  <dgm:styleLbl name="alignAccFollowNode1">
+    <dgm:fillClrLst meth="repeat">
+      <a:schemeClr val="accent1">
+        <a:alpha val="90000"/>
+        <a:tint val="40000"/>
+      </a:schemeClr>
+    </dgm:fillClrLst>
+    <dgm:linClrLst meth="repeat">
+      <a:schemeClr val="accent1">
+        <a:alpha val="90000"/>
+        <a:tint val="40000"/>
+      </a:schemeClr>
+    </dgm:linClrLst>
+    <dgm:effectClrLst/>
+    <dgm:txLinClrLst/>
+    <dgm:txFillClrLst meth="repeat">
+      <a:schemeClr val="dk1"/>
+    </dgm:txFillClrLst>
+    <dgm:txEffectClrLst/>
+  </dgm:styleLbl>
+  <dgm:styleLbl name="bgAccFollowNode1">
+    <dgm:fillClrLst meth="repeat">
+      <a:schemeClr val="accent1">
+        <a:alpha val="90000"/>
+        <a:tint val="40000"/>
+      </a:schemeClr>
+    </dgm:fillClrLst>
+    <dgm:linClrLst meth="repeat">
+      <a:schemeClr val="accent1">
+        <a:alpha val="90000"/>
+        <a:tint val="40000"/>
+      </a:schemeClr>
+    </dgm:linClrLst>
+    <dgm:effectClrLst/>
+    <dgm:txLinClrLst/>
+    <dgm:txFillClrLst meth="repeat">
+      <a:schemeClr val="dk1"/>
+    </dgm:txFillClrLst>
+    <dgm:txEffectClrLst/>
+  </dgm:styleLbl>
+  <dgm:styleLbl name="fgAcc0">
+    <dgm:fillClrLst meth="repeat">
+      <a:schemeClr val="lt1">
+        <a:alpha val="90000"/>
+      </a:schemeClr>
+    </dgm:fillClrLst>
+    <dgm:linClrLst meth="repeat">
+      <a:schemeClr val="accent1"/>
+    </dgm:linClrLst>
+    <dgm:effectClrLst/>
+    <dgm:txLinClrLst/>
+    <dgm:txFillClrLst meth="repeat">
+      <a:schemeClr val="dk1"/>
+    </dgm:txFillClrLst>
+    <dgm:txEffectClrLst/>
+  </dgm:styleLbl>
+  <dgm:styleLbl name="fgAcc2">
+    <dgm:fillClrLst meth="repeat">
+      <a:schemeClr val="lt1">
+        <a:alpha val="90000"/>
+      </a:schemeClr>
+    </dgm:fillClrLst>
+    <dgm:linClrLst meth="repeat">
+      <a:schemeClr val="accent1"/>
+    </dgm:linClrLst>
+    <dgm:effectClrLst/>
+    <dgm:txLinClrLst/>
+    <dgm:txFillClrLst meth="repeat">
+      <a:schemeClr val="dk1"/>
+    </dgm:txFillClrLst>
+    <dgm:txEffectClrLst/>
+  </dgm:styleLbl>
+  <dgm:styleLbl name="fgAcc3">
+    <dgm:fillClrLst meth="repeat">
+      <a:schemeClr val="lt1">
+        <a:alpha val="90000"/>
+      </a:schemeClr>
+    </dgm:fillClrLst>
+    <dgm:linClrLst meth="repeat">
+      <a:schemeClr val="accent1"/>
+    </dgm:linClrLst>
+    <dgm:effectClrLst/>
+    <dgm:txLinClrLst/>
+    <dgm:txFillClrLst meth="repeat">
+      <a:schemeClr val="dk1"/>
+    </dgm:txFillClrLst>
+    <dgm:txEffectClrLst/>
+  </dgm:styleLbl>
+  <dgm:styleLbl name="fgAcc4">
+    <dgm:fillClrLst meth="repeat">
+      <a:schemeClr val="lt1">
+        <a:alpha val="90000"/>
+      </a:schemeClr>
+    </dgm:fillClrLst>
+    <dgm:linClrLst meth="repeat">
+      <a:schemeClr val="accent1"/>
+    </dgm:linClrLst>
+    <dgm:effectClrLst/>
+    <dgm:txLinClrLst/>
+    <dgm:txFillClrLst meth="repeat">
+      <a:schemeClr val="dk1"/>
+    </dgm:txFillClrLst>
+    <dgm:txEffectClrLst/>
+  </dgm:styleLbl>
+  <dgm:styleLbl name="bgShp">
+    <dgm:fillClrLst meth="repeat">
+      <a:schemeClr val="accent1">
+        <a:tint val="40000"/>
+      </a:schemeClr>
+    </dgm:fillClrLst>
+    <dgm:linClrLst meth="repeat">
+      <a:schemeClr val="accent1"/>
+    </dgm:linClrLst>
+    <dgm:effectClrLst/>
+    <dgm:txLinClrLst/>
+    <dgm:txFillClrLst meth="repeat">
+      <a:schemeClr val="dk1"/>
+    </dgm:txFillClrLst>
+    <dgm:txEffectClrLst/>
+  </dgm:styleLbl>
+  <dgm:styleLbl name="dkBgShp">
+    <dgm:fillClrLst meth="repeat">
+      <a:schemeClr val="accent1">
+        <a:shade val="80000"/>
+      </a:schemeClr>
+    </dgm:fillClrLst>
+    <dgm:linClrLst meth="repeat">
+      <a:schemeClr val="accent1"/>
+    </dgm:linClrLst>
+    <dgm:effectClrLst/>
+    <dgm:txLinClrLst/>
+    <dgm:txFillClrLst meth="repeat">
+      <a:schemeClr val="lt1"/>
+    </dgm:txFillClrLst>
+    <dgm:txEffectClrLst/>
+  </dgm:styleLbl>
+  <dgm:styleLbl name="trBgShp">
+    <dgm:fillClrLst meth="repeat">
+      <a:schemeClr val="accent1">
+        <a:tint val="50000"/>
+        <a:alpha val="40000"/>
+      </a:schemeClr>
+    </dgm:fillClrLst>
+    <dgm:linClrLst meth="repeat">
+      <a:schemeClr val="accent1"/>
+    </dgm:linClrLst>
+    <dgm:effectClrLst/>
+    <dgm:txLinClrLst/>
+    <dgm:txFillClrLst meth="repeat">
+      <a:schemeClr val="lt1"/>
+    </dgm:txFillClrLst>
+    <dgm:txEffectClrLst/>
+  </dgm:styleLbl>
+  <dgm:styleLbl name="fgShp">
+    <dgm:fillClrLst meth="repeat">
+      <a:schemeClr val="accent1">
+        <a:tint val="60000"/>
+      </a:schemeClr>
+    </dgm:fillClrLst>
+    <dgm:linClrLst meth="repeat">
+      <a:schemeClr val="lt1"/>
+    </dgm:linClrLst>
+    <dgm:effectClrLst/>
+    <dgm:txLinClrLst/>
+    <dgm:txFillClrLst meth="repeat">
+      <a:schemeClr val="dk1"/>
+    </dgm:txFillClrLst>
+    <dgm:txEffectClrLst/>
+  </dgm:styleLbl>
+  <dgm:styleLbl name="revTx">
+    <dgm:fillClrLst meth="repeat">
+      <a:schemeClr val="lt1">
+        <a:alpha val="0"/>
+      </a:schemeClr>
+    </dgm:fillClrLst>
+    <dgm:linClrLst meth="repeat">
+      <a:schemeClr val="dk1">
+        <a:alpha val="0"/>
+      </a:schemeClr>
+    </dgm:linClrLst>
+    <dgm:effectClrLst/>
+    <dgm:txLinClrLst/>
+    <dgm:txFillClrLst meth="repeat">
+      <a:schemeClr val="tx1"/>
+    </dgm:txFillClrLst>
+    <dgm:txEffectClrLst/>
+  </dgm:styleLbl>
+</dgm:colorsDef>
+</file>
+
+<file path=ppt/diagrams/colors4.xml><?xml version="1.0" encoding="utf-8"?>
 <dgm:colorsDef xmlns:dgm="http://schemas.openxmlformats.org/drawingml/2006/diagram" xmlns:a="http://schemas.openxmlformats.org/drawingml/2006/main" uniqueId="urn:microsoft.com/office/officeart/2005/8/colors/accent1_2">
   <dgm:title val=""/>
   <dgm:desc val=""/>
@@ -4385,6 +5133,301 @@
 </dgm:dataModel>
 </file>
 
+<file path=ppt/diagrams/data4.xml><?xml version="1.0" encoding="utf-8"?>
+<dgm:dataModel xmlns:dgm="http://schemas.openxmlformats.org/drawingml/2006/diagram" xmlns:a="http://schemas.openxmlformats.org/drawingml/2006/main">
+  <dgm:ptLst>
+    <dgm:pt modelId="{B3370BF3-FC00-A84C-86B7-24A4ADA151A3}" type="doc">
+      <dgm:prSet loTypeId="urn:microsoft.com/office/officeart/2008/layout/PictureStrips" loCatId="" qsTypeId="urn:microsoft.com/office/officeart/2005/8/quickstyle/simple4" qsCatId="simple" csTypeId="urn:microsoft.com/office/officeart/2005/8/colors/accent1_2" csCatId="accent1" phldr="1"/>
+      <dgm:spPr/>
+      <dgm:t>
+        <a:bodyPr/>
+        <a:lstStyle/>
+        <a:p>
+          <a:endParaRPr lang="en-US"/>
+        </a:p>
+      </dgm:t>
+    </dgm:pt>
+    <dgm:pt modelId="{677B607E-E9F3-8C47-9CC0-CF39F69458BA}">
+      <dgm:prSet phldrT="[Text]"/>
+      <dgm:spPr/>
+      <dgm:t>
+        <a:bodyPr/>
+        <a:lstStyle/>
+        <a:p>
+          <a:r>
+            <a:rPr lang="zh-CN" altLang="en-US" dirty="0" smtClean="0"/>
+            <a:t>在数字化时代，交叉学科必须要有协同工具</a:t>
+          </a:r>
+          <a:endParaRPr lang="en-US" dirty="0"/>
+        </a:p>
+      </dgm:t>
+    </dgm:pt>
+    <dgm:pt modelId="{A9502F27-3F6B-EC47-9E85-4DB8B8353E23}" type="parTrans" cxnId="{0681E2A7-F178-C24D-85E3-5BA8FFDB81FF}">
+      <dgm:prSet/>
+      <dgm:spPr/>
+      <dgm:t>
+        <a:bodyPr/>
+        <a:lstStyle/>
+        <a:p>
+          <a:endParaRPr lang="en-US"/>
+        </a:p>
+      </dgm:t>
+    </dgm:pt>
+    <dgm:pt modelId="{1E77475C-CE42-0649-941B-63A1BD45BC2D}" type="sibTrans" cxnId="{0681E2A7-F178-C24D-85E3-5BA8FFDB81FF}">
+      <dgm:prSet/>
+      <dgm:spPr/>
+      <dgm:t>
+        <a:bodyPr/>
+        <a:lstStyle/>
+        <a:p>
+          <a:endParaRPr lang="en-US"/>
+        </a:p>
+      </dgm:t>
+    </dgm:pt>
+    <dgm:pt modelId="{AA4299E3-BF02-D641-BD3F-EC4A7C723F0A}">
+      <dgm:prSet phldrT="[Text]"/>
+      <dgm:spPr/>
+      <dgm:t>
+        <a:bodyPr/>
+        <a:lstStyle/>
+        <a:p>
+          <a:r>
+            <a:rPr lang="zh-CN" altLang="en-US" dirty="0" smtClean="0"/>
+            <a:t>学校跨学科的选课机制的柔性与弹性</a:t>
+          </a:r>
+          <a:endParaRPr lang="en-US" dirty="0"/>
+        </a:p>
+      </dgm:t>
+    </dgm:pt>
+    <dgm:pt modelId="{9257672D-8B41-C640-AFA5-AB196D08BF4C}" type="parTrans" cxnId="{5FCBC802-D440-7B43-9DDA-C281C542040B}">
+      <dgm:prSet/>
+      <dgm:spPr/>
+      <dgm:t>
+        <a:bodyPr/>
+        <a:lstStyle/>
+        <a:p>
+          <a:endParaRPr lang="en-US"/>
+        </a:p>
+      </dgm:t>
+    </dgm:pt>
+    <dgm:pt modelId="{7A1703CD-F1B9-DD4C-92FF-A06A4A64A7C2}" type="sibTrans" cxnId="{5FCBC802-D440-7B43-9DDA-C281C542040B}">
+      <dgm:prSet/>
+      <dgm:spPr/>
+      <dgm:t>
+        <a:bodyPr/>
+        <a:lstStyle/>
+        <a:p>
+          <a:endParaRPr lang="en-US"/>
+        </a:p>
+      </dgm:t>
+    </dgm:pt>
+    <dgm:pt modelId="{7360D843-4BA2-C74A-9BF5-00E0383D3551}">
+      <dgm:prSet phldrT="[Text]"/>
+      <dgm:spPr/>
+      <dgm:t>
+        <a:bodyPr/>
+        <a:lstStyle/>
+        <a:p>
+          <a:r>
+            <a:rPr lang="zh-CN" altLang="en-US" dirty="0" smtClean="0"/>
+            <a:t>融合学生的活动来丰富</a:t>
+          </a:r>
+          <a:r>
+            <a:rPr lang="zh-CN" altLang="en-US" smtClean="0"/>
+            <a:t>学校整体的教学活动体验</a:t>
+          </a:r>
+          <a:endParaRPr lang="en-US" dirty="0"/>
+        </a:p>
+      </dgm:t>
+    </dgm:pt>
+    <dgm:pt modelId="{73B19887-45D0-8D45-B6D1-7CCE0EF821D9}" type="parTrans" cxnId="{4EE2C50B-C64E-A04C-97BE-A50DE2212878}">
+      <dgm:prSet/>
+      <dgm:spPr/>
+      <dgm:t>
+        <a:bodyPr/>
+        <a:lstStyle/>
+        <a:p>
+          <a:endParaRPr lang="en-US"/>
+        </a:p>
+      </dgm:t>
+    </dgm:pt>
+    <dgm:pt modelId="{1F2D3B4E-6D6A-6C44-8EAF-86589ACCD1B2}" type="sibTrans" cxnId="{4EE2C50B-C64E-A04C-97BE-A50DE2212878}">
+      <dgm:prSet/>
+      <dgm:spPr/>
+      <dgm:t>
+        <a:bodyPr/>
+        <a:lstStyle/>
+        <a:p>
+          <a:endParaRPr lang="en-US"/>
+        </a:p>
+      </dgm:t>
+    </dgm:pt>
+    <dgm:pt modelId="{4D5496F4-0C58-B942-943F-99D00C8C43D6}" type="pres">
+      <dgm:prSet presAssocID="{B3370BF3-FC00-A84C-86B7-24A4ADA151A3}" presName="Name0" presStyleCnt="0">
+        <dgm:presLayoutVars>
+          <dgm:dir/>
+          <dgm:resizeHandles val="exact"/>
+        </dgm:presLayoutVars>
+      </dgm:prSet>
+      <dgm:spPr/>
+      <dgm:t>
+        <a:bodyPr/>
+        <a:lstStyle/>
+        <a:p>
+          <a:endParaRPr lang="en-US"/>
+        </a:p>
+      </dgm:t>
+    </dgm:pt>
+    <dgm:pt modelId="{1C46792C-712A-6747-9291-7D88B81D649B}" type="pres">
+      <dgm:prSet presAssocID="{677B607E-E9F3-8C47-9CC0-CF39F69458BA}" presName="composite" presStyleCnt="0"/>
+      <dgm:spPr/>
+    </dgm:pt>
+    <dgm:pt modelId="{13E6BFD9-2ED0-644A-B08F-E7D8FD6C097F}" type="pres">
+      <dgm:prSet presAssocID="{677B607E-E9F3-8C47-9CC0-CF39F69458BA}" presName="rect1" presStyleLbl="trAlignAcc1" presStyleIdx="0" presStyleCnt="3">
+        <dgm:presLayoutVars>
+          <dgm:bulletEnabled val="1"/>
+        </dgm:presLayoutVars>
+      </dgm:prSet>
+      <dgm:spPr/>
+      <dgm:t>
+        <a:bodyPr/>
+        <a:lstStyle/>
+        <a:p>
+          <a:endParaRPr lang="en-US"/>
+        </a:p>
+      </dgm:t>
+    </dgm:pt>
+    <dgm:pt modelId="{A101EC3C-ED13-F14D-ADDC-C641677F8319}" type="pres">
+      <dgm:prSet presAssocID="{677B607E-E9F3-8C47-9CC0-CF39F69458BA}" presName="rect2" presStyleLbl="fgImgPlace1" presStyleIdx="0" presStyleCnt="3" custScaleX="39982" custScaleY="42592" custLinFactNeighborY="1789"/>
+      <dgm:spPr>
+        <a:blipFill>
+          <a:blip xmlns:r="http://schemas.openxmlformats.org/officeDocument/2006/relationships" r:embed="rId1">
+            <a:extLst>
+              <a:ext uri="{28A0092B-C50C-407E-A947-70E740481C1C}">
+                <a14:useLocalDpi xmlns:a14="http://schemas.microsoft.com/office/drawing/2010/main" val="0"/>
+              </a:ext>
+            </a:extLst>
+          </a:blip>
+          <a:srcRect/>
+          <a:stretch>
+            <a:fillRect l="-25000" r="-25000"/>
+          </a:stretch>
+        </a:blipFill>
+      </dgm:spPr>
+    </dgm:pt>
+    <dgm:pt modelId="{2753C6E6-C90B-6E46-BF31-83CF89D82F45}" type="pres">
+      <dgm:prSet presAssocID="{1E77475C-CE42-0649-941B-63A1BD45BC2D}" presName="sibTrans" presStyleCnt="0"/>
+      <dgm:spPr/>
+    </dgm:pt>
+    <dgm:pt modelId="{D791AC8C-E309-014D-AF7C-E05F2B9B7EC7}" type="pres">
+      <dgm:prSet presAssocID="{AA4299E3-BF02-D641-BD3F-EC4A7C723F0A}" presName="composite" presStyleCnt="0"/>
+      <dgm:spPr/>
+    </dgm:pt>
+    <dgm:pt modelId="{5A8EA483-76A7-7E4B-9258-85C8294DF13B}" type="pres">
+      <dgm:prSet presAssocID="{AA4299E3-BF02-D641-BD3F-EC4A7C723F0A}" presName="rect1" presStyleLbl="trAlignAcc1" presStyleIdx="1" presStyleCnt="3">
+        <dgm:presLayoutVars>
+          <dgm:bulletEnabled val="1"/>
+        </dgm:presLayoutVars>
+      </dgm:prSet>
+      <dgm:spPr/>
+      <dgm:t>
+        <a:bodyPr/>
+        <a:lstStyle/>
+        <a:p>
+          <a:endParaRPr lang="en-US"/>
+        </a:p>
+      </dgm:t>
+    </dgm:pt>
+    <dgm:pt modelId="{C5DEA8DE-AD3F-4F44-8692-CCFE07B537E3}" type="pres">
+      <dgm:prSet presAssocID="{AA4299E3-BF02-D641-BD3F-EC4A7C723F0A}" presName="rect2" presStyleLbl="fgImgPlace1" presStyleIdx="1" presStyleCnt="3" custScaleX="36260" custScaleY="37891"/>
+      <dgm:spPr>
+        <a:blipFill>
+          <a:blip xmlns:r="http://schemas.openxmlformats.org/officeDocument/2006/relationships" r:embed="rId2">
+            <a:extLst>
+              <a:ext uri="{28A0092B-C50C-407E-A947-70E740481C1C}">
+                <a14:useLocalDpi xmlns:a14="http://schemas.microsoft.com/office/drawing/2010/main" val="0"/>
+              </a:ext>
+            </a:extLst>
+          </a:blip>
+          <a:srcRect/>
+          <a:stretch>
+            <a:fillRect l="-25000" r="-25000"/>
+          </a:stretch>
+        </a:blipFill>
+      </dgm:spPr>
+    </dgm:pt>
+    <dgm:pt modelId="{DC993076-720E-E04C-B131-ED78047565CD}" type="pres">
+      <dgm:prSet presAssocID="{7A1703CD-F1B9-DD4C-92FF-A06A4A64A7C2}" presName="sibTrans" presStyleCnt="0"/>
+      <dgm:spPr/>
+    </dgm:pt>
+    <dgm:pt modelId="{22CFED6A-2536-BC43-BA8A-FE5072917A40}" type="pres">
+      <dgm:prSet presAssocID="{7360D843-4BA2-C74A-9BF5-00E0383D3551}" presName="composite" presStyleCnt="0"/>
+      <dgm:spPr/>
+    </dgm:pt>
+    <dgm:pt modelId="{529092B6-7633-C844-A519-E9542DCEDC2A}" type="pres">
+      <dgm:prSet presAssocID="{7360D843-4BA2-C74A-9BF5-00E0383D3551}" presName="rect1" presStyleLbl="trAlignAcc1" presStyleIdx="2" presStyleCnt="3">
+        <dgm:presLayoutVars>
+          <dgm:bulletEnabled val="1"/>
+        </dgm:presLayoutVars>
+      </dgm:prSet>
+      <dgm:spPr/>
+      <dgm:t>
+        <a:bodyPr/>
+        <a:lstStyle/>
+        <a:p>
+          <a:endParaRPr lang="en-US"/>
+        </a:p>
+      </dgm:t>
+    </dgm:pt>
+    <dgm:pt modelId="{16C6B715-6933-5F4F-836B-0FF525A37E30}" type="pres">
+      <dgm:prSet presAssocID="{7360D843-4BA2-C74A-9BF5-00E0383D3551}" presName="rect2" presStyleLbl="fgImgPlace1" presStyleIdx="2" presStyleCnt="3" custScaleX="41628" custScaleY="34384"/>
+      <dgm:spPr>
+        <a:blipFill>
+          <a:blip xmlns:r="http://schemas.openxmlformats.org/officeDocument/2006/relationships" r:embed="rId3">
+            <a:extLst>
+              <a:ext uri="{28A0092B-C50C-407E-A947-70E740481C1C}">
+                <a14:useLocalDpi xmlns:a14="http://schemas.microsoft.com/office/drawing/2010/main" val="0"/>
+              </a:ext>
+            </a:extLst>
+          </a:blip>
+          <a:srcRect/>
+          <a:stretch>
+            <a:fillRect l="-25000" r="-25000"/>
+          </a:stretch>
+        </a:blipFill>
+      </dgm:spPr>
+    </dgm:pt>
+  </dgm:ptLst>
+  <dgm:cxnLst>
+    <dgm:cxn modelId="{4EE2C50B-C64E-A04C-97BE-A50DE2212878}" srcId="{B3370BF3-FC00-A84C-86B7-24A4ADA151A3}" destId="{7360D843-4BA2-C74A-9BF5-00E0383D3551}" srcOrd="2" destOrd="0" parTransId="{73B19887-45D0-8D45-B6D1-7CCE0EF821D9}" sibTransId="{1F2D3B4E-6D6A-6C44-8EAF-86589ACCD1B2}"/>
+    <dgm:cxn modelId="{5FCBC802-D440-7B43-9DDA-C281C542040B}" srcId="{B3370BF3-FC00-A84C-86B7-24A4ADA151A3}" destId="{AA4299E3-BF02-D641-BD3F-EC4A7C723F0A}" srcOrd="1" destOrd="0" parTransId="{9257672D-8B41-C640-AFA5-AB196D08BF4C}" sibTransId="{7A1703CD-F1B9-DD4C-92FF-A06A4A64A7C2}"/>
+    <dgm:cxn modelId="{0681E2A7-F178-C24D-85E3-5BA8FFDB81FF}" srcId="{B3370BF3-FC00-A84C-86B7-24A4ADA151A3}" destId="{677B607E-E9F3-8C47-9CC0-CF39F69458BA}" srcOrd="0" destOrd="0" parTransId="{A9502F27-3F6B-EC47-9E85-4DB8B8353E23}" sibTransId="{1E77475C-CE42-0649-941B-63A1BD45BC2D}"/>
+    <dgm:cxn modelId="{550B5E50-4F8A-324B-9FE1-A4FA36ACF622}" type="presOf" srcId="{AA4299E3-BF02-D641-BD3F-EC4A7C723F0A}" destId="{5A8EA483-76A7-7E4B-9258-85C8294DF13B}" srcOrd="0" destOrd="0" presId="urn:microsoft.com/office/officeart/2008/layout/PictureStrips"/>
+    <dgm:cxn modelId="{838EA1A5-A057-0D47-B4B8-A5FBC8639C9A}" type="presOf" srcId="{677B607E-E9F3-8C47-9CC0-CF39F69458BA}" destId="{13E6BFD9-2ED0-644A-B08F-E7D8FD6C097F}" srcOrd="0" destOrd="0" presId="urn:microsoft.com/office/officeart/2008/layout/PictureStrips"/>
+    <dgm:cxn modelId="{B3D857E9-0888-AE43-A052-D78F01DB9C2F}" type="presOf" srcId="{B3370BF3-FC00-A84C-86B7-24A4ADA151A3}" destId="{4D5496F4-0C58-B942-943F-99D00C8C43D6}" srcOrd="0" destOrd="0" presId="urn:microsoft.com/office/officeart/2008/layout/PictureStrips"/>
+    <dgm:cxn modelId="{D21C2D66-26E0-7545-AB1C-04299B7A1899}" type="presOf" srcId="{7360D843-4BA2-C74A-9BF5-00E0383D3551}" destId="{529092B6-7633-C844-A519-E9542DCEDC2A}" srcOrd="0" destOrd="0" presId="urn:microsoft.com/office/officeart/2008/layout/PictureStrips"/>
+    <dgm:cxn modelId="{350042ED-D0F7-DA4B-AD20-0B27348AE551}" type="presParOf" srcId="{4D5496F4-0C58-B942-943F-99D00C8C43D6}" destId="{1C46792C-712A-6747-9291-7D88B81D649B}" srcOrd="0" destOrd="0" presId="urn:microsoft.com/office/officeart/2008/layout/PictureStrips"/>
+    <dgm:cxn modelId="{E965ABDA-4919-CD4C-AB58-DC29FC13EB9B}" type="presParOf" srcId="{1C46792C-712A-6747-9291-7D88B81D649B}" destId="{13E6BFD9-2ED0-644A-B08F-E7D8FD6C097F}" srcOrd="0" destOrd="0" presId="urn:microsoft.com/office/officeart/2008/layout/PictureStrips"/>
+    <dgm:cxn modelId="{A5D79315-46A5-6843-8EEE-4950171C1CBB}" type="presParOf" srcId="{1C46792C-712A-6747-9291-7D88B81D649B}" destId="{A101EC3C-ED13-F14D-ADDC-C641677F8319}" srcOrd="1" destOrd="0" presId="urn:microsoft.com/office/officeart/2008/layout/PictureStrips"/>
+    <dgm:cxn modelId="{663CF8FB-2E92-C546-8C41-415F83129461}" type="presParOf" srcId="{4D5496F4-0C58-B942-943F-99D00C8C43D6}" destId="{2753C6E6-C90B-6E46-BF31-83CF89D82F45}" srcOrd="1" destOrd="0" presId="urn:microsoft.com/office/officeart/2008/layout/PictureStrips"/>
+    <dgm:cxn modelId="{3DB69B1D-649E-6F45-9807-A0753850C297}" type="presParOf" srcId="{4D5496F4-0C58-B942-943F-99D00C8C43D6}" destId="{D791AC8C-E309-014D-AF7C-E05F2B9B7EC7}" srcOrd="2" destOrd="0" presId="urn:microsoft.com/office/officeart/2008/layout/PictureStrips"/>
+    <dgm:cxn modelId="{F188AED4-3D83-394E-9E06-CEB2630DAA04}" type="presParOf" srcId="{D791AC8C-E309-014D-AF7C-E05F2B9B7EC7}" destId="{5A8EA483-76A7-7E4B-9258-85C8294DF13B}" srcOrd="0" destOrd="0" presId="urn:microsoft.com/office/officeart/2008/layout/PictureStrips"/>
+    <dgm:cxn modelId="{E595E6E8-1C50-9C46-8D73-E4BAB6D3A9D2}" type="presParOf" srcId="{D791AC8C-E309-014D-AF7C-E05F2B9B7EC7}" destId="{C5DEA8DE-AD3F-4F44-8692-CCFE07B537E3}" srcOrd="1" destOrd="0" presId="urn:microsoft.com/office/officeart/2008/layout/PictureStrips"/>
+    <dgm:cxn modelId="{1D2C3014-CD5A-7F41-BC9E-2BFDEAFB35D9}" type="presParOf" srcId="{4D5496F4-0C58-B942-943F-99D00C8C43D6}" destId="{DC993076-720E-E04C-B131-ED78047565CD}" srcOrd="3" destOrd="0" presId="urn:microsoft.com/office/officeart/2008/layout/PictureStrips"/>
+    <dgm:cxn modelId="{C69F8353-CD60-544F-9ADC-4E7B6EA36F84}" type="presParOf" srcId="{4D5496F4-0C58-B942-943F-99D00C8C43D6}" destId="{22CFED6A-2536-BC43-BA8A-FE5072917A40}" srcOrd="4" destOrd="0" presId="urn:microsoft.com/office/officeart/2008/layout/PictureStrips"/>
+    <dgm:cxn modelId="{514D8A0B-0D80-734C-B510-6288C009EEC5}" type="presParOf" srcId="{22CFED6A-2536-BC43-BA8A-FE5072917A40}" destId="{529092B6-7633-C844-A519-E9542DCEDC2A}" srcOrd="0" destOrd="0" presId="urn:microsoft.com/office/officeart/2008/layout/PictureStrips"/>
+    <dgm:cxn modelId="{B204875B-9B99-EC48-AF28-092B502C03B8}" type="presParOf" srcId="{22CFED6A-2536-BC43-BA8A-FE5072917A40}" destId="{16C6B715-6933-5F4F-836B-0FF525A37E30}" srcOrd="1" destOrd="0" presId="urn:microsoft.com/office/officeart/2008/layout/PictureStrips"/>
+  </dgm:cxnLst>
+  <dgm:bg/>
+  <dgm:whole/>
+  <dgm:extLst>
+    <a:ext uri="http://schemas.microsoft.com/office/drawing/2008/diagram">
+      <dsp:dataModelExt xmlns:dsp="http://schemas.microsoft.com/office/drawing/2008/diagram" relId="rId6" minVer="http://schemas.openxmlformats.org/drawingml/2006/diagram"/>
+    </a:ext>
+  </dgm:extLst>
+</dgm:dataModel>
+</file>
+
 <file path=ppt/diagrams/drawing1.xml><?xml version="1.0" encoding="utf-8"?>
 <dsp:drawing xmlns:dgm="http://schemas.openxmlformats.org/drawingml/2006/diagram" xmlns:dsp="http://schemas.microsoft.com/office/drawing/2008/diagram" xmlns:a="http://schemas.openxmlformats.org/drawingml/2006/main">
   <dsp:spTree>
@@ -4393,6 +5436,237 @@
       <dsp:cNvGrpSpPr/>
     </dsp:nvGrpSpPr>
     <dsp:grpSpPr/>
+    <dsp:sp modelId="{F25CC7FC-8664-0146-BF09-A9D33B20B4E4}">
+      <dsp:nvSpPr>
+        <dsp:cNvPr id="0" name=""/>
+        <dsp:cNvSpPr/>
+      </dsp:nvSpPr>
+      <dsp:spPr>
+        <a:xfrm>
+          <a:off x="2678" y="0"/>
+          <a:ext cx="2342554" cy="764153"/>
+        </a:xfrm>
+        <a:prstGeom prst="homePlate">
+          <a:avLst/>
+        </a:prstGeom>
+        <a:solidFill>
+          <a:schemeClr val="accent1">
+            <a:hueOff val="0"/>
+            <a:satOff val="0"/>
+            <a:lumOff val="0"/>
+            <a:alphaOff val="0"/>
+          </a:schemeClr>
+        </a:solidFill>
+        <a:ln w="25400" cap="flat" cmpd="sng" algn="ctr">
+          <a:solidFill>
+            <a:schemeClr val="lt1">
+              <a:hueOff val="0"/>
+              <a:satOff val="0"/>
+              <a:lumOff val="0"/>
+              <a:alphaOff val="0"/>
+            </a:schemeClr>
+          </a:solidFill>
+          <a:prstDash val="solid"/>
+        </a:ln>
+        <a:effectLst/>
+      </dsp:spPr>
+      <dsp:style>
+        <a:lnRef idx="2">
+          <a:scrgbClr r="0" g="0" b="0"/>
+        </a:lnRef>
+        <a:fillRef idx="1">
+          <a:scrgbClr r="0" g="0" b="0"/>
+        </a:fillRef>
+        <a:effectRef idx="0">
+          <a:scrgbClr r="0" g="0" b="0"/>
+        </a:effectRef>
+        <a:fontRef idx="minor">
+          <a:schemeClr val="lt1"/>
+        </a:fontRef>
+      </dsp:style>
+      <dsp:txBody>
+        <a:bodyPr spcFirstLastPara="0" vert="horz" wrap="square" lIns="85344" tIns="42672" rIns="21336" bIns="42672" numCol="1" spcCol="1270" anchor="ctr" anchorCtr="0">
+          <a:noAutofit/>
+        </a:bodyPr>
+        <a:lstStyle/>
+        <a:p>
+          <a:pPr lvl="0" algn="ctr" defTabSz="711200">
+            <a:lnSpc>
+              <a:spcPct val="90000"/>
+            </a:lnSpc>
+            <a:spcBef>
+              <a:spcPct val="0"/>
+            </a:spcBef>
+            <a:spcAft>
+              <a:spcPct val="35000"/>
+            </a:spcAft>
+          </a:pPr>
+          <a:r>
+            <a:rPr lang="zh-CN" altLang="en-US" sz="1600" kern="1200" dirty="0" smtClean="0"/>
+            <a:t>挑战方准备</a:t>
+          </a:r>
+          <a:endParaRPr lang="en-US" sz="1600" kern="1200" dirty="0"/>
+        </a:p>
+      </dsp:txBody>
+      <dsp:txXfrm>
+        <a:off x="2678" y="0"/>
+        <a:ext cx="2151516" cy="764153"/>
+      </dsp:txXfrm>
+    </dsp:sp>
+    <dsp:sp modelId="{EA1AD719-A19B-294F-9E3D-B7979601EE99}">
+      <dsp:nvSpPr>
+        <dsp:cNvPr id="0" name=""/>
+        <dsp:cNvSpPr/>
+      </dsp:nvSpPr>
+      <dsp:spPr>
+        <a:xfrm>
+          <a:off x="1876722" y="0"/>
+          <a:ext cx="2342554" cy="764153"/>
+        </a:xfrm>
+        <a:prstGeom prst="chevron">
+          <a:avLst/>
+        </a:prstGeom>
+        <a:solidFill>
+          <a:schemeClr val="accent1">
+            <a:hueOff val="0"/>
+            <a:satOff val="0"/>
+            <a:lumOff val="0"/>
+            <a:alphaOff val="0"/>
+          </a:schemeClr>
+        </a:solidFill>
+        <a:ln w="25400" cap="flat" cmpd="sng" algn="ctr">
+          <a:solidFill>
+            <a:schemeClr val="lt1">
+              <a:hueOff val="0"/>
+              <a:satOff val="0"/>
+              <a:lumOff val="0"/>
+              <a:alphaOff val="0"/>
+            </a:schemeClr>
+          </a:solidFill>
+          <a:prstDash val="solid"/>
+        </a:ln>
+        <a:effectLst/>
+      </dsp:spPr>
+      <dsp:style>
+        <a:lnRef idx="2">
+          <a:scrgbClr r="0" g="0" b="0"/>
+        </a:lnRef>
+        <a:fillRef idx="1">
+          <a:scrgbClr r="0" g="0" b="0"/>
+        </a:fillRef>
+        <a:effectRef idx="0">
+          <a:scrgbClr r="0" g="0" b="0"/>
+        </a:effectRef>
+        <a:fontRef idx="minor">
+          <a:schemeClr val="lt1"/>
+        </a:fontRef>
+      </dsp:style>
+      <dsp:txBody>
+        <a:bodyPr spcFirstLastPara="0" vert="horz" wrap="square" lIns="64008" tIns="42672" rIns="21336" bIns="42672" numCol="1" spcCol="1270" anchor="ctr" anchorCtr="0">
+          <a:noAutofit/>
+        </a:bodyPr>
+        <a:lstStyle/>
+        <a:p>
+          <a:pPr lvl="0" algn="ctr" defTabSz="711200">
+            <a:lnSpc>
+              <a:spcPct val="90000"/>
+            </a:lnSpc>
+            <a:spcBef>
+              <a:spcPct val="0"/>
+            </a:spcBef>
+            <a:spcAft>
+              <a:spcPct val="35000"/>
+            </a:spcAft>
+          </a:pPr>
+          <a:r>
+            <a:rPr lang="zh-CN" altLang="en-US" sz="1600" kern="1200" dirty="0" smtClean="0"/>
+            <a:t>任务执行阶段</a:t>
+          </a:r>
+          <a:endParaRPr lang="en-US" sz="1600" kern="1200" dirty="0"/>
+        </a:p>
+      </dsp:txBody>
+      <dsp:txXfrm>
+        <a:off x="2258799" y="0"/>
+        <a:ext cx="1578401" cy="764153"/>
+      </dsp:txXfrm>
+    </dsp:sp>
+    <dsp:sp modelId="{C885F437-B21A-FB48-9FAF-8D0D2F3649EB}">
+      <dsp:nvSpPr>
+        <dsp:cNvPr id="0" name=""/>
+        <dsp:cNvSpPr/>
+      </dsp:nvSpPr>
+      <dsp:spPr>
+        <a:xfrm>
+          <a:off x="3750766" y="0"/>
+          <a:ext cx="2342554" cy="764153"/>
+        </a:xfrm>
+        <a:prstGeom prst="chevron">
+          <a:avLst/>
+        </a:prstGeom>
+        <a:solidFill>
+          <a:schemeClr val="accent1">
+            <a:hueOff val="0"/>
+            <a:satOff val="0"/>
+            <a:lumOff val="0"/>
+            <a:alphaOff val="0"/>
+          </a:schemeClr>
+        </a:solidFill>
+        <a:ln w="25400" cap="flat" cmpd="sng" algn="ctr">
+          <a:solidFill>
+            <a:schemeClr val="lt1">
+              <a:hueOff val="0"/>
+              <a:satOff val="0"/>
+              <a:lumOff val="0"/>
+              <a:alphaOff val="0"/>
+            </a:schemeClr>
+          </a:solidFill>
+          <a:prstDash val="solid"/>
+        </a:ln>
+        <a:effectLst/>
+      </dsp:spPr>
+      <dsp:style>
+        <a:lnRef idx="2">
+          <a:scrgbClr r="0" g="0" b="0"/>
+        </a:lnRef>
+        <a:fillRef idx="1">
+          <a:scrgbClr r="0" g="0" b="0"/>
+        </a:fillRef>
+        <a:effectRef idx="0">
+          <a:scrgbClr r="0" g="0" b="0"/>
+        </a:effectRef>
+        <a:fontRef idx="minor">
+          <a:schemeClr val="lt1"/>
+        </a:fontRef>
+      </dsp:style>
+      <dsp:txBody>
+        <a:bodyPr spcFirstLastPara="0" vert="horz" wrap="square" lIns="64008" tIns="42672" rIns="21336" bIns="42672" numCol="1" spcCol="1270" anchor="ctr" anchorCtr="0">
+          <a:noAutofit/>
+        </a:bodyPr>
+        <a:lstStyle/>
+        <a:p>
+          <a:pPr lvl="0" algn="ctr" defTabSz="711200">
+            <a:lnSpc>
+              <a:spcPct val="90000"/>
+            </a:lnSpc>
+            <a:spcBef>
+              <a:spcPct val="0"/>
+            </a:spcBef>
+            <a:spcAft>
+              <a:spcPct val="35000"/>
+            </a:spcAft>
+          </a:pPr>
+          <a:r>
+            <a:rPr lang="zh-CN" altLang="en-US" sz="1600" kern="1200" dirty="0" smtClean="0"/>
+            <a:t>挑战方回顾总结</a:t>
+          </a:r>
+          <a:endParaRPr lang="en-US" sz="1600" kern="1200" dirty="0"/>
+        </a:p>
+      </dsp:txBody>
+      <dsp:txXfrm>
+        <a:off x="4132843" y="0"/>
+        <a:ext cx="1578401" cy="764153"/>
+      </dsp:txXfrm>
+    </dsp:sp>
   </dsp:spTree>
 </dsp:drawing>
 </file>
@@ -4405,6 +5679,625 @@
       <dsp:cNvGrpSpPr/>
     </dsp:nvGrpSpPr>
     <dsp:grpSpPr/>
+    <dsp:sp modelId="{4D3628C9-84B1-0D4F-89B7-680D7002C678}">
+      <dsp:nvSpPr>
+        <dsp:cNvPr id="0" name=""/>
+        <dsp:cNvSpPr/>
+      </dsp:nvSpPr>
+      <dsp:spPr>
+        <a:xfrm>
+          <a:off x="3273070" y="1113334"/>
+          <a:ext cx="934996" cy="934996"/>
+        </a:xfrm>
+        <a:prstGeom prst="ellipse">
+          <a:avLst/>
+        </a:prstGeom>
+        <a:gradFill rotWithShape="0">
+          <a:gsLst>
+            <a:gs pos="0">
+              <a:schemeClr val="accent1">
+                <a:hueOff val="0"/>
+                <a:satOff val="0"/>
+                <a:lumOff val="0"/>
+                <a:alphaOff val="0"/>
+                <a:tint val="100000"/>
+                <a:shade val="100000"/>
+                <a:satMod val="130000"/>
+              </a:schemeClr>
+            </a:gs>
+            <a:gs pos="100000">
+              <a:schemeClr val="accent1">
+                <a:hueOff val="0"/>
+                <a:satOff val="0"/>
+                <a:lumOff val="0"/>
+                <a:alphaOff val="0"/>
+                <a:tint val="50000"/>
+                <a:shade val="100000"/>
+                <a:satMod val="350000"/>
+              </a:schemeClr>
+            </a:gs>
+          </a:gsLst>
+          <a:lin ang="16200000" scaled="0"/>
+        </a:gradFill>
+        <a:ln>
+          <a:noFill/>
+        </a:ln>
+        <a:effectLst>
+          <a:outerShdw blurRad="40000" dist="23000" dir="5400000" rotWithShape="0">
+            <a:srgbClr val="000000">
+              <a:alpha val="35000"/>
+            </a:srgbClr>
+          </a:outerShdw>
+        </a:effectLst>
+      </dsp:spPr>
+      <dsp:style>
+        <a:lnRef idx="0">
+          <a:scrgbClr r="0" g="0" b="0"/>
+        </a:lnRef>
+        <a:fillRef idx="3">
+          <a:scrgbClr r="0" g="0" b="0"/>
+        </a:fillRef>
+        <a:effectRef idx="2">
+          <a:scrgbClr r="0" g="0" b="0"/>
+        </a:effectRef>
+        <a:fontRef idx="minor">
+          <a:schemeClr val="lt1"/>
+        </a:fontRef>
+      </dsp:style>
+      <dsp:txBody>
+        <a:bodyPr spcFirstLastPara="0" vert="horz" wrap="square" lIns="15240" tIns="15240" rIns="15240" bIns="15240" numCol="1" spcCol="1270" anchor="ctr" anchorCtr="0">
+          <a:noAutofit/>
+        </a:bodyPr>
+        <a:lstStyle/>
+        <a:p>
+          <a:pPr lvl="0" algn="ctr" defTabSz="1066800">
+            <a:lnSpc>
+              <a:spcPct val="90000"/>
+            </a:lnSpc>
+            <a:spcBef>
+              <a:spcPct val="0"/>
+            </a:spcBef>
+            <a:spcAft>
+              <a:spcPct val="35000"/>
+            </a:spcAft>
+          </a:pPr>
+          <a:r>
+            <a:rPr lang="zh-CN" altLang="en-US" sz="2400" kern="1200" dirty="0" smtClean="0"/>
+            <a:t>主题</a:t>
+          </a:r>
+          <a:endParaRPr lang="en-US" sz="2400" kern="1200" dirty="0"/>
+        </a:p>
+      </dsp:txBody>
+      <dsp:txXfrm>
+        <a:off x="3409997" y="1250261"/>
+        <a:ext cx="661142" cy="661142"/>
+      </dsp:txXfrm>
+    </dsp:sp>
+    <dsp:sp modelId="{798C3725-AAFD-6E4D-B82F-51F9BDDFC6FF}">
+      <dsp:nvSpPr>
+        <dsp:cNvPr id="0" name=""/>
+        <dsp:cNvSpPr/>
+      </dsp:nvSpPr>
+      <dsp:spPr>
+        <a:xfrm rot="12900000">
+          <a:off x="2671934" y="950109"/>
+          <a:ext cx="716303" cy="266473"/>
+        </a:xfrm>
+        <a:prstGeom prst="leftArrow">
+          <a:avLst>
+            <a:gd name="adj1" fmla="val 60000"/>
+            <a:gd name="adj2" fmla="val 50000"/>
+          </a:avLst>
+        </a:prstGeom>
+        <a:gradFill rotWithShape="0">
+          <a:gsLst>
+            <a:gs pos="0">
+              <a:schemeClr val="accent1">
+                <a:tint val="60000"/>
+                <a:hueOff val="0"/>
+                <a:satOff val="0"/>
+                <a:lumOff val="0"/>
+                <a:alphaOff val="0"/>
+                <a:tint val="100000"/>
+                <a:shade val="100000"/>
+                <a:satMod val="130000"/>
+              </a:schemeClr>
+            </a:gs>
+            <a:gs pos="100000">
+              <a:schemeClr val="accent1">
+                <a:tint val="60000"/>
+                <a:hueOff val="0"/>
+                <a:satOff val="0"/>
+                <a:lumOff val="0"/>
+                <a:alphaOff val="0"/>
+                <a:tint val="50000"/>
+                <a:shade val="100000"/>
+                <a:satMod val="350000"/>
+              </a:schemeClr>
+            </a:gs>
+          </a:gsLst>
+          <a:lin ang="16200000" scaled="0"/>
+        </a:gradFill>
+        <a:ln>
+          <a:noFill/>
+        </a:ln>
+        <a:effectLst>
+          <a:outerShdw blurRad="40000" dist="23000" dir="5400000" rotWithShape="0">
+            <a:srgbClr val="000000">
+              <a:alpha val="35000"/>
+            </a:srgbClr>
+          </a:outerShdw>
+        </a:effectLst>
+      </dsp:spPr>
+      <dsp:style>
+        <a:lnRef idx="0">
+          <a:scrgbClr r="0" g="0" b="0"/>
+        </a:lnRef>
+        <a:fillRef idx="3">
+          <a:scrgbClr r="0" g="0" b="0"/>
+        </a:fillRef>
+        <a:effectRef idx="2">
+          <a:scrgbClr r="0" g="0" b="0"/>
+        </a:effectRef>
+        <a:fontRef idx="minor">
+          <a:schemeClr val="lt1"/>
+        </a:fontRef>
+      </dsp:style>
+    </dsp:sp>
+    <dsp:sp modelId="{DC14D4DF-DCA9-0144-9EAF-B36DE6274F76}">
+      <dsp:nvSpPr>
+        <dsp:cNvPr id="0" name=""/>
+        <dsp:cNvSpPr/>
+      </dsp:nvSpPr>
+      <dsp:spPr>
+        <a:xfrm>
+          <a:off x="2292582" y="522620"/>
+          <a:ext cx="888246" cy="710597"/>
+        </a:xfrm>
+        <a:prstGeom prst="roundRect">
+          <a:avLst>
+            <a:gd name="adj" fmla="val 10000"/>
+          </a:avLst>
+        </a:prstGeom>
+        <a:gradFill rotWithShape="0">
+          <a:gsLst>
+            <a:gs pos="0">
+              <a:schemeClr val="accent1">
+                <a:hueOff val="0"/>
+                <a:satOff val="0"/>
+                <a:lumOff val="0"/>
+                <a:alphaOff val="0"/>
+                <a:tint val="100000"/>
+                <a:shade val="100000"/>
+                <a:satMod val="130000"/>
+              </a:schemeClr>
+            </a:gs>
+            <a:gs pos="100000">
+              <a:schemeClr val="accent1">
+                <a:hueOff val="0"/>
+                <a:satOff val="0"/>
+                <a:lumOff val="0"/>
+                <a:alphaOff val="0"/>
+                <a:tint val="50000"/>
+                <a:shade val="100000"/>
+                <a:satMod val="350000"/>
+              </a:schemeClr>
+            </a:gs>
+          </a:gsLst>
+          <a:lin ang="16200000" scaled="0"/>
+        </a:gradFill>
+        <a:ln>
+          <a:noFill/>
+        </a:ln>
+        <a:effectLst>
+          <a:outerShdw blurRad="40000" dist="23000" dir="5400000" rotWithShape="0">
+            <a:srgbClr val="000000">
+              <a:alpha val="35000"/>
+            </a:srgbClr>
+          </a:outerShdw>
+        </a:effectLst>
+      </dsp:spPr>
+      <dsp:style>
+        <a:lnRef idx="0">
+          <a:scrgbClr r="0" g="0" b="0"/>
+        </a:lnRef>
+        <a:fillRef idx="3">
+          <a:scrgbClr r="0" g="0" b="0"/>
+        </a:fillRef>
+        <a:effectRef idx="2">
+          <a:scrgbClr r="0" g="0" b="0"/>
+        </a:effectRef>
+        <a:fontRef idx="minor">
+          <a:schemeClr val="lt1"/>
+        </a:fontRef>
+      </dsp:style>
+      <dsp:txBody>
+        <a:bodyPr spcFirstLastPara="0" vert="horz" wrap="square" lIns="34290" tIns="34290" rIns="34290" bIns="34290" numCol="1" spcCol="1270" anchor="ctr" anchorCtr="0">
+          <a:noAutofit/>
+        </a:bodyPr>
+        <a:lstStyle/>
+        <a:p>
+          <a:pPr lvl="0" algn="ctr" defTabSz="800100">
+            <a:lnSpc>
+              <a:spcPct val="90000"/>
+            </a:lnSpc>
+            <a:spcBef>
+              <a:spcPct val="0"/>
+            </a:spcBef>
+            <a:spcAft>
+              <a:spcPct val="35000"/>
+            </a:spcAft>
+          </a:pPr>
+          <a:r>
+            <a:rPr lang="zh-CN" altLang="en-US" sz="1800" kern="1200" dirty="0" smtClean="0"/>
+            <a:t>挑战方</a:t>
+          </a:r>
+          <a:r>
+            <a:rPr lang="en-US" altLang="zh-CN" sz="1800" kern="1200" dirty="0" smtClean="0"/>
+            <a:t>(30</a:t>
+          </a:r>
+          <a:r>
+            <a:rPr lang="zh-CN" altLang="en-US" sz="1800" kern="1200" dirty="0" smtClean="0"/>
+            <a:t>人</a:t>
+          </a:r>
+          <a:r>
+            <a:rPr lang="en-US" altLang="zh-CN" sz="1800" kern="1200" dirty="0" smtClean="0"/>
+            <a:t>)</a:t>
+          </a:r>
+          <a:endParaRPr lang="en-US" sz="1800" kern="1200" dirty="0"/>
+        </a:p>
+      </dsp:txBody>
+      <dsp:txXfrm>
+        <a:off x="2313395" y="543433"/>
+        <a:ext cx="846620" cy="668971"/>
+      </dsp:txXfrm>
+    </dsp:sp>
+    <dsp:sp modelId="{3C3A0490-3C74-B346-8362-880B5C7F171D}">
+      <dsp:nvSpPr>
+        <dsp:cNvPr id="0" name=""/>
+        <dsp:cNvSpPr/>
+      </dsp:nvSpPr>
+      <dsp:spPr>
+        <a:xfrm rot="16200000">
+          <a:off x="3382417" y="580255"/>
+          <a:ext cx="716303" cy="266473"/>
+        </a:xfrm>
+        <a:prstGeom prst="leftArrow">
+          <a:avLst>
+            <a:gd name="adj1" fmla="val 60000"/>
+            <a:gd name="adj2" fmla="val 50000"/>
+          </a:avLst>
+        </a:prstGeom>
+        <a:gradFill rotWithShape="0">
+          <a:gsLst>
+            <a:gs pos="0">
+              <a:schemeClr val="accent1">
+                <a:tint val="60000"/>
+                <a:hueOff val="0"/>
+                <a:satOff val="0"/>
+                <a:lumOff val="0"/>
+                <a:alphaOff val="0"/>
+                <a:tint val="100000"/>
+                <a:shade val="100000"/>
+                <a:satMod val="130000"/>
+              </a:schemeClr>
+            </a:gs>
+            <a:gs pos="100000">
+              <a:schemeClr val="accent1">
+                <a:tint val="60000"/>
+                <a:hueOff val="0"/>
+                <a:satOff val="0"/>
+                <a:lumOff val="0"/>
+                <a:alphaOff val="0"/>
+                <a:tint val="50000"/>
+                <a:shade val="100000"/>
+                <a:satMod val="350000"/>
+              </a:schemeClr>
+            </a:gs>
+          </a:gsLst>
+          <a:lin ang="16200000" scaled="0"/>
+        </a:gradFill>
+        <a:ln>
+          <a:noFill/>
+        </a:ln>
+        <a:effectLst>
+          <a:outerShdw blurRad="40000" dist="23000" dir="5400000" rotWithShape="0">
+            <a:srgbClr val="000000">
+              <a:alpha val="35000"/>
+            </a:srgbClr>
+          </a:outerShdw>
+        </a:effectLst>
+      </dsp:spPr>
+      <dsp:style>
+        <a:lnRef idx="0">
+          <a:scrgbClr r="0" g="0" b="0"/>
+        </a:lnRef>
+        <a:fillRef idx="3">
+          <a:scrgbClr r="0" g="0" b="0"/>
+        </a:fillRef>
+        <a:effectRef idx="2">
+          <a:scrgbClr r="0" g="0" b="0"/>
+        </a:effectRef>
+        <a:fontRef idx="minor">
+          <a:schemeClr val="lt1"/>
+        </a:fontRef>
+      </dsp:style>
+    </dsp:sp>
+    <dsp:sp modelId="{283B5824-BB08-FB4B-8E7F-FDA15FD96F64}">
+      <dsp:nvSpPr>
+        <dsp:cNvPr id="0" name=""/>
+        <dsp:cNvSpPr/>
+      </dsp:nvSpPr>
+      <dsp:spPr>
+        <a:xfrm>
+          <a:off x="3296445" y="42"/>
+          <a:ext cx="888246" cy="710597"/>
+        </a:xfrm>
+        <a:prstGeom prst="roundRect">
+          <a:avLst>
+            <a:gd name="adj" fmla="val 10000"/>
+          </a:avLst>
+        </a:prstGeom>
+        <a:gradFill rotWithShape="0">
+          <a:gsLst>
+            <a:gs pos="0">
+              <a:schemeClr val="accent1">
+                <a:hueOff val="0"/>
+                <a:satOff val="0"/>
+                <a:lumOff val="0"/>
+                <a:alphaOff val="0"/>
+                <a:tint val="100000"/>
+                <a:shade val="100000"/>
+                <a:satMod val="130000"/>
+              </a:schemeClr>
+            </a:gs>
+            <a:gs pos="100000">
+              <a:schemeClr val="accent1">
+                <a:hueOff val="0"/>
+                <a:satOff val="0"/>
+                <a:lumOff val="0"/>
+                <a:alphaOff val="0"/>
+                <a:tint val="50000"/>
+                <a:shade val="100000"/>
+                <a:satMod val="350000"/>
+              </a:schemeClr>
+            </a:gs>
+          </a:gsLst>
+          <a:lin ang="16200000" scaled="0"/>
+        </a:gradFill>
+        <a:ln>
+          <a:noFill/>
+        </a:ln>
+        <a:effectLst>
+          <a:outerShdw blurRad="40000" dist="23000" dir="5400000" rotWithShape="0">
+            <a:srgbClr val="000000">
+              <a:alpha val="35000"/>
+            </a:srgbClr>
+          </a:outerShdw>
+        </a:effectLst>
+      </dsp:spPr>
+      <dsp:style>
+        <a:lnRef idx="0">
+          <a:scrgbClr r="0" g="0" b="0"/>
+        </a:lnRef>
+        <a:fillRef idx="3">
+          <a:scrgbClr r="0" g="0" b="0"/>
+        </a:fillRef>
+        <a:effectRef idx="2">
+          <a:scrgbClr r="0" g="0" b="0"/>
+        </a:effectRef>
+        <a:fontRef idx="minor">
+          <a:schemeClr val="lt1"/>
+        </a:fontRef>
+      </dsp:style>
+      <dsp:txBody>
+        <a:bodyPr spcFirstLastPara="0" vert="horz" wrap="square" lIns="34290" tIns="34290" rIns="34290" bIns="34290" numCol="1" spcCol="1270" anchor="ctr" anchorCtr="0">
+          <a:noAutofit/>
+        </a:bodyPr>
+        <a:lstStyle/>
+        <a:p>
+          <a:pPr lvl="0" algn="ctr" defTabSz="800100">
+            <a:lnSpc>
+              <a:spcPct val="90000"/>
+            </a:lnSpc>
+            <a:spcBef>
+              <a:spcPct val="0"/>
+            </a:spcBef>
+            <a:spcAft>
+              <a:spcPct val="35000"/>
+            </a:spcAft>
+          </a:pPr>
+          <a:r>
+            <a:rPr lang="zh-CN" altLang="en-US" sz="1800" kern="1200" dirty="0" smtClean="0"/>
+            <a:t>任务方</a:t>
+          </a:r>
+          <a:r>
+            <a:rPr lang="en-US" altLang="zh-CN" sz="1800" kern="1200" dirty="0" smtClean="0"/>
+            <a:t>(30</a:t>
+          </a:r>
+          <a:r>
+            <a:rPr lang="zh-CN" altLang="en-US" sz="1800" kern="1200" dirty="0" smtClean="0"/>
+            <a:t>人</a:t>
+          </a:r>
+          <a:r>
+            <a:rPr lang="en-US" altLang="zh-CN" sz="1800" kern="1200" dirty="0" smtClean="0"/>
+            <a:t>)</a:t>
+          </a:r>
+          <a:endParaRPr lang="en-US" sz="1800" kern="1200" dirty="0"/>
+        </a:p>
+      </dsp:txBody>
+      <dsp:txXfrm>
+        <a:off x="3317258" y="20855"/>
+        <a:ext cx="846620" cy="668971"/>
+      </dsp:txXfrm>
+    </dsp:sp>
+    <dsp:sp modelId="{3FB1EE94-AB27-DB41-B0F6-0B07CEE659DD}">
+      <dsp:nvSpPr>
+        <dsp:cNvPr id="0" name=""/>
+        <dsp:cNvSpPr/>
+      </dsp:nvSpPr>
+      <dsp:spPr>
+        <a:xfrm rot="19500000">
+          <a:off x="4092900" y="950109"/>
+          <a:ext cx="716303" cy="266473"/>
+        </a:xfrm>
+        <a:prstGeom prst="leftArrow">
+          <a:avLst>
+            <a:gd name="adj1" fmla="val 60000"/>
+            <a:gd name="adj2" fmla="val 50000"/>
+          </a:avLst>
+        </a:prstGeom>
+        <a:gradFill rotWithShape="0">
+          <a:gsLst>
+            <a:gs pos="0">
+              <a:schemeClr val="accent1">
+                <a:tint val="60000"/>
+                <a:hueOff val="0"/>
+                <a:satOff val="0"/>
+                <a:lumOff val="0"/>
+                <a:alphaOff val="0"/>
+                <a:tint val="100000"/>
+                <a:shade val="100000"/>
+                <a:satMod val="130000"/>
+              </a:schemeClr>
+            </a:gs>
+            <a:gs pos="100000">
+              <a:schemeClr val="accent1">
+                <a:tint val="60000"/>
+                <a:hueOff val="0"/>
+                <a:satOff val="0"/>
+                <a:lumOff val="0"/>
+                <a:alphaOff val="0"/>
+                <a:tint val="50000"/>
+                <a:shade val="100000"/>
+                <a:satMod val="350000"/>
+              </a:schemeClr>
+            </a:gs>
+          </a:gsLst>
+          <a:lin ang="16200000" scaled="0"/>
+        </a:gradFill>
+        <a:ln>
+          <a:noFill/>
+        </a:ln>
+        <a:effectLst>
+          <a:outerShdw blurRad="40000" dist="23000" dir="5400000" rotWithShape="0">
+            <a:srgbClr val="000000">
+              <a:alpha val="35000"/>
+            </a:srgbClr>
+          </a:outerShdw>
+        </a:effectLst>
+      </dsp:spPr>
+      <dsp:style>
+        <a:lnRef idx="0">
+          <a:scrgbClr r="0" g="0" b="0"/>
+        </a:lnRef>
+        <a:fillRef idx="3">
+          <a:scrgbClr r="0" g="0" b="0"/>
+        </a:fillRef>
+        <a:effectRef idx="2">
+          <a:scrgbClr r="0" g="0" b="0"/>
+        </a:effectRef>
+        <a:fontRef idx="minor">
+          <a:schemeClr val="lt1"/>
+        </a:fontRef>
+      </dsp:style>
+    </dsp:sp>
+    <dsp:sp modelId="{904C1902-1EEE-DC4A-A8D6-34E1EDE1A9D4}">
+      <dsp:nvSpPr>
+        <dsp:cNvPr id="0" name=""/>
+        <dsp:cNvSpPr/>
+      </dsp:nvSpPr>
+      <dsp:spPr>
+        <a:xfrm>
+          <a:off x="4300309" y="522620"/>
+          <a:ext cx="888246" cy="710597"/>
+        </a:xfrm>
+        <a:prstGeom prst="roundRect">
+          <a:avLst>
+            <a:gd name="adj" fmla="val 10000"/>
+          </a:avLst>
+        </a:prstGeom>
+        <a:gradFill rotWithShape="0">
+          <a:gsLst>
+            <a:gs pos="0">
+              <a:schemeClr val="accent1">
+                <a:hueOff val="0"/>
+                <a:satOff val="0"/>
+                <a:lumOff val="0"/>
+                <a:alphaOff val="0"/>
+                <a:tint val="100000"/>
+                <a:shade val="100000"/>
+                <a:satMod val="130000"/>
+              </a:schemeClr>
+            </a:gs>
+            <a:gs pos="100000">
+              <a:schemeClr val="accent1">
+                <a:hueOff val="0"/>
+                <a:satOff val="0"/>
+                <a:lumOff val="0"/>
+                <a:alphaOff val="0"/>
+                <a:tint val="50000"/>
+                <a:shade val="100000"/>
+                <a:satMod val="350000"/>
+              </a:schemeClr>
+            </a:gs>
+          </a:gsLst>
+          <a:lin ang="16200000" scaled="0"/>
+        </a:gradFill>
+        <a:ln>
+          <a:noFill/>
+        </a:ln>
+        <a:effectLst>
+          <a:outerShdw blurRad="40000" dist="23000" dir="5400000" rotWithShape="0">
+            <a:srgbClr val="000000">
+              <a:alpha val="35000"/>
+            </a:srgbClr>
+          </a:outerShdw>
+        </a:effectLst>
+      </dsp:spPr>
+      <dsp:style>
+        <a:lnRef idx="0">
+          <a:scrgbClr r="0" g="0" b="0"/>
+        </a:lnRef>
+        <a:fillRef idx="3">
+          <a:scrgbClr r="0" g="0" b="0"/>
+        </a:fillRef>
+        <a:effectRef idx="2">
+          <a:scrgbClr r="0" g="0" b="0"/>
+        </a:effectRef>
+        <a:fontRef idx="minor">
+          <a:schemeClr val="lt1"/>
+        </a:fontRef>
+      </dsp:style>
+      <dsp:txBody>
+        <a:bodyPr spcFirstLastPara="0" vert="horz" wrap="square" lIns="34290" tIns="34290" rIns="34290" bIns="34290" numCol="1" spcCol="1270" anchor="ctr" anchorCtr="0">
+          <a:noAutofit/>
+        </a:bodyPr>
+        <a:lstStyle/>
+        <a:p>
+          <a:pPr lvl="0" algn="ctr" defTabSz="800100">
+            <a:lnSpc>
+              <a:spcPct val="90000"/>
+            </a:lnSpc>
+            <a:spcBef>
+              <a:spcPct val="0"/>
+            </a:spcBef>
+            <a:spcAft>
+              <a:spcPct val="35000"/>
+            </a:spcAft>
+          </a:pPr>
+          <a:r>
+            <a:rPr lang="zh-CN" altLang="en-US" sz="1800" kern="1200" dirty="0" smtClean="0"/>
+            <a:t>评委</a:t>
+          </a:r>
+          <a:endParaRPr lang="en-US" sz="1800" kern="1200" dirty="0"/>
+        </a:p>
+      </dsp:txBody>
+      <dsp:txXfrm>
+        <a:off x="4321122" y="543433"/>
+        <a:ext cx="846620" cy="668971"/>
+      </dsp:txXfrm>
+    </dsp:sp>
   </dsp:spTree>
 </dsp:drawing>
 </file>
@@ -4417,6 +6310,1413 @@
       <dsp:cNvGrpSpPr/>
     </dsp:nvGrpSpPr>
     <dsp:grpSpPr/>
+    <dsp:sp modelId="{5FAEC43E-FFE3-924B-8D07-CE4B2F4644C8}">
+      <dsp:nvSpPr>
+        <dsp:cNvPr id="0" name=""/>
+        <dsp:cNvSpPr/>
+      </dsp:nvSpPr>
+      <dsp:spPr>
+        <a:xfrm>
+          <a:off x="4093" y="95725"/>
+          <a:ext cx="1861062" cy="930508"/>
+        </a:xfrm>
+        <a:prstGeom prst="roundRect">
+          <a:avLst>
+            <a:gd name="adj" fmla="val 10000"/>
+          </a:avLst>
+        </a:prstGeom>
+        <a:gradFill rotWithShape="0">
+          <a:gsLst>
+            <a:gs pos="0">
+              <a:schemeClr val="accent1">
+                <a:hueOff val="0"/>
+                <a:satOff val="0"/>
+                <a:lumOff val="0"/>
+                <a:alphaOff val="0"/>
+                <a:tint val="100000"/>
+                <a:shade val="100000"/>
+                <a:satMod val="130000"/>
+              </a:schemeClr>
+            </a:gs>
+            <a:gs pos="100000">
+              <a:schemeClr val="accent1">
+                <a:hueOff val="0"/>
+                <a:satOff val="0"/>
+                <a:lumOff val="0"/>
+                <a:alphaOff val="0"/>
+                <a:tint val="50000"/>
+                <a:shade val="100000"/>
+                <a:satMod val="350000"/>
+              </a:schemeClr>
+            </a:gs>
+          </a:gsLst>
+          <a:lin ang="16200000" scaled="0"/>
+        </a:gradFill>
+        <a:ln>
+          <a:noFill/>
+        </a:ln>
+        <a:effectLst>
+          <a:outerShdw blurRad="40000" dist="23000" dir="5400000" rotWithShape="0">
+            <a:srgbClr val="000000">
+              <a:alpha val="35000"/>
+            </a:srgbClr>
+          </a:outerShdw>
+        </a:effectLst>
+      </dsp:spPr>
+      <dsp:style>
+        <a:lnRef idx="0">
+          <a:scrgbClr r="0" g="0" b="0"/>
+        </a:lnRef>
+        <a:fillRef idx="3">
+          <a:scrgbClr r="0" g="0" b="0"/>
+        </a:fillRef>
+        <a:effectRef idx="2">
+          <a:scrgbClr r="0" g="0" b="0"/>
+        </a:effectRef>
+        <a:fontRef idx="minor">
+          <a:schemeClr val="lt1"/>
+        </a:fontRef>
+      </dsp:style>
+      <dsp:txBody>
+        <a:bodyPr spcFirstLastPara="0" vert="horz" wrap="square" lIns="113792" tIns="113792" rIns="113792" bIns="60960" numCol="1" spcCol="1270" anchor="t" anchorCtr="0">
+          <a:noAutofit/>
+        </a:bodyPr>
+        <a:lstStyle/>
+        <a:p>
+          <a:pPr lvl="0" algn="l" defTabSz="711200">
+            <a:lnSpc>
+              <a:spcPct val="90000"/>
+            </a:lnSpc>
+            <a:spcBef>
+              <a:spcPct val="0"/>
+            </a:spcBef>
+            <a:spcAft>
+              <a:spcPct val="35000"/>
+            </a:spcAft>
+          </a:pPr>
+          <a:r>
+            <a:rPr lang="zh-CN" altLang="en-US" sz="1600" kern="1200" dirty="0" smtClean="0"/>
+            <a:t>第一期：建造全自动供应链</a:t>
+          </a:r>
+          <a:endParaRPr lang="en-US" sz="1600" kern="1200" dirty="0"/>
+        </a:p>
+      </dsp:txBody>
+      <dsp:txXfrm>
+        <a:off x="4093" y="95725"/>
+        <a:ext cx="1861062" cy="620339"/>
+      </dsp:txXfrm>
+    </dsp:sp>
+    <dsp:sp modelId="{1879004D-6824-3448-8F31-E53F3B1D6FFC}">
+      <dsp:nvSpPr>
+        <dsp:cNvPr id="0" name=""/>
+        <dsp:cNvSpPr/>
+      </dsp:nvSpPr>
+      <dsp:spPr>
+        <a:xfrm>
+          <a:off x="385274" y="716065"/>
+          <a:ext cx="1861062" cy="2419200"/>
+        </a:xfrm>
+        <a:prstGeom prst="roundRect">
+          <a:avLst>
+            <a:gd name="adj" fmla="val 10000"/>
+          </a:avLst>
+        </a:prstGeom>
+        <a:solidFill>
+          <a:schemeClr val="lt1">
+            <a:alpha val="90000"/>
+            <a:hueOff val="0"/>
+            <a:satOff val="0"/>
+            <a:lumOff val="0"/>
+            <a:alphaOff val="0"/>
+          </a:schemeClr>
+        </a:solidFill>
+        <a:ln w="9525" cap="flat" cmpd="sng" algn="ctr">
+          <a:solidFill>
+            <a:schemeClr val="accent1">
+              <a:hueOff val="0"/>
+              <a:satOff val="0"/>
+              <a:lumOff val="0"/>
+              <a:alphaOff val="0"/>
+            </a:schemeClr>
+          </a:solidFill>
+          <a:prstDash val="solid"/>
+        </a:ln>
+        <a:effectLst/>
+      </dsp:spPr>
+      <dsp:style>
+        <a:lnRef idx="1">
+          <a:scrgbClr r="0" g="0" b="0"/>
+        </a:lnRef>
+        <a:fillRef idx="1">
+          <a:scrgbClr r="0" g="0" b="0"/>
+        </a:fillRef>
+        <a:effectRef idx="0">
+          <a:scrgbClr r="0" g="0" b="0"/>
+        </a:effectRef>
+        <a:fontRef idx="minor"/>
+      </dsp:style>
+      <dsp:txBody>
+        <a:bodyPr spcFirstLastPara="0" vert="horz" wrap="square" lIns="113792" tIns="113792" rIns="113792" bIns="113792" numCol="1" spcCol="1270" anchor="t" anchorCtr="0">
+          <a:noAutofit/>
+        </a:bodyPr>
+        <a:lstStyle/>
+        <a:p>
+          <a:pPr marL="171450" lvl="1" indent="-171450" algn="l" defTabSz="711200">
+            <a:lnSpc>
+              <a:spcPct val="90000"/>
+            </a:lnSpc>
+            <a:spcBef>
+              <a:spcPct val="0"/>
+            </a:spcBef>
+            <a:spcAft>
+              <a:spcPct val="15000"/>
+            </a:spcAft>
+            <a:buChar char="••"/>
+          </a:pPr>
+          <a:r>
+            <a:rPr lang="en-US" altLang="zh-CN" sz="1600" kern="1200" dirty="0" smtClean="0"/>
+            <a:t>2012</a:t>
+          </a:r>
+          <a:r>
+            <a:rPr lang="zh-CN" altLang="en-US" sz="1600" kern="1200" dirty="0" smtClean="0"/>
+            <a:t>年</a:t>
+          </a:r>
+          <a:r>
+            <a:rPr lang="en-US" altLang="zh-CN" sz="1600" kern="1200" dirty="0" smtClean="0"/>
+            <a:t>8</a:t>
+          </a:r>
+          <a:r>
+            <a:rPr lang="zh-CN" altLang="en-US" sz="1600" kern="1200" dirty="0" smtClean="0"/>
+            <a:t>月</a:t>
+          </a:r>
+          <a:r>
+            <a:rPr lang="en-US" altLang="zh-CN" sz="1600" kern="1200" dirty="0" smtClean="0"/>
+            <a:t>22</a:t>
+          </a:r>
+          <a:r>
+            <a:rPr lang="zh-CN" altLang="en-US" sz="1600" kern="1200" dirty="0" smtClean="0"/>
+            <a:t>日－</a:t>
+          </a:r>
+          <a:r>
+            <a:rPr lang="en-US" altLang="zh-CN" sz="1600" kern="1200" dirty="0" smtClean="0"/>
+            <a:t>25</a:t>
+          </a:r>
+          <a:r>
+            <a:rPr lang="zh-CN" altLang="en-US" sz="1600" kern="1200" dirty="0" smtClean="0"/>
+            <a:t>日</a:t>
+          </a:r>
+          <a:endParaRPr lang="en-US" sz="1600" kern="1200" dirty="0"/>
+        </a:p>
+        <a:p>
+          <a:pPr marL="171450" lvl="1" indent="-171450" algn="l" defTabSz="711200">
+            <a:lnSpc>
+              <a:spcPct val="90000"/>
+            </a:lnSpc>
+            <a:spcBef>
+              <a:spcPct val="0"/>
+            </a:spcBef>
+            <a:spcAft>
+              <a:spcPct val="15000"/>
+            </a:spcAft>
+            <a:buChar char="••"/>
+          </a:pPr>
+          <a:r>
+            <a:rPr lang="zh-CN" altLang="en-US" sz="1600" kern="1200" dirty="0" smtClean="0"/>
+            <a:t>挑战方：来自各地的自愿者和大学生，</a:t>
+          </a:r>
+          <a:r>
+            <a:rPr lang="en-US" altLang="zh-CN" sz="1600" kern="1200" dirty="0" smtClean="0"/>
+            <a:t>6</a:t>
+          </a:r>
+          <a:r>
+            <a:rPr lang="zh-CN" altLang="en-US" sz="1600" kern="1200" dirty="0" smtClean="0"/>
+            <a:t>人；</a:t>
+          </a:r>
+          <a:endParaRPr lang="en-US" altLang="zh-CN" sz="1600" kern="1200" dirty="0" smtClean="0"/>
+        </a:p>
+        <a:p>
+          <a:pPr marL="171450" lvl="1" indent="-171450" algn="l" defTabSz="711200">
+            <a:lnSpc>
+              <a:spcPct val="90000"/>
+            </a:lnSpc>
+            <a:spcBef>
+              <a:spcPct val="0"/>
+            </a:spcBef>
+            <a:spcAft>
+              <a:spcPct val="15000"/>
+            </a:spcAft>
+            <a:buChar char="••"/>
+          </a:pPr>
+          <a:r>
+            <a:rPr lang="zh-CN" altLang="en-US" sz="1600" kern="1200" dirty="0" smtClean="0"/>
+            <a:t>任务方：</a:t>
+          </a:r>
+          <a:r>
+            <a:rPr lang="en-US" altLang="zh-CN" sz="1600" kern="1200" dirty="0" smtClean="0"/>
+            <a:t>9</a:t>
+          </a:r>
+          <a:r>
+            <a:rPr lang="zh-CN" altLang="en-US" sz="1600" kern="1200" dirty="0" smtClean="0"/>
+            <a:t>个不同科系的工程管理硕士，</a:t>
+          </a:r>
+          <a:r>
+            <a:rPr lang="en-US" altLang="zh-CN" sz="1600" kern="1200" dirty="0" smtClean="0"/>
+            <a:t>78</a:t>
+          </a:r>
+          <a:r>
+            <a:rPr lang="zh-CN" altLang="en-US" sz="1600" kern="1200" dirty="0" smtClean="0"/>
+            <a:t>人</a:t>
+          </a:r>
+          <a:endParaRPr lang="en-US" altLang="zh-CN" sz="1600" kern="1200" dirty="0" smtClean="0"/>
+        </a:p>
+      </dsp:txBody>
+      <dsp:txXfrm>
+        <a:off x="439783" y="770574"/>
+        <a:ext cx="1752044" cy="2310182"/>
+      </dsp:txXfrm>
+    </dsp:sp>
+    <dsp:sp modelId="{B6930F6E-6DDB-5648-A246-88BAAB8D2C08}">
+      <dsp:nvSpPr>
+        <dsp:cNvPr id="0" name=""/>
+        <dsp:cNvSpPr/>
+      </dsp:nvSpPr>
+      <dsp:spPr>
+        <a:xfrm>
+          <a:off x="2147286" y="174220"/>
+          <a:ext cx="598116" cy="463350"/>
+        </a:xfrm>
+        <a:prstGeom prst="rightArrow">
+          <a:avLst>
+            <a:gd name="adj1" fmla="val 60000"/>
+            <a:gd name="adj2" fmla="val 50000"/>
+          </a:avLst>
+        </a:prstGeom>
+        <a:gradFill rotWithShape="0">
+          <a:gsLst>
+            <a:gs pos="0">
+              <a:schemeClr val="accent1">
+                <a:tint val="60000"/>
+                <a:hueOff val="0"/>
+                <a:satOff val="0"/>
+                <a:lumOff val="0"/>
+                <a:alphaOff val="0"/>
+                <a:tint val="100000"/>
+                <a:shade val="100000"/>
+                <a:satMod val="130000"/>
+              </a:schemeClr>
+            </a:gs>
+            <a:gs pos="100000">
+              <a:schemeClr val="accent1">
+                <a:tint val="60000"/>
+                <a:hueOff val="0"/>
+                <a:satOff val="0"/>
+                <a:lumOff val="0"/>
+                <a:alphaOff val="0"/>
+                <a:tint val="50000"/>
+                <a:shade val="100000"/>
+                <a:satMod val="350000"/>
+              </a:schemeClr>
+            </a:gs>
+          </a:gsLst>
+          <a:lin ang="16200000" scaled="0"/>
+        </a:gradFill>
+        <a:ln>
+          <a:noFill/>
+        </a:ln>
+        <a:effectLst>
+          <a:outerShdw blurRad="40000" dist="23000" dir="5400000" rotWithShape="0">
+            <a:srgbClr val="000000">
+              <a:alpha val="35000"/>
+            </a:srgbClr>
+          </a:outerShdw>
+        </a:effectLst>
+      </dsp:spPr>
+      <dsp:style>
+        <a:lnRef idx="0">
+          <a:scrgbClr r="0" g="0" b="0"/>
+        </a:lnRef>
+        <a:fillRef idx="3">
+          <a:scrgbClr r="0" g="0" b="0"/>
+        </a:fillRef>
+        <a:effectRef idx="2">
+          <a:scrgbClr r="0" g="0" b="0"/>
+        </a:effectRef>
+        <a:fontRef idx="minor">
+          <a:schemeClr val="lt1"/>
+        </a:fontRef>
+      </dsp:style>
+      <dsp:txBody>
+        <a:bodyPr spcFirstLastPara="0" vert="horz" wrap="square" lIns="0" tIns="0" rIns="0" bIns="0" numCol="1" spcCol="1270" anchor="ctr" anchorCtr="0">
+          <a:noAutofit/>
+        </a:bodyPr>
+        <a:lstStyle/>
+        <a:p>
+          <a:pPr lvl="0" algn="ctr" defTabSz="577850">
+            <a:lnSpc>
+              <a:spcPct val="90000"/>
+            </a:lnSpc>
+            <a:spcBef>
+              <a:spcPct val="0"/>
+            </a:spcBef>
+            <a:spcAft>
+              <a:spcPct val="35000"/>
+            </a:spcAft>
+          </a:pPr>
+          <a:endParaRPr lang="en-US" sz="1300" kern="1200"/>
+        </a:p>
+      </dsp:txBody>
+      <dsp:txXfrm>
+        <a:off x="2147286" y="266890"/>
+        <a:ext cx="459111" cy="278010"/>
+      </dsp:txXfrm>
+    </dsp:sp>
+    <dsp:sp modelId="{7792C6CE-0AFE-F54B-B4B9-7C8C05AC3072}">
+      <dsp:nvSpPr>
+        <dsp:cNvPr id="0" name=""/>
+        <dsp:cNvSpPr/>
+      </dsp:nvSpPr>
+      <dsp:spPr>
+        <a:xfrm>
+          <a:off x="2993677" y="95725"/>
+          <a:ext cx="1861062" cy="930508"/>
+        </a:xfrm>
+        <a:prstGeom prst="roundRect">
+          <a:avLst>
+            <a:gd name="adj" fmla="val 10000"/>
+          </a:avLst>
+        </a:prstGeom>
+        <a:gradFill rotWithShape="0">
+          <a:gsLst>
+            <a:gs pos="0">
+              <a:schemeClr val="accent1">
+                <a:hueOff val="0"/>
+                <a:satOff val="0"/>
+                <a:lumOff val="0"/>
+                <a:alphaOff val="0"/>
+                <a:tint val="100000"/>
+                <a:shade val="100000"/>
+                <a:satMod val="130000"/>
+              </a:schemeClr>
+            </a:gs>
+            <a:gs pos="100000">
+              <a:schemeClr val="accent1">
+                <a:hueOff val="0"/>
+                <a:satOff val="0"/>
+                <a:lumOff val="0"/>
+                <a:alphaOff val="0"/>
+                <a:tint val="50000"/>
+                <a:shade val="100000"/>
+                <a:satMod val="350000"/>
+              </a:schemeClr>
+            </a:gs>
+          </a:gsLst>
+          <a:lin ang="16200000" scaled="0"/>
+        </a:gradFill>
+        <a:ln>
+          <a:noFill/>
+        </a:ln>
+        <a:effectLst>
+          <a:outerShdw blurRad="40000" dist="23000" dir="5400000" rotWithShape="0">
+            <a:srgbClr val="000000">
+              <a:alpha val="35000"/>
+            </a:srgbClr>
+          </a:outerShdw>
+        </a:effectLst>
+      </dsp:spPr>
+      <dsp:style>
+        <a:lnRef idx="0">
+          <a:scrgbClr r="0" g="0" b="0"/>
+        </a:lnRef>
+        <a:fillRef idx="3">
+          <a:scrgbClr r="0" g="0" b="0"/>
+        </a:fillRef>
+        <a:effectRef idx="2">
+          <a:scrgbClr r="0" g="0" b="0"/>
+        </a:effectRef>
+        <a:fontRef idx="minor">
+          <a:schemeClr val="lt1"/>
+        </a:fontRef>
+      </dsp:style>
+      <dsp:txBody>
+        <a:bodyPr spcFirstLastPara="0" vert="horz" wrap="square" lIns="113792" tIns="113792" rIns="113792" bIns="60960" numCol="1" spcCol="1270" anchor="t" anchorCtr="0">
+          <a:noAutofit/>
+        </a:bodyPr>
+        <a:lstStyle/>
+        <a:p>
+          <a:pPr lvl="0" algn="l" defTabSz="711200">
+            <a:lnSpc>
+              <a:spcPct val="90000"/>
+            </a:lnSpc>
+            <a:spcBef>
+              <a:spcPct val="0"/>
+            </a:spcBef>
+            <a:spcAft>
+              <a:spcPct val="35000"/>
+            </a:spcAft>
+          </a:pPr>
+          <a:r>
+            <a:rPr lang="zh-CN" altLang="en-US" sz="1600" kern="1200" dirty="0" smtClean="0"/>
+            <a:t>第二期：建设南海无人岛</a:t>
+          </a:r>
+          <a:endParaRPr lang="en-US" sz="1600" kern="1200" dirty="0"/>
+        </a:p>
+      </dsp:txBody>
+      <dsp:txXfrm>
+        <a:off x="2993677" y="95725"/>
+        <a:ext cx="1861062" cy="620339"/>
+      </dsp:txXfrm>
+    </dsp:sp>
+    <dsp:sp modelId="{521F2BBA-4D16-0A40-84AB-E04092224D6E}">
+      <dsp:nvSpPr>
+        <dsp:cNvPr id="0" name=""/>
+        <dsp:cNvSpPr/>
+      </dsp:nvSpPr>
+      <dsp:spPr>
+        <a:xfrm>
+          <a:off x="3374859" y="716065"/>
+          <a:ext cx="1861062" cy="2419200"/>
+        </a:xfrm>
+        <a:prstGeom prst="roundRect">
+          <a:avLst>
+            <a:gd name="adj" fmla="val 10000"/>
+          </a:avLst>
+        </a:prstGeom>
+        <a:solidFill>
+          <a:schemeClr val="lt1">
+            <a:alpha val="90000"/>
+            <a:hueOff val="0"/>
+            <a:satOff val="0"/>
+            <a:lumOff val="0"/>
+            <a:alphaOff val="0"/>
+          </a:schemeClr>
+        </a:solidFill>
+        <a:ln w="9525" cap="flat" cmpd="sng" algn="ctr">
+          <a:solidFill>
+            <a:schemeClr val="accent1">
+              <a:hueOff val="0"/>
+              <a:satOff val="0"/>
+              <a:lumOff val="0"/>
+              <a:alphaOff val="0"/>
+            </a:schemeClr>
+          </a:solidFill>
+          <a:prstDash val="solid"/>
+        </a:ln>
+        <a:effectLst/>
+      </dsp:spPr>
+      <dsp:style>
+        <a:lnRef idx="1">
+          <a:scrgbClr r="0" g="0" b="0"/>
+        </a:lnRef>
+        <a:fillRef idx="1">
+          <a:scrgbClr r="0" g="0" b="0"/>
+        </a:fillRef>
+        <a:effectRef idx="0">
+          <a:scrgbClr r="0" g="0" b="0"/>
+        </a:effectRef>
+        <a:fontRef idx="minor"/>
+      </dsp:style>
+      <dsp:txBody>
+        <a:bodyPr spcFirstLastPara="0" vert="horz" wrap="square" lIns="113792" tIns="113792" rIns="113792" bIns="113792" numCol="1" spcCol="1270" anchor="t" anchorCtr="0">
+          <a:noAutofit/>
+        </a:bodyPr>
+        <a:lstStyle/>
+        <a:p>
+          <a:pPr marL="171450" lvl="1" indent="-171450" algn="l" defTabSz="711200">
+            <a:lnSpc>
+              <a:spcPct val="90000"/>
+            </a:lnSpc>
+            <a:spcBef>
+              <a:spcPct val="0"/>
+            </a:spcBef>
+            <a:spcAft>
+              <a:spcPct val="15000"/>
+            </a:spcAft>
+            <a:buChar char="••"/>
+          </a:pPr>
+          <a:r>
+            <a:rPr lang="zh-CN" altLang="en-US" sz="1600" kern="1200" dirty="0" smtClean="0"/>
+            <a:t>时间：</a:t>
+          </a:r>
+          <a:r>
+            <a:rPr lang="en-US" altLang="zh-CN" sz="1600" kern="1200" dirty="0" smtClean="0"/>
+            <a:t>2013</a:t>
+          </a:r>
+          <a:r>
+            <a:rPr lang="zh-CN" altLang="en-US" sz="1600" kern="1200" dirty="0" smtClean="0"/>
+            <a:t>年</a:t>
+          </a:r>
+          <a:r>
+            <a:rPr lang="en-US" altLang="zh-CN" sz="1600" kern="1200" dirty="0" smtClean="0"/>
+            <a:t>1</a:t>
+          </a:r>
+          <a:r>
+            <a:rPr lang="zh-CN" altLang="en-US" sz="1600" kern="1200" dirty="0" smtClean="0"/>
+            <a:t>月</a:t>
+          </a:r>
+          <a:r>
+            <a:rPr lang="en-US" altLang="zh-CN" sz="1600" kern="1200" dirty="0" smtClean="0"/>
+            <a:t>17</a:t>
+          </a:r>
+          <a:r>
+            <a:rPr lang="zh-CN" altLang="en-US" sz="1600" kern="1200" dirty="0" smtClean="0"/>
+            <a:t>日－</a:t>
+          </a:r>
+          <a:r>
+            <a:rPr lang="en-US" altLang="zh-CN" sz="1600" kern="1200" dirty="0" smtClean="0"/>
+            <a:t>20</a:t>
+          </a:r>
+          <a:r>
+            <a:rPr lang="zh-CN" altLang="en-US" sz="1600" kern="1200" dirty="0" smtClean="0"/>
+            <a:t>日</a:t>
+          </a:r>
+          <a:endParaRPr lang="en-US" sz="1600" kern="1200" dirty="0"/>
+        </a:p>
+        <a:p>
+          <a:pPr marL="171450" lvl="1" indent="-171450" algn="l" defTabSz="711200">
+            <a:lnSpc>
+              <a:spcPct val="90000"/>
+            </a:lnSpc>
+            <a:spcBef>
+              <a:spcPct val="0"/>
+            </a:spcBef>
+            <a:spcAft>
+              <a:spcPct val="15000"/>
+            </a:spcAft>
+            <a:buChar char="••"/>
+          </a:pPr>
+          <a:r>
+            <a:rPr lang="zh-CN" altLang="en-US" sz="1600" kern="1200" smtClean="0"/>
+            <a:t>挑战方：全校</a:t>
+          </a:r>
+          <a:r>
+            <a:rPr lang="en-US" altLang="zh-CN" sz="1600" kern="1200" smtClean="0"/>
+            <a:t>20</a:t>
+          </a:r>
+          <a:r>
+            <a:rPr lang="zh-CN" altLang="en-US" sz="1600" kern="1200" smtClean="0"/>
+            <a:t>个科系</a:t>
+          </a:r>
+          <a:r>
+            <a:rPr lang="en-US" altLang="zh-CN" sz="1600" kern="1200" smtClean="0"/>
+            <a:t>50</a:t>
+          </a:r>
+          <a:r>
+            <a:rPr lang="zh-CN" altLang="en-US" sz="1600" kern="1200" smtClean="0"/>
+            <a:t>人</a:t>
+          </a:r>
+          <a:endParaRPr lang="en-US" altLang="zh-CN" sz="1600" kern="1200" dirty="0" smtClean="0"/>
+        </a:p>
+        <a:p>
+          <a:pPr marL="171450" lvl="1" indent="-171450" algn="l" defTabSz="711200">
+            <a:lnSpc>
+              <a:spcPct val="90000"/>
+            </a:lnSpc>
+            <a:spcBef>
+              <a:spcPct val="0"/>
+            </a:spcBef>
+            <a:spcAft>
+              <a:spcPct val="15000"/>
+            </a:spcAft>
+            <a:buChar char="••"/>
+          </a:pPr>
+          <a:r>
+            <a:rPr lang="zh-CN" altLang="en-US" sz="1600" kern="1200" dirty="0" smtClean="0"/>
+            <a:t>任务方：钱学森力学班</a:t>
+          </a:r>
+          <a:r>
+            <a:rPr lang="en-US" altLang="zh-CN" sz="1600" kern="1200" dirty="0" smtClean="0"/>
+            <a:t>30</a:t>
+          </a:r>
+          <a:r>
+            <a:rPr lang="zh-CN" altLang="en-US" sz="1600" kern="1200" dirty="0" smtClean="0"/>
+            <a:t>人，其他</a:t>
+          </a:r>
+          <a:r>
+            <a:rPr lang="en-US" altLang="zh-CN" sz="1600" kern="1200" dirty="0" smtClean="0"/>
+            <a:t>20</a:t>
+          </a:r>
+          <a:r>
+            <a:rPr lang="zh-CN" altLang="en-US" sz="1600" kern="1200" dirty="0" smtClean="0"/>
+            <a:t>个科系</a:t>
+          </a:r>
+          <a:r>
+            <a:rPr lang="en-US" altLang="zh-CN" sz="1600" kern="1200" dirty="0" smtClean="0"/>
+            <a:t>50</a:t>
+          </a:r>
+          <a:r>
+            <a:rPr lang="zh-CN" altLang="en-US" sz="1600" kern="1200" dirty="0" smtClean="0"/>
+            <a:t>人</a:t>
+          </a:r>
+          <a:endParaRPr lang="en-US" altLang="zh-CN" sz="1600" kern="1200" dirty="0" smtClean="0"/>
+        </a:p>
+      </dsp:txBody>
+      <dsp:txXfrm>
+        <a:off x="3429368" y="770574"/>
+        <a:ext cx="1752044" cy="2310182"/>
+      </dsp:txXfrm>
+    </dsp:sp>
+    <dsp:sp modelId="{366BE592-239C-404C-8789-E251C8C3DC67}">
+      <dsp:nvSpPr>
+        <dsp:cNvPr id="0" name=""/>
+        <dsp:cNvSpPr/>
+      </dsp:nvSpPr>
+      <dsp:spPr>
+        <a:xfrm>
+          <a:off x="5136871" y="174220"/>
+          <a:ext cx="598116" cy="463350"/>
+        </a:xfrm>
+        <a:prstGeom prst="rightArrow">
+          <a:avLst>
+            <a:gd name="adj1" fmla="val 60000"/>
+            <a:gd name="adj2" fmla="val 50000"/>
+          </a:avLst>
+        </a:prstGeom>
+        <a:gradFill rotWithShape="0">
+          <a:gsLst>
+            <a:gs pos="0">
+              <a:schemeClr val="accent1">
+                <a:tint val="60000"/>
+                <a:hueOff val="0"/>
+                <a:satOff val="0"/>
+                <a:lumOff val="0"/>
+                <a:alphaOff val="0"/>
+                <a:tint val="100000"/>
+                <a:shade val="100000"/>
+                <a:satMod val="130000"/>
+              </a:schemeClr>
+            </a:gs>
+            <a:gs pos="100000">
+              <a:schemeClr val="accent1">
+                <a:tint val="60000"/>
+                <a:hueOff val="0"/>
+                <a:satOff val="0"/>
+                <a:lumOff val="0"/>
+                <a:alphaOff val="0"/>
+                <a:tint val="50000"/>
+                <a:shade val="100000"/>
+                <a:satMod val="350000"/>
+              </a:schemeClr>
+            </a:gs>
+          </a:gsLst>
+          <a:lin ang="16200000" scaled="0"/>
+        </a:gradFill>
+        <a:ln>
+          <a:noFill/>
+        </a:ln>
+        <a:effectLst>
+          <a:outerShdw blurRad="40000" dist="23000" dir="5400000" rotWithShape="0">
+            <a:srgbClr val="000000">
+              <a:alpha val="35000"/>
+            </a:srgbClr>
+          </a:outerShdw>
+        </a:effectLst>
+      </dsp:spPr>
+      <dsp:style>
+        <a:lnRef idx="0">
+          <a:scrgbClr r="0" g="0" b="0"/>
+        </a:lnRef>
+        <a:fillRef idx="3">
+          <a:scrgbClr r="0" g="0" b="0"/>
+        </a:fillRef>
+        <a:effectRef idx="2">
+          <a:scrgbClr r="0" g="0" b="0"/>
+        </a:effectRef>
+        <a:fontRef idx="minor">
+          <a:schemeClr val="lt1"/>
+        </a:fontRef>
+      </dsp:style>
+      <dsp:txBody>
+        <a:bodyPr spcFirstLastPara="0" vert="horz" wrap="square" lIns="0" tIns="0" rIns="0" bIns="0" numCol="1" spcCol="1270" anchor="ctr" anchorCtr="0">
+          <a:noAutofit/>
+        </a:bodyPr>
+        <a:lstStyle/>
+        <a:p>
+          <a:pPr lvl="0" algn="ctr" defTabSz="577850">
+            <a:lnSpc>
+              <a:spcPct val="90000"/>
+            </a:lnSpc>
+            <a:spcBef>
+              <a:spcPct val="0"/>
+            </a:spcBef>
+            <a:spcAft>
+              <a:spcPct val="35000"/>
+            </a:spcAft>
+          </a:pPr>
+          <a:endParaRPr lang="en-US" sz="1300" kern="1200"/>
+        </a:p>
+      </dsp:txBody>
+      <dsp:txXfrm>
+        <a:off x="5136871" y="266890"/>
+        <a:ext cx="459111" cy="278010"/>
+      </dsp:txXfrm>
+    </dsp:sp>
+    <dsp:sp modelId="{4A1E400B-500E-864F-A1C9-9F6A0A8C1425}">
+      <dsp:nvSpPr>
+        <dsp:cNvPr id="0" name=""/>
+        <dsp:cNvSpPr/>
+      </dsp:nvSpPr>
+      <dsp:spPr>
+        <a:xfrm>
+          <a:off x="5983262" y="95725"/>
+          <a:ext cx="1861062" cy="930508"/>
+        </a:xfrm>
+        <a:prstGeom prst="roundRect">
+          <a:avLst>
+            <a:gd name="adj" fmla="val 10000"/>
+          </a:avLst>
+        </a:prstGeom>
+        <a:gradFill rotWithShape="0">
+          <a:gsLst>
+            <a:gs pos="0">
+              <a:schemeClr val="accent1">
+                <a:hueOff val="0"/>
+                <a:satOff val="0"/>
+                <a:lumOff val="0"/>
+                <a:alphaOff val="0"/>
+                <a:tint val="100000"/>
+                <a:shade val="100000"/>
+                <a:satMod val="130000"/>
+              </a:schemeClr>
+            </a:gs>
+            <a:gs pos="100000">
+              <a:schemeClr val="accent1">
+                <a:hueOff val="0"/>
+                <a:satOff val="0"/>
+                <a:lumOff val="0"/>
+                <a:alphaOff val="0"/>
+                <a:tint val="50000"/>
+                <a:shade val="100000"/>
+                <a:satMod val="350000"/>
+              </a:schemeClr>
+            </a:gs>
+          </a:gsLst>
+          <a:lin ang="16200000" scaled="0"/>
+        </a:gradFill>
+        <a:ln>
+          <a:noFill/>
+        </a:ln>
+        <a:effectLst>
+          <a:outerShdw blurRad="40000" dist="23000" dir="5400000" rotWithShape="0">
+            <a:srgbClr val="000000">
+              <a:alpha val="35000"/>
+            </a:srgbClr>
+          </a:outerShdw>
+        </a:effectLst>
+      </dsp:spPr>
+      <dsp:style>
+        <a:lnRef idx="0">
+          <a:scrgbClr r="0" g="0" b="0"/>
+        </a:lnRef>
+        <a:fillRef idx="3">
+          <a:scrgbClr r="0" g="0" b="0"/>
+        </a:fillRef>
+        <a:effectRef idx="2">
+          <a:scrgbClr r="0" g="0" b="0"/>
+        </a:effectRef>
+        <a:fontRef idx="minor">
+          <a:schemeClr val="lt1"/>
+        </a:fontRef>
+      </dsp:style>
+      <dsp:txBody>
+        <a:bodyPr spcFirstLastPara="0" vert="horz" wrap="square" lIns="113792" tIns="113792" rIns="113792" bIns="60960" numCol="1" spcCol="1270" anchor="t" anchorCtr="0">
+          <a:noAutofit/>
+        </a:bodyPr>
+        <a:lstStyle/>
+        <a:p>
+          <a:pPr lvl="0" algn="l" defTabSz="711200">
+            <a:lnSpc>
+              <a:spcPct val="90000"/>
+            </a:lnSpc>
+            <a:spcBef>
+              <a:spcPct val="0"/>
+            </a:spcBef>
+            <a:spcAft>
+              <a:spcPct val="35000"/>
+            </a:spcAft>
+          </a:pPr>
+          <a:r>
+            <a:rPr lang="zh-CN" altLang="en-US" sz="1600" kern="1200" dirty="0" smtClean="0"/>
+            <a:t>第三期：开发可持续发展数字国度</a:t>
+          </a:r>
+          <a:endParaRPr lang="en-US" sz="1600" kern="1200" dirty="0"/>
+        </a:p>
+      </dsp:txBody>
+      <dsp:txXfrm>
+        <a:off x="5983262" y="95725"/>
+        <a:ext cx="1861062" cy="620339"/>
+      </dsp:txXfrm>
+    </dsp:sp>
+    <dsp:sp modelId="{E10D82BB-4DC2-1F44-A047-DA5DF0C818F6}">
+      <dsp:nvSpPr>
+        <dsp:cNvPr id="0" name=""/>
+        <dsp:cNvSpPr/>
+      </dsp:nvSpPr>
+      <dsp:spPr>
+        <a:xfrm>
+          <a:off x="6364443" y="716065"/>
+          <a:ext cx="1861062" cy="2419200"/>
+        </a:xfrm>
+        <a:prstGeom prst="roundRect">
+          <a:avLst>
+            <a:gd name="adj" fmla="val 10000"/>
+          </a:avLst>
+        </a:prstGeom>
+        <a:solidFill>
+          <a:schemeClr val="lt1">
+            <a:alpha val="90000"/>
+            <a:hueOff val="0"/>
+            <a:satOff val="0"/>
+            <a:lumOff val="0"/>
+            <a:alphaOff val="0"/>
+          </a:schemeClr>
+        </a:solidFill>
+        <a:ln w="9525" cap="flat" cmpd="sng" algn="ctr">
+          <a:solidFill>
+            <a:schemeClr val="accent1">
+              <a:hueOff val="0"/>
+              <a:satOff val="0"/>
+              <a:lumOff val="0"/>
+              <a:alphaOff val="0"/>
+            </a:schemeClr>
+          </a:solidFill>
+          <a:prstDash val="solid"/>
+        </a:ln>
+        <a:effectLst/>
+      </dsp:spPr>
+      <dsp:style>
+        <a:lnRef idx="1">
+          <a:scrgbClr r="0" g="0" b="0"/>
+        </a:lnRef>
+        <a:fillRef idx="1">
+          <a:scrgbClr r="0" g="0" b="0"/>
+        </a:fillRef>
+        <a:effectRef idx="0">
+          <a:scrgbClr r="0" g="0" b="0"/>
+        </a:effectRef>
+        <a:fontRef idx="minor"/>
+      </dsp:style>
+      <dsp:txBody>
+        <a:bodyPr spcFirstLastPara="0" vert="horz" wrap="square" lIns="113792" tIns="113792" rIns="113792" bIns="113792" numCol="1" spcCol="1270" anchor="t" anchorCtr="0">
+          <a:noAutofit/>
+        </a:bodyPr>
+        <a:lstStyle/>
+        <a:p>
+          <a:pPr marL="171450" lvl="1" indent="-171450" algn="l" defTabSz="711200">
+            <a:lnSpc>
+              <a:spcPct val="90000"/>
+            </a:lnSpc>
+            <a:spcBef>
+              <a:spcPct val="0"/>
+            </a:spcBef>
+            <a:spcAft>
+              <a:spcPct val="15000"/>
+            </a:spcAft>
+            <a:buChar char="••"/>
+          </a:pPr>
+          <a:r>
+            <a:rPr lang="zh-CN" altLang="en-US" sz="1600" kern="1200" dirty="0" smtClean="0"/>
+            <a:t>时间：</a:t>
+          </a:r>
+          <a:r>
+            <a:rPr lang="en-US" altLang="zh-CN" sz="1600" kern="1200" dirty="0" smtClean="0"/>
+            <a:t>2013</a:t>
+          </a:r>
+          <a:r>
+            <a:rPr lang="zh-CN" altLang="en-US" sz="1600" kern="1200" dirty="0" smtClean="0"/>
+            <a:t>年</a:t>
+          </a:r>
+          <a:r>
+            <a:rPr lang="en-US" altLang="zh-CN" sz="1600" kern="1200" dirty="0" smtClean="0"/>
+            <a:t>8</a:t>
+          </a:r>
+          <a:r>
+            <a:rPr lang="zh-CN" altLang="en-US" sz="1600" kern="1200" dirty="0" smtClean="0"/>
+            <a:t>月</a:t>
+          </a:r>
+          <a:r>
+            <a:rPr lang="en-US" altLang="zh-CN" sz="1600" kern="1200" dirty="0" smtClean="0"/>
+            <a:t>28</a:t>
+          </a:r>
+          <a:r>
+            <a:rPr lang="zh-CN" altLang="en-US" sz="1600" kern="1200" dirty="0" smtClean="0"/>
+            <a:t>日</a:t>
+          </a:r>
+          <a:r>
+            <a:rPr lang="zh-CN" altLang="zh-CN" sz="1600" kern="1200" dirty="0" smtClean="0"/>
+            <a:t>－</a:t>
+          </a:r>
+          <a:r>
+            <a:rPr lang="en-US" altLang="zh-CN" sz="1600" kern="1200" dirty="0" smtClean="0"/>
+            <a:t>31</a:t>
+          </a:r>
+          <a:r>
+            <a:rPr lang="zh-CN" altLang="en-US" sz="1600" kern="1200" dirty="0" smtClean="0"/>
+            <a:t>日</a:t>
+          </a:r>
+          <a:endParaRPr lang="en-US" sz="1600" kern="1200" dirty="0"/>
+        </a:p>
+        <a:p>
+          <a:pPr marL="171450" lvl="1" indent="-171450" algn="l" defTabSz="711200">
+            <a:lnSpc>
+              <a:spcPct val="90000"/>
+            </a:lnSpc>
+            <a:spcBef>
+              <a:spcPct val="0"/>
+            </a:spcBef>
+            <a:spcAft>
+              <a:spcPct val="15000"/>
+            </a:spcAft>
+            <a:buChar char="••"/>
+          </a:pPr>
+          <a:r>
+            <a:rPr lang="zh-CN" altLang="en-US" sz="1600" kern="1200" smtClean="0"/>
+            <a:t>挑战方：全球各地各学校的自愿者</a:t>
+          </a:r>
+          <a:r>
+            <a:rPr lang="en-US" altLang="zh-CN" sz="1600" kern="1200" smtClean="0"/>
+            <a:t>20</a:t>
+          </a:r>
+          <a:r>
+            <a:rPr lang="zh-CN" altLang="en-US" sz="1600" kern="1200" smtClean="0"/>
+            <a:t>人</a:t>
+          </a:r>
+          <a:endParaRPr lang="en-US" altLang="zh-CN" sz="1600" kern="1200" dirty="0" smtClean="0"/>
+        </a:p>
+        <a:p>
+          <a:pPr marL="171450" lvl="1" indent="-171450" algn="l" defTabSz="711200">
+            <a:lnSpc>
+              <a:spcPct val="90000"/>
+            </a:lnSpc>
+            <a:spcBef>
+              <a:spcPct val="0"/>
+            </a:spcBef>
+            <a:spcAft>
+              <a:spcPct val="15000"/>
+            </a:spcAft>
+            <a:buChar char="••"/>
+          </a:pPr>
+          <a:r>
+            <a:rPr lang="zh-CN" altLang="en-US" sz="1600" kern="1200" dirty="0" smtClean="0"/>
+            <a:t>任务方：</a:t>
+          </a:r>
+          <a:r>
+            <a:rPr lang="en-US" altLang="zh-CN" sz="1600" kern="1200" dirty="0" smtClean="0"/>
+            <a:t>9</a:t>
+          </a:r>
+          <a:r>
+            <a:rPr lang="zh-CN" altLang="en-US" sz="1600" kern="1200" dirty="0" smtClean="0"/>
+            <a:t>科系的工程管理硕士班</a:t>
+          </a:r>
+          <a:r>
+            <a:rPr lang="en-US" altLang="zh-CN" sz="1600" kern="1200" dirty="0" smtClean="0"/>
+            <a:t>80</a:t>
+          </a:r>
+          <a:r>
+            <a:rPr lang="zh-CN" altLang="en-US" sz="1600" kern="1200" dirty="0" smtClean="0"/>
+            <a:t>人</a:t>
+          </a:r>
+          <a:endParaRPr lang="en-US" altLang="zh-CN" sz="1600" kern="1200" dirty="0" smtClean="0"/>
+        </a:p>
+      </dsp:txBody>
+      <dsp:txXfrm>
+        <a:off x="6418952" y="770574"/>
+        <a:ext cx="1752044" cy="2310182"/>
+      </dsp:txXfrm>
+    </dsp:sp>
+  </dsp:spTree>
+</dsp:drawing>
+</file>
+
+<file path=ppt/diagrams/drawing4.xml><?xml version="1.0" encoding="utf-8"?>
+<dsp:drawing xmlns:dgm="http://schemas.openxmlformats.org/drawingml/2006/diagram" xmlns:dsp="http://schemas.microsoft.com/office/drawing/2008/diagram" xmlns:a="http://schemas.openxmlformats.org/drawingml/2006/main">
+  <dsp:spTree>
+    <dsp:nvGrpSpPr>
+      <dsp:cNvPr id="0" name=""/>
+      <dsp:cNvGrpSpPr/>
+    </dsp:nvGrpSpPr>
+    <dsp:grpSpPr/>
+    <dsp:sp modelId="{13E6BFD9-2ED0-644A-B08F-E7D8FD6C097F}">
+      <dsp:nvSpPr>
+        <dsp:cNvPr id="0" name=""/>
+        <dsp:cNvSpPr/>
+      </dsp:nvSpPr>
+      <dsp:spPr>
+        <a:xfrm>
+          <a:off x="1966102" y="94886"/>
+          <a:ext cx="4297394" cy="1342935"/>
+        </a:xfrm>
+        <a:prstGeom prst="rect">
+          <a:avLst/>
+        </a:prstGeom>
+        <a:solidFill>
+          <a:schemeClr val="lt1">
+            <a:alpha val="40000"/>
+            <a:hueOff val="0"/>
+            <a:satOff val="0"/>
+            <a:lumOff val="0"/>
+            <a:alphaOff val="0"/>
+          </a:schemeClr>
+        </a:solidFill>
+        <a:ln w="9525" cap="flat" cmpd="sng" algn="ctr">
+          <a:solidFill>
+            <a:schemeClr val="accent1">
+              <a:hueOff val="0"/>
+              <a:satOff val="0"/>
+              <a:lumOff val="0"/>
+              <a:alphaOff val="0"/>
+            </a:schemeClr>
+          </a:solidFill>
+          <a:prstDash val="solid"/>
+        </a:ln>
+        <a:effectLst/>
+      </dsp:spPr>
+      <dsp:style>
+        <a:lnRef idx="1">
+          <a:scrgbClr r="0" g="0" b="0"/>
+        </a:lnRef>
+        <a:fillRef idx="1">
+          <a:scrgbClr r="0" g="0" b="0"/>
+        </a:fillRef>
+        <a:effectRef idx="0">
+          <a:scrgbClr r="0" g="0" b="0"/>
+        </a:effectRef>
+        <a:fontRef idx="minor"/>
+      </dsp:style>
+      <dsp:txBody>
+        <a:bodyPr spcFirstLastPara="0" vert="horz" wrap="square" lIns="909615" tIns="102870" rIns="102870" bIns="102870" numCol="1" spcCol="1270" anchor="ctr" anchorCtr="0">
+          <a:noAutofit/>
+        </a:bodyPr>
+        <a:lstStyle/>
+        <a:p>
+          <a:pPr lvl="0" algn="l" defTabSz="1200150">
+            <a:lnSpc>
+              <a:spcPct val="90000"/>
+            </a:lnSpc>
+            <a:spcBef>
+              <a:spcPct val="0"/>
+            </a:spcBef>
+            <a:spcAft>
+              <a:spcPct val="35000"/>
+            </a:spcAft>
+          </a:pPr>
+          <a:r>
+            <a:rPr lang="zh-CN" altLang="en-US" sz="2700" kern="1200" dirty="0" smtClean="0"/>
+            <a:t>在数字化时代，交叉学科必须要有协同工具</a:t>
+          </a:r>
+          <a:endParaRPr lang="en-US" sz="2700" kern="1200" dirty="0"/>
+        </a:p>
+      </dsp:txBody>
+      <dsp:txXfrm>
+        <a:off x="1966102" y="94886"/>
+        <a:ext cx="4297394" cy="1342935"/>
+      </dsp:txXfrm>
+    </dsp:sp>
+    <dsp:sp modelId="{A101EC3C-ED13-F14D-ADDC-C641677F8319}">
+      <dsp:nvSpPr>
+        <dsp:cNvPr id="0" name=""/>
+        <dsp:cNvSpPr/>
+      </dsp:nvSpPr>
+      <dsp:spPr>
+        <a:xfrm>
+          <a:off x="2069145" y="330883"/>
+          <a:ext cx="375852" cy="600582"/>
+        </a:xfrm>
+        <a:prstGeom prst="rect">
+          <a:avLst/>
+        </a:prstGeom>
+        <a:blipFill>
+          <a:blip xmlns:r="http://schemas.openxmlformats.org/officeDocument/2006/relationships" r:embed="rId1">
+            <a:extLst>
+              <a:ext uri="{28A0092B-C50C-407E-A947-70E740481C1C}">
+                <a14:useLocalDpi xmlns:a14="http://schemas.microsoft.com/office/drawing/2010/main" val="0"/>
+              </a:ext>
+            </a:extLst>
+          </a:blip>
+          <a:srcRect/>
+          <a:stretch>
+            <a:fillRect l="-25000" r="-25000"/>
+          </a:stretch>
+        </a:blipFill>
+        <a:ln>
+          <a:noFill/>
+        </a:ln>
+        <a:effectLst>
+          <a:outerShdw blurRad="40000" dist="23000" dir="5400000" rotWithShape="0">
+            <a:srgbClr val="000000">
+              <a:alpha val="35000"/>
+            </a:srgbClr>
+          </a:outerShdw>
+        </a:effectLst>
+      </dsp:spPr>
+      <dsp:style>
+        <a:lnRef idx="0">
+          <a:scrgbClr r="0" g="0" b="0"/>
+        </a:lnRef>
+        <a:fillRef idx="1">
+          <a:scrgbClr r="0" g="0" b="0"/>
+        </a:fillRef>
+        <a:effectRef idx="2">
+          <a:scrgbClr r="0" g="0" b="0"/>
+        </a:effectRef>
+        <a:fontRef idx="minor"/>
+      </dsp:style>
+    </dsp:sp>
+    <dsp:sp modelId="{5A8EA483-76A7-7E4B-9258-85C8294DF13B}">
+      <dsp:nvSpPr>
+        <dsp:cNvPr id="0" name=""/>
+        <dsp:cNvSpPr/>
+      </dsp:nvSpPr>
+      <dsp:spPr>
+        <a:xfrm>
+          <a:off x="1966102" y="1591513"/>
+          <a:ext cx="4297394" cy="1342935"/>
+        </a:xfrm>
+        <a:prstGeom prst="rect">
+          <a:avLst/>
+        </a:prstGeom>
+        <a:solidFill>
+          <a:schemeClr val="lt1">
+            <a:alpha val="40000"/>
+            <a:hueOff val="0"/>
+            <a:satOff val="0"/>
+            <a:lumOff val="0"/>
+            <a:alphaOff val="0"/>
+          </a:schemeClr>
+        </a:solidFill>
+        <a:ln w="9525" cap="flat" cmpd="sng" algn="ctr">
+          <a:solidFill>
+            <a:schemeClr val="accent1">
+              <a:hueOff val="0"/>
+              <a:satOff val="0"/>
+              <a:lumOff val="0"/>
+              <a:alphaOff val="0"/>
+            </a:schemeClr>
+          </a:solidFill>
+          <a:prstDash val="solid"/>
+        </a:ln>
+        <a:effectLst/>
+      </dsp:spPr>
+      <dsp:style>
+        <a:lnRef idx="1">
+          <a:scrgbClr r="0" g="0" b="0"/>
+        </a:lnRef>
+        <a:fillRef idx="1">
+          <a:scrgbClr r="0" g="0" b="0"/>
+        </a:fillRef>
+        <a:effectRef idx="0">
+          <a:scrgbClr r="0" g="0" b="0"/>
+        </a:effectRef>
+        <a:fontRef idx="minor"/>
+      </dsp:style>
+      <dsp:txBody>
+        <a:bodyPr spcFirstLastPara="0" vert="horz" wrap="square" lIns="909615" tIns="102870" rIns="102870" bIns="102870" numCol="1" spcCol="1270" anchor="ctr" anchorCtr="0">
+          <a:noAutofit/>
+        </a:bodyPr>
+        <a:lstStyle/>
+        <a:p>
+          <a:pPr lvl="0" algn="l" defTabSz="1200150">
+            <a:lnSpc>
+              <a:spcPct val="90000"/>
+            </a:lnSpc>
+            <a:spcBef>
+              <a:spcPct val="0"/>
+            </a:spcBef>
+            <a:spcAft>
+              <a:spcPct val="35000"/>
+            </a:spcAft>
+          </a:pPr>
+          <a:r>
+            <a:rPr lang="zh-CN" altLang="en-US" sz="2700" kern="1200" dirty="0" smtClean="0"/>
+            <a:t>学校跨学科的选课机制的柔性与弹性</a:t>
+          </a:r>
+          <a:endParaRPr lang="en-US" sz="2700" kern="1200" dirty="0"/>
+        </a:p>
+      </dsp:txBody>
+      <dsp:txXfrm>
+        <a:off x="1966102" y="1591513"/>
+        <a:ext cx="4297394" cy="1342935"/>
+      </dsp:txXfrm>
+    </dsp:sp>
+    <dsp:sp modelId="{C5DEA8DE-AD3F-4F44-8692-CCFE07B537E3}">
+      <dsp:nvSpPr>
+        <dsp:cNvPr id="0" name=""/>
+        <dsp:cNvSpPr/>
+      </dsp:nvSpPr>
+      <dsp:spPr>
+        <a:xfrm>
+          <a:off x="2086640" y="1835428"/>
+          <a:ext cx="340863" cy="534294"/>
+        </a:xfrm>
+        <a:prstGeom prst="rect">
+          <a:avLst/>
+        </a:prstGeom>
+        <a:blipFill>
+          <a:blip xmlns:r="http://schemas.openxmlformats.org/officeDocument/2006/relationships" r:embed="rId2">
+            <a:extLst>
+              <a:ext uri="{28A0092B-C50C-407E-A947-70E740481C1C}">
+                <a14:useLocalDpi xmlns:a14="http://schemas.microsoft.com/office/drawing/2010/main" val="0"/>
+              </a:ext>
+            </a:extLst>
+          </a:blip>
+          <a:srcRect/>
+          <a:stretch>
+            <a:fillRect l="-25000" r="-25000"/>
+          </a:stretch>
+        </a:blipFill>
+        <a:ln>
+          <a:noFill/>
+        </a:ln>
+        <a:effectLst>
+          <a:outerShdw blurRad="40000" dist="23000" dir="5400000" rotWithShape="0">
+            <a:srgbClr val="000000">
+              <a:alpha val="35000"/>
+            </a:srgbClr>
+          </a:outerShdw>
+        </a:effectLst>
+      </dsp:spPr>
+      <dsp:style>
+        <a:lnRef idx="0">
+          <a:scrgbClr r="0" g="0" b="0"/>
+        </a:lnRef>
+        <a:fillRef idx="1">
+          <a:scrgbClr r="0" g="0" b="0"/>
+        </a:fillRef>
+        <a:effectRef idx="2">
+          <a:scrgbClr r="0" g="0" b="0"/>
+        </a:effectRef>
+        <a:fontRef idx="minor"/>
+      </dsp:style>
+    </dsp:sp>
+    <dsp:sp modelId="{529092B6-7633-C844-A519-E9542DCEDC2A}">
+      <dsp:nvSpPr>
+        <dsp:cNvPr id="0" name=""/>
+        <dsp:cNvSpPr/>
+      </dsp:nvSpPr>
+      <dsp:spPr>
+        <a:xfrm>
+          <a:off x="1966102" y="3088140"/>
+          <a:ext cx="4297394" cy="1342935"/>
+        </a:xfrm>
+        <a:prstGeom prst="rect">
+          <a:avLst/>
+        </a:prstGeom>
+        <a:solidFill>
+          <a:schemeClr val="lt1">
+            <a:alpha val="40000"/>
+            <a:hueOff val="0"/>
+            <a:satOff val="0"/>
+            <a:lumOff val="0"/>
+            <a:alphaOff val="0"/>
+          </a:schemeClr>
+        </a:solidFill>
+        <a:ln w="9525" cap="flat" cmpd="sng" algn="ctr">
+          <a:solidFill>
+            <a:schemeClr val="accent1">
+              <a:hueOff val="0"/>
+              <a:satOff val="0"/>
+              <a:lumOff val="0"/>
+              <a:alphaOff val="0"/>
+            </a:schemeClr>
+          </a:solidFill>
+          <a:prstDash val="solid"/>
+        </a:ln>
+        <a:effectLst/>
+      </dsp:spPr>
+      <dsp:style>
+        <a:lnRef idx="1">
+          <a:scrgbClr r="0" g="0" b="0"/>
+        </a:lnRef>
+        <a:fillRef idx="1">
+          <a:scrgbClr r="0" g="0" b="0"/>
+        </a:fillRef>
+        <a:effectRef idx="0">
+          <a:scrgbClr r="0" g="0" b="0"/>
+        </a:effectRef>
+        <a:fontRef idx="minor"/>
+      </dsp:style>
+      <dsp:txBody>
+        <a:bodyPr spcFirstLastPara="0" vert="horz" wrap="square" lIns="909615" tIns="102870" rIns="102870" bIns="102870" numCol="1" spcCol="1270" anchor="ctr" anchorCtr="0">
+          <a:noAutofit/>
+        </a:bodyPr>
+        <a:lstStyle/>
+        <a:p>
+          <a:pPr lvl="0" algn="l" defTabSz="1200150">
+            <a:lnSpc>
+              <a:spcPct val="90000"/>
+            </a:lnSpc>
+            <a:spcBef>
+              <a:spcPct val="0"/>
+            </a:spcBef>
+            <a:spcAft>
+              <a:spcPct val="35000"/>
+            </a:spcAft>
+          </a:pPr>
+          <a:r>
+            <a:rPr lang="zh-CN" altLang="en-US" sz="2700" kern="1200" dirty="0" smtClean="0"/>
+            <a:t>融合学生的活动来丰富</a:t>
+          </a:r>
+          <a:r>
+            <a:rPr lang="zh-CN" altLang="en-US" sz="2700" kern="1200" smtClean="0"/>
+            <a:t>学校整体的教学活动体验</a:t>
+          </a:r>
+          <a:endParaRPr lang="en-US" sz="2700" kern="1200" dirty="0"/>
+        </a:p>
+      </dsp:txBody>
+      <dsp:txXfrm>
+        <a:off x="1966102" y="3088140"/>
+        <a:ext cx="4297394" cy="1342935"/>
+      </dsp:txXfrm>
+    </dsp:sp>
+    <dsp:sp modelId="{16C6B715-6933-5F4F-836B-0FF525A37E30}">
+      <dsp:nvSpPr>
+        <dsp:cNvPr id="0" name=""/>
+        <dsp:cNvSpPr/>
+      </dsp:nvSpPr>
+      <dsp:spPr>
+        <a:xfrm>
+          <a:off x="2061409" y="3356781"/>
+          <a:ext cx="391326" cy="484842"/>
+        </a:xfrm>
+        <a:prstGeom prst="rect">
+          <a:avLst/>
+        </a:prstGeom>
+        <a:blipFill>
+          <a:blip xmlns:r="http://schemas.openxmlformats.org/officeDocument/2006/relationships" r:embed="rId3">
+            <a:extLst>
+              <a:ext uri="{28A0092B-C50C-407E-A947-70E740481C1C}">
+                <a14:useLocalDpi xmlns:a14="http://schemas.microsoft.com/office/drawing/2010/main" val="0"/>
+              </a:ext>
+            </a:extLst>
+          </a:blip>
+          <a:srcRect/>
+          <a:stretch>
+            <a:fillRect l="-25000" r="-25000"/>
+          </a:stretch>
+        </a:blipFill>
+        <a:ln>
+          <a:noFill/>
+        </a:ln>
+        <a:effectLst>
+          <a:outerShdw blurRad="40000" dist="23000" dir="5400000" rotWithShape="0">
+            <a:srgbClr val="000000">
+              <a:alpha val="35000"/>
+            </a:srgbClr>
+          </a:outerShdw>
+        </a:effectLst>
+      </dsp:spPr>
+      <dsp:style>
+        <a:lnRef idx="0">
+          <a:scrgbClr r="0" g="0" b="0"/>
+        </a:lnRef>
+        <a:fillRef idx="1">
+          <a:scrgbClr r="0" g="0" b="0"/>
+        </a:fillRef>
+        <a:effectRef idx="2">
+          <a:scrgbClr r="0" g="0" b="0"/>
+        </a:effectRef>
+        <a:fontRef idx="minor"/>
+      </dsp:style>
+    </dsp:sp>
   </dsp:spTree>
 </dsp:drawing>
 </file>
@@ -5254,6 +8554,201 @@
 </dgm:layoutDef>
 </file>
 
+<file path=ppt/diagrams/layout4.xml><?xml version="1.0" encoding="utf-8"?>
+<dgm:layoutDef xmlns:dgm="http://schemas.openxmlformats.org/drawingml/2006/diagram" xmlns:a="http://schemas.openxmlformats.org/drawingml/2006/main" uniqueId="urn:microsoft.com/office/officeart/2008/layout/PictureStrips">
+  <dgm:title val=""/>
+  <dgm:desc val=""/>
+  <dgm:catLst>
+    <dgm:cat type="list" pri="12500"/>
+    <dgm:cat type="picture" pri="13000"/>
+    <dgm:cat type="pictureconvert" pri="13000"/>
+  </dgm:catLst>
+  <dgm:sampData>
+    <dgm:dataModel>
+      <dgm:ptLst>
+        <dgm:pt modelId="0" type="doc"/>
+        <dgm:pt modelId="10">
+          <dgm:prSet phldr="1"/>
+        </dgm:pt>
+        <dgm:pt modelId="20">
+          <dgm:prSet phldr="1"/>
+        </dgm:pt>
+        <dgm:pt modelId="30">
+          <dgm:prSet phldr="1"/>
+        </dgm:pt>
+      </dgm:ptLst>
+      <dgm:cxnLst>
+        <dgm:cxn modelId="40" srcId="0" destId="10" srcOrd="0" destOrd="0"/>
+        <dgm:cxn modelId="50" srcId="0" destId="20" srcOrd="1" destOrd="0"/>
+        <dgm:cxn modelId="60" srcId="0" destId="30" srcOrd="2" destOrd="0"/>
+      </dgm:cxnLst>
+      <dgm:bg/>
+      <dgm:whole/>
+    </dgm:dataModel>
+  </dgm:sampData>
+  <dgm:styleData>
+    <dgm:dataModel>
+      <dgm:ptLst>
+        <dgm:pt modelId="0" type="doc"/>
+        <dgm:pt modelId="10">
+          <dgm:prSet phldr="1"/>
+        </dgm:pt>
+        <dgm:pt modelId="20">
+          <dgm:prSet phldr="1"/>
+        </dgm:pt>
+      </dgm:ptLst>
+      <dgm:cxnLst>
+        <dgm:cxn modelId="40" srcId="0" destId="10" srcOrd="0" destOrd="0"/>
+        <dgm:cxn modelId="50" srcId="0" destId="20" srcOrd="1" destOrd="0"/>
+      </dgm:cxnLst>
+      <dgm:bg/>
+      <dgm:whole/>
+    </dgm:dataModel>
+  </dgm:styleData>
+  <dgm:clrData>
+    <dgm:dataModel>
+      <dgm:ptLst>
+        <dgm:pt modelId="0" type="doc"/>
+        <dgm:pt modelId="10">
+          <dgm:prSet phldr="1"/>
+        </dgm:pt>
+        <dgm:pt modelId="20">
+          <dgm:prSet phldr="1"/>
+        </dgm:pt>
+        <dgm:pt modelId="30">
+          <dgm:prSet phldr="1"/>
+        </dgm:pt>
+        <dgm:pt modelId="40">
+          <dgm:prSet phldr="1"/>
+        </dgm:pt>
+      </dgm:ptLst>
+      <dgm:cxnLst>
+        <dgm:cxn modelId="40" srcId="0" destId="10" srcOrd="0" destOrd="0"/>
+        <dgm:cxn modelId="50" srcId="0" destId="20" srcOrd="1" destOrd="0"/>
+        <dgm:cxn modelId="60" srcId="0" destId="30" srcOrd="2" destOrd="0"/>
+        <dgm:cxn modelId="70" srcId="0" destId="40" srcOrd="2" destOrd="0"/>
+      </dgm:cxnLst>
+      <dgm:bg/>
+      <dgm:whole/>
+    </dgm:dataModel>
+  </dgm:clrData>
+  <dgm:layoutNode name="Name0">
+    <dgm:varLst>
+      <dgm:dir/>
+      <dgm:resizeHandles val="exact"/>
+    </dgm:varLst>
+    <dgm:choose name="Name1">
+      <dgm:if name="Name2" func="var" arg="dir" op="equ" val="norm">
+        <dgm:alg type="snake">
+          <dgm:param type="off" val="ctr"/>
+        </dgm:alg>
+      </dgm:if>
+      <dgm:else name="Name3">
+        <dgm:alg type="snake">
+          <dgm:param type="off" val="ctr"/>
+          <dgm:param type="grDir" val="tR"/>
+        </dgm:alg>
+      </dgm:else>
+    </dgm:choose>
+    <dgm:shape xmlns:r="http://schemas.openxmlformats.org/officeDocument/2006/relationships" r:blip="">
+      <dgm:adjLst/>
+    </dgm:shape>
+    <dgm:constrLst>
+      <dgm:constr type="primFontSz" for="des" ptType="node" op="equ" val="65"/>
+      <dgm:constr type="w" for="ch" forName="composite" refType="w"/>
+      <dgm:constr type="h" for="ch" forName="composite" refType="h"/>
+      <dgm:constr type="sp" refType="h" refFor="ch" refForName="composite" op="equ" fact="0.1"/>
+      <dgm:constr type="h" for="ch" forName="sibTrans" refType="h" refFor="ch" refForName="composite" op="equ" fact="0.1"/>
+      <dgm:constr type="w" for="ch" forName="sibTrans" refType="h" refFor="ch" refForName="sibTrans" op="equ"/>
+    </dgm:constrLst>
+    <dgm:forEach name="nodesForEach" axis="ch" ptType="node">
+      <dgm:layoutNode name="composite">
+        <dgm:alg type="composite">
+          <dgm:param type="ar" val="3"/>
+        </dgm:alg>
+        <dgm:shape xmlns:r="http://schemas.openxmlformats.org/officeDocument/2006/relationships" r:blip="">
+          <dgm:adjLst/>
+        </dgm:shape>
+        <dgm:choose name="Name4">
+          <dgm:if name="Name5" func="var" arg="dir" op="equ" val="norm">
+            <dgm:constrLst>
+              <dgm:constr type="l" for="ch" forName="rect1" refType="w" fact="0.04"/>
+              <dgm:constr type="t" for="ch" forName="rect1" refType="h" fact="0.13"/>
+              <dgm:constr type="w" for="ch" forName="rect1" refType="w" fact="0.96"/>
+              <dgm:constr type="h" for="ch" forName="rect1" refType="h" fact="0.9"/>
+              <dgm:constr type="l" for="ch" forName="rect2" refType="w" fact="0"/>
+              <dgm:constr type="t" for="ch" forName="rect2" refType="h" fact="0"/>
+              <dgm:constr type="w" for="ch" forName="rect2" refType="w" fact="0.21"/>
+              <dgm:constr type="h" for="ch" forName="rect2" refType="w" fact="0.315"/>
+            </dgm:constrLst>
+          </dgm:if>
+          <dgm:else name="Name6">
+            <dgm:constrLst>
+              <dgm:constr type="l" for="ch" forName="rect1" refType="w" fact="0"/>
+              <dgm:constr type="t" for="ch" forName="rect1" refType="h" fact="0.13"/>
+              <dgm:constr type="w" for="ch" forName="rect1" refType="w" fact="0.96"/>
+              <dgm:constr type="h" for="ch" forName="rect1" refType="h" fact="0.9"/>
+              <dgm:constr type="l" for="ch" forName="rect2" refType="w" fact="0.79"/>
+              <dgm:constr type="t" for="ch" forName="rect2" refType="h" fact="0"/>
+              <dgm:constr type="w" for="ch" forName="rect2" refType="w" fact="0.21"/>
+              <dgm:constr type="h" for="ch" forName="rect2" refType="w" fact="0.315"/>
+            </dgm:constrLst>
+          </dgm:else>
+        </dgm:choose>
+        <dgm:layoutNode name="rect1" styleLbl="trAlignAcc1">
+          <dgm:varLst>
+            <dgm:bulletEnabled val="1"/>
+          </dgm:varLst>
+          <dgm:alg type="tx">
+            <dgm:param type="parTxLTRAlign" val="l"/>
+          </dgm:alg>
+          <dgm:shape xmlns:r="http://schemas.openxmlformats.org/officeDocument/2006/relationships" type="rect" r:blip="">
+            <dgm:adjLst/>
+          </dgm:shape>
+          <dgm:presOf axis="desOrSelf" ptType="node"/>
+          <dgm:choose name="Name7">
+            <dgm:if name="Name8" func="var" arg="dir" op="equ" val="norm">
+              <dgm:constrLst>
+                <dgm:constr type="lMarg" refType="w" fact="0.6"/>
+                <dgm:constr type="rMarg" refType="primFontSz" fact="0.3"/>
+                <dgm:constr type="tMarg" refType="primFontSz" fact="0.3"/>
+                <dgm:constr type="bMarg" refType="primFontSz" fact="0.3"/>
+              </dgm:constrLst>
+            </dgm:if>
+            <dgm:else name="Name9">
+              <dgm:constrLst>
+                <dgm:constr type="lMarg" refType="primFontSz" fact="0.3"/>
+                <dgm:constr type="rMarg" refType="w" fact="0.6"/>
+                <dgm:constr type="tMarg" refType="primFontSz" fact="0.3"/>
+                <dgm:constr type="bMarg" refType="primFontSz" fact="0.3"/>
+              </dgm:constrLst>
+            </dgm:else>
+          </dgm:choose>
+          <dgm:ruleLst>
+            <dgm:rule type="primFontSz" val="5" fact="NaN" max="NaN"/>
+          </dgm:ruleLst>
+        </dgm:layoutNode>
+        <dgm:layoutNode name="rect2" styleLbl="fgImgPlace1">
+          <dgm:alg type="sp"/>
+          <dgm:shape xmlns:r="http://schemas.openxmlformats.org/officeDocument/2006/relationships" type="rect" r:blip="" blipPhldr="1">
+            <dgm:adjLst/>
+          </dgm:shape>
+          <dgm:presOf/>
+        </dgm:layoutNode>
+      </dgm:layoutNode>
+      <dgm:forEach name="sibTransForEach" axis="followSib" ptType="sibTrans" cnt="1">
+        <dgm:layoutNode name="sibTrans">
+          <dgm:alg type="sp"/>
+          <dgm:shape xmlns:r="http://schemas.openxmlformats.org/officeDocument/2006/relationships" r:blip="">
+            <dgm:adjLst/>
+          </dgm:shape>
+        </dgm:layoutNode>
+      </dgm:forEach>
+    </dgm:forEach>
+  </dgm:layoutNode>
+</dgm:layoutDef>
+</file>
+
 <file path=ppt/diagrams/quickStyle1.xml><?xml version="1.0" encoding="utf-8"?>
 <dgm:styleDef xmlns:dgm="http://schemas.openxmlformats.org/drawingml/2006/diagram" xmlns:a="http://schemas.openxmlformats.org/drawingml/2006/main" uniqueId="urn:microsoft.com/office/officeart/2005/8/quickstyle/simple1">
   <dgm:title val=""/>
@@ -7323,6 +10818,1040 @@
 </file>
 
 <file path=ppt/diagrams/quickStyle3.xml><?xml version="1.0" encoding="utf-8"?>
+<dgm:styleDef xmlns:dgm="http://schemas.openxmlformats.org/drawingml/2006/diagram" xmlns:a="http://schemas.openxmlformats.org/drawingml/2006/main" uniqueId="urn:microsoft.com/office/officeart/2005/8/quickstyle/simple4">
+  <dgm:title val=""/>
+  <dgm:desc val=""/>
+  <dgm:catLst>
+    <dgm:cat type="simple" pri="10400"/>
+  </dgm:catLst>
+  <dgm:scene3d>
+    <a:camera prst="orthographicFront"/>
+    <a:lightRig rig="threePt" dir="t"/>
+  </dgm:scene3d>
+  <dgm:styleLbl name="node0">
+    <dgm:scene3d>
+      <a:camera prst="orthographicFront"/>
+      <a:lightRig rig="threePt" dir="t"/>
+    </dgm:scene3d>
+    <dgm:sp3d/>
+    <dgm:txPr/>
+    <dgm:style>
+      <a:lnRef idx="0">
+        <a:scrgbClr r="0" g="0" b="0"/>
+      </a:lnRef>
+      <a:fillRef idx="3">
+        <a:scrgbClr r="0" g="0" b="0"/>
+      </a:fillRef>
+      <a:effectRef idx="2">
+        <a:scrgbClr r="0" g="0" b="0"/>
+      </a:effectRef>
+      <a:fontRef idx="minor">
+        <a:schemeClr val="lt1"/>
+      </a:fontRef>
+    </dgm:style>
+  </dgm:styleLbl>
+  <dgm:styleLbl name="lnNode1">
+    <dgm:scene3d>
+      <a:camera prst="orthographicFront"/>
+      <a:lightRig rig="threePt" dir="t"/>
+    </dgm:scene3d>
+    <dgm:sp3d/>
+    <dgm:txPr/>
+    <dgm:style>
+      <a:lnRef idx="1">
+        <a:scrgbClr r="0" g="0" b="0"/>
+      </a:lnRef>
+      <a:fillRef idx="3">
+        <a:scrgbClr r="0" g="0" b="0"/>
+      </a:fillRef>
+      <a:effectRef idx="2">
+        <a:scrgbClr r="0" g="0" b="0"/>
+      </a:effectRef>
+      <a:fontRef idx="minor">
+        <a:schemeClr val="lt1"/>
+      </a:fontRef>
+    </dgm:style>
+  </dgm:styleLbl>
+  <dgm:styleLbl name="vennNode1">
+    <dgm:scene3d>
+      <a:camera prst="orthographicFront"/>
+      <a:lightRig rig="threePt" dir="t"/>
+    </dgm:scene3d>
+    <dgm:sp3d/>
+    <dgm:txPr/>
+    <dgm:style>
+      <a:lnRef idx="0">
+        <a:scrgbClr r="0" g="0" b="0"/>
+      </a:lnRef>
+      <a:fillRef idx="3">
+        <a:scrgbClr r="0" g="0" b="0"/>
+      </a:fillRef>
+      <a:effectRef idx="0">
+        <a:scrgbClr r="0" g="0" b="0"/>
+      </a:effectRef>
+      <a:fontRef idx="minor">
+        <a:schemeClr val="tx1"/>
+      </a:fontRef>
+    </dgm:style>
+  </dgm:styleLbl>
+  <dgm:styleLbl name="alignNode1">
+    <dgm:scene3d>
+      <a:camera prst="orthographicFront"/>
+      <a:lightRig rig="threePt" dir="t"/>
+    </dgm:scene3d>
+    <dgm:sp3d/>
+    <dgm:txPr/>
+    <dgm:style>
+      <a:lnRef idx="1">
+        <a:scrgbClr r="0" g="0" b="0"/>
+      </a:lnRef>
+      <a:fillRef idx="3">
+        <a:scrgbClr r="0" g="0" b="0"/>
+      </a:fillRef>
+      <a:effectRef idx="2">
+        <a:scrgbClr r="0" g="0" b="0"/>
+      </a:effectRef>
+      <a:fontRef idx="minor">
+        <a:schemeClr val="lt1"/>
+      </a:fontRef>
+    </dgm:style>
+  </dgm:styleLbl>
+  <dgm:styleLbl name="node1">
+    <dgm:scene3d>
+      <a:camera prst="orthographicFront"/>
+      <a:lightRig rig="threePt" dir="t"/>
+    </dgm:scene3d>
+    <dgm:sp3d/>
+    <dgm:txPr/>
+    <dgm:style>
+      <a:lnRef idx="0">
+        <a:scrgbClr r="0" g="0" b="0"/>
+      </a:lnRef>
+      <a:fillRef idx="3">
+        <a:scrgbClr r="0" g="0" b="0"/>
+      </a:fillRef>
+      <a:effectRef idx="2">
+        <a:scrgbClr r="0" g="0" b="0"/>
+      </a:effectRef>
+      <a:fontRef idx="minor">
+        <a:schemeClr val="lt1"/>
+      </a:fontRef>
+    </dgm:style>
+  </dgm:styleLbl>
+  <dgm:styleLbl name="node2">
+    <dgm:scene3d>
+      <a:camera prst="orthographicFront"/>
+      <a:lightRig rig="threePt" dir="t"/>
+    </dgm:scene3d>
+    <dgm:sp3d/>
+    <dgm:txPr/>
+    <dgm:style>
+      <a:lnRef idx="0">
+        <a:scrgbClr r="0" g="0" b="0"/>
+      </a:lnRef>
+      <a:fillRef idx="3">
+        <a:scrgbClr r="0" g="0" b="0"/>
+      </a:fillRef>
+      <a:effectRef idx="2">
+        <a:scrgbClr r="0" g="0" b="0"/>
+      </a:effectRef>
+      <a:fontRef idx="minor">
+        <a:schemeClr val="lt1"/>
+      </a:fontRef>
+    </dgm:style>
+  </dgm:styleLbl>
+  <dgm:styleLbl name="node3">
+    <dgm:scene3d>
+      <a:camera prst="orthographicFront"/>
+      <a:lightRig rig="threePt" dir="t"/>
+    </dgm:scene3d>
+    <dgm:sp3d/>
+    <dgm:txPr/>
+    <dgm:style>
+      <a:lnRef idx="0">
+        <a:scrgbClr r="0" g="0" b="0"/>
+      </a:lnRef>
+      <a:fillRef idx="3">
+        <a:scrgbClr r="0" g="0" b="0"/>
+      </a:fillRef>
+      <a:effectRef idx="2">
+        <a:scrgbClr r="0" g="0" b="0"/>
+      </a:effectRef>
+      <a:fontRef idx="minor">
+        <a:schemeClr val="lt1"/>
+      </a:fontRef>
+    </dgm:style>
+  </dgm:styleLbl>
+  <dgm:styleLbl name="node4">
+    <dgm:scene3d>
+      <a:camera prst="orthographicFront"/>
+      <a:lightRig rig="threePt" dir="t"/>
+    </dgm:scene3d>
+    <dgm:sp3d/>
+    <dgm:txPr/>
+    <dgm:style>
+      <a:lnRef idx="0">
+        <a:scrgbClr r="0" g="0" b="0"/>
+      </a:lnRef>
+      <a:fillRef idx="3">
+        <a:scrgbClr r="0" g="0" b="0"/>
+      </a:fillRef>
+      <a:effectRef idx="2">
+        <a:scrgbClr r="0" g="0" b="0"/>
+      </a:effectRef>
+      <a:fontRef idx="minor">
+        <a:schemeClr val="lt1"/>
+      </a:fontRef>
+    </dgm:style>
+  </dgm:styleLbl>
+  <dgm:styleLbl name="fgImgPlace1">
+    <dgm:scene3d>
+      <a:camera prst="orthographicFront"/>
+      <a:lightRig rig="threePt" dir="t"/>
+    </dgm:scene3d>
+    <dgm:sp3d/>
+    <dgm:txPr/>
+    <dgm:style>
+      <a:lnRef idx="0">
+        <a:scrgbClr r="0" g="0" b="0"/>
+      </a:lnRef>
+      <a:fillRef idx="1">
+        <a:scrgbClr r="0" g="0" b="0"/>
+      </a:fillRef>
+      <a:effectRef idx="2">
+        <a:scrgbClr r="0" g="0" b="0"/>
+      </a:effectRef>
+      <a:fontRef idx="minor"/>
+    </dgm:style>
+  </dgm:styleLbl>
+  <dgm:styleLbl name="alignImgPlace1">
+    <dgm:scene3d>
+      <a:camera prst="orthographicFront"/>
+      <a:lightRig rig="threePt" dir="t"/>
+    </dgm:scene3d>
+    <dgm:sp3d/>
+    <dgm:txPr/>
+    <dgm:style>
+      <a:lnRef idx="0">
+        <a:scrgbClr r="0" g="0" b="0"/>
+      </a:lnRef>
+      <a:fillRef idx="1">
+        <a:scrgbClr r="0" g="0" b="0"/>
+      </a:fillRef>
+      <a:effectRef idx="2">
+        <a:scrgbClr r="0" g="0" b="0"/>
+      </a:effectRef>
+      <a:fontRef idx="minor"/>
+    </dgm:style>
+  </dgm:styleLbl>
+  <dgm:styleLbl name="bgImgPlace1">
+    <dgm:scene3d>
+      <a:camera prst="orthographicFront"/>
+      <a:lightRig rig="threePt" dir="t"/>
+    </dgm:scene3d>
+    <dgm:sp3d/>
+    <dgm:txPr/>
+    <dgm:style>
+      <a:lnRef idx="0">
+        <a:scrgbClr r="0" g="0" b="0"/>
+      </a:lnRef>
+      <a:fillRef idx="1">
+        <a:scrgbClr r="0" g="0" b="0"/>
+      </a:fillRef>
+      <a:effectRef idx="2">
+        <a:scrgbClr r="0" g="0" b="0"/>
+      </a:effectRef>
+      <a:fontRef idx="minor"/>
+    </dgm:style>
+  </dgm:styleLbl>
+  <dgm:styleLbl name="sibTrans2D1">
+    <dgm:scene3d>
+      <a:camera prst="orthographicFront"/>
+      <a:lightRig rig="threePt" dir="t"/>
+    </dgm:scene3d>
+    <dgm:sp3d/>
+    <dgm:txPr/>
+    <dgm:style>
+      <a:lnRef idx="0">
+        <a:scrgbClr r="0" g="0" b="0"/>
+      </a:lnRef>
+      <a:fillRef idx="3">
+        <a:scrgbClr r="0" g="0" b="0"/>
+      </a:fillRef>
+      <a:effectRef idx="2">
+        <a:scrgbClr r="0" g="0" b="0"/>
+      </a:effectRef>
+      <a:fontRef idx="minor">
+        <a:schemeClr val="lt1"/>
+      </a:fontRef>
+    </dgm:style>
+  </dgm:styleLbl>
+  <dgm:styleLbl name="fgSibTrans2D1">
+    <dgm:scene3d>
+      <a:camera prst="orthographicFront"/>
+      <a:lightRig rig="threePt" dir="t"/>
+    </dgm:scene3d>
+    <dgm:sp3d/>
+    <dgm:txPr/>
+    <dgm:style>
+      <a:lnRef idx="0">
+        <a:scrgbClr r="0" g="0" b="0"/>
+      </a:lnRef>
+      <a:fillRef idx="3">
+        <a:scrgbClr r="0" g="0" b="0"/>
+      </a:fillRef>
+      <a:effectRef idx="2">
+        <a:scrgbClr r="0" g="0" b="0"/>
+      </a:effectRef>
+      <a:fontRef idx="minor">
+        <a:schemeClr val="lt1"/>
+      </a:fontRef>
+    </dgm:style>
+  </dgm:styleLbl>
+  <dgm:styleLbl name="bgSibTrans2D1">
+    <dgm:scene3d>
+      <a:camera prst="orthographicFront"/>
+      <a:lightRig rig="threePt" dir="t"/>
+    </dgm:scene3d>
+    <dgm:sp3d/>
+    <dgm:txPr/>
+    <dgm:style>
+      <a:lnRef idx="0">
+        <a:scrgbClr r="0" g="0" b="0"/>
+      </a:lnRef>
+      <a:fillRef idx="3">
+        <a:scrgbClr r="0" g="0" b="0"/>
+      </a:fillRef>
+      <a:effectRef idx="2">
+        <a:scrgbClr r="0" g="0" b="0"/>
+      </a:effectRef>
+      <a:fontRef idx="minor">
+        <a:schemeClr val="lt1"/>
+      </a:fontRef>
+    </dgm:style>
+  </dgm:styleLbl>
+  <dgm:styleLbl name="sibTrans1D1">
+    <dgm:scene3d>
+      <a:camera prst="orthographicFront"/>
+      <a:lightRig rig="threePt" dir="t"/>
+    </dgm:scene3d>
+    <dgm:sp3d/>
+    <dgm:txPr/>
+    <dgm:style>
+      <a:lnRef idx="1">
+        <a:scrgbClr r="0" g="0" b="0"/>
+      </a:lnRef>
+      <a:fillRef idx="0">
+        <a:scrgbClr r="0" g="0" b="0"/>
+      </a:fillRef>
+      <a:effectRef idx="0">
+        <a:scrgbClr r="0" g="0" b="0"/>
+      </a:effectRef>
+      <a:fontRef idx="minor"/>
+    </dgm:style>
+  </dgm:styleLbl>
+  <dgm:styleLbl name="callout">
+    <dgm:scene3d>
+      <a:camera prst="orthographicFront"/>
+      <a:lightRig rig="threePt" dir="t"/>
+    </dgm:scene3d>
+    <dgm:sp3d/>
+    <dgm:txPr/>
+    <dgm:style>
+      <a:lnRef idx="2">
+        <a:scrgbClr r="0" g="0" b="0"/>
+      </a:lnRef>
+      <a:fillRef idx="1">
+        <a:scrgbClr r="0" g="0" b="0"/>
+      </a:fillRef>
+      <a:effectRef idx="1">
+        <a:scrgbClr r="0" g="0" b="0"/>
+      </a:effectRef>
+      <a:fontRef idx="minor"/>
+    </dgm:style>
+  </dgm:styleLbl>
+  <dgm:styleLbl name="asst0">
+    <dgm:scene3d>
+      <a:camera prst="orthographicFront"/>
+      <a:lightRig rig="threePt" dir="t"/>
+    </dgm:scene3d>
+    <dgm:sp3d/>
+    <dgm:txPr/>
+    <dgm:style>
+      <a:lnRef idx="0">
+        <a:scrgbClr r="0" g="0" b="0"/>
+      </a:lnRef>
+      <a:fillRef idx="3">
+        <a:scrgbClr r="0" g="0" b="0"/>
+      </a:fillRef>
+      <a:effectRef idx="2">
+        <a:scrgbClr r="0" g="0" b="0"/>
+      </a:effectRef>
+      <a:fontRef idx="minor">
+        <a:schemeClr val="lt1"/>
+      </a:fontRef>
+    </dgm:style>
+  </dgm:styleLbl>
+  <dgm:styleLbl name="asst1">
+    <dgm:scene3d>
+      <a:camera prst="orthographicFront"/>
+      <a:lightRig rig="threePt" dir="t"/>
+    </dgm:scene3d>
+    <dgm:sp3d/>
+    <dgm:txPr/>
+    <dgm:style>
+      <a:lnRef idx="0">
+        <a:scrgbClr r="0" g="0" b="0"/>
+      </a:lnRef>
+      <a:fillRef idx="3">
+        <a:scrgbClr r="0" g="0" b="0"/>
+      </a:fillRef>
+      <a:effectRef idx="2">
+        <a:scrgbClr r="0" g="0" b="0"/>
+      </a:effectRef>
+      <a:fontRef idx="minor">
+        <a:schemeClr val="lt1"/>
+      </a:fontRef>
+    </dgm:style>
+  </dgm:styleLbl>
+  <dgm:styleLbl name="asst2">
+    <dgm:scene3d>
+      <a:camera prst="orthographicFront"/>
+      <a:lightRig rig="threePt" dir="t"/>
+    </dgm:scene3d>
+    <dgm:sp3d/>
+    <dgm:txPr/>
+    <dgm:style>
+      <a:lnRef idx="0">
+        <a:scrgbClr r="0" g="0" b="0"/>
+      </a:lnRef>
+      <a:fillRef idx="3">
+        <a:scrgbClr r="0" g="0" b="0"/>
+      </a:fillRef>
+      <a:effectRef idx="2">
+        <a:scrgbClr r="0" g="0" b="0"/>
+      </a:effectRef>
+      <a:fontRef idx="minor">
+        <a:schemeClr val="lt1"/>
+      </a:fontRef>
+    </dgm:style>
+  </dgm:styleLbl>
+  <dgm:styleLbl name="asst3">
+    <dgm:scene3d>
+      <a:camera prst="orthographicFront"/>
+      <a:lightRig rig="threePt" dir="t"/>
+    </dgm:scene3d>
+    <dgm:sp3d/>
+    <dgm:txPr/>
+    <dgm:style>
+      <a:lnRef idx="0">
+        <a:scrgbClr r="0" g="0" b="0"/>
+      </a:lnRef>
+      <a:fillRef idx="3">
+        <a:scrgbClr r="0" g="0" b="0"/>
+      </a:fillRef>
+      <a:effectRef idx="2">
+        <a:scrgbClr r="0" g="0" b="0"/>
+      </a:effectRef>
+      <a:fontRef idx="minor">
+        <a:schemeClr val="lt1"/>
+      </a:fontRef>
+    </dgm:style>
+  </dgm:styleLbl>
+  <dgm:styleLbl name="asst4">
+    <dgm:scene3d>
+      <a:camera prst="orthographicFront"/>
+      <a:lightRig rig="threePt" dir="t"/>
+    </dgm:scene3d>
+    <dgm:sp3d/>
+    <dgm:txPr/>
+    <dgm:style>
+      <a:lnRef idx="0">
+        <a:scrgbClr r="0" g="0" b="0"/>
+      </a:lnRef>
+      <a:fillRef idx="3">
+        <a:scrgbClr r="0" g="0" b="0"/>
+      </a:fillRef>
+      <a:effectRef idx="2">
+        <a:scrgbClr r="0" g="0" b="0"/>
+      </a:effectRef>
+      <a:fontRef idx="minor">
+        <a:schemeClr val="lt1"/>
+      </a:fontRef>
+    </dgm:style>
+  </dgm:styleLbl>
+  <dgm:styleLbl name="parChTrans2D1">
+    <dgm:scene3d>
+      <a:camera prst="orthographicFront"/>
+      <a:lightRig rig="threePt" dir="t"/>
+    </dgm:scene3d>
+    <dgm:sp3d/>
+    <dgm:txPr/>
+    <dgm:style>
+      <a:lnRef idx="0">
+        <a:scrgbClr r="0" g="0" b="0"/>
+      </a:lnRef>
+      <a:fillRef idx="3">
+        <a:scrgbClr r="0" g="0" b="0"/>
+      </a:fillRef>
+      <a:effectRef idx="2">
+        <a:scrgbClr r="0" g="0" b="0"/>
+      </a:effectRef>
+      <a:fontRef idx="minor">
+        <a:schemeClr val="lt1"/>
+      </a:fontRef>
+    </dgm:style>
+  </dgm:styleLbl>
+  <dgm:styleLbl name="parChTrans2D2">
+    <dgm:scene3d>
+      <a:camera prst="orthographicFront"/>
+      <a:lightRig rig="threePt" dir="t"/>
+    </dgm:scene3d>
+    <dgm:sp3d/>
+    <dgm:txPr/>
+    <dgm:style>
+      <a:lnRef idx="0">
+        <a:scrgbClr r="0" g="0" b="0"/>
+      </a:lnRef>
+      <a:fillRef idx="3">
+        <a:scrgbClr r="0" g="0" b="0"/>
+      </a:fillRef>
+      <a:effectRef idx="2">
+        <a:scrgbClr r="0" g="0" b="0"/>
+      </a:effectRef>
+      <a:fontRef idx="minor">
+        <a:schemeClr val="lt1"/>
+      </a:fontRef>
+    </dgm:style>
+  </dgm:styleLbl>
+  <dgm:styleLbl name="parChTrans2D3">
+    <dgm:scene3d>
+      <a:camera prst="orthographicFront"/>
+      <a:lightRig rig="threePt" dir="t"/>
+    </dgm:scene3d>
+    <dgm:sp3d/>
+    <dgm:txPr/>
+    <dgm:style>
+      <a:lnRef idx="1">
+        <a:scrgbClr r="0" g="0" b="0"/>
+      </a:lnRef>
+      <a:fillRef idx="3">
+        <a:scrgbClr r="0" g="0" b="0"/>
+      </a:fillRef>
+      <a:effectRef idx="2">
+        <a:scrgbClr r="0" g="0" b="0"/>
+      </a:effectRef>
+      <a:fontRef idx="minor">
+        <a:schemeClr val="lt1"/>
+      </a:fontRef>
+    </dgm:style>
+  </dgm:styleLbl>
+  <dgm:styleLbl name="parChTrans2D4">
+    <dgm:scene3d>
+      <a:camera prst="orthographicFront"/>
+      <a:lightRig rig="threePt" dir="t"/>
+    </dgm:scene3d>
+    <dgm:sp3d/>
+    <dgm:txPr/>
+    <dgm:style>
+      <a:lnRef idx="1">
+        <a:scrgbClr r="0" g="0" b="0"/>
+      </a:lnRef>
+      <a:fillRef idx="3">
+        <a:scrgbClr r="0" g="0" b="0"/>
+      </a:fillRef>
+      <a:effectRef idx="2">
+        <a:scrgbClr r="0" g="0" b="0"/>
+      </a:effectRef>
+      <a:fontRef idx="minor">
+        <a:schemeClr val="lt1"/>
+      </a:fontRef>
+    </dgm:style>
+  </dgm:styleLbl>
+  <dgm:styleLbl name="parChTrans1D1">
+    <dgm:scene3d>
+      <a:camera prst="orthographicFront"/>
+      <a:lightRig rig="threePt" dir="t"/>
+    </dgm:scene3d>
+    <dgm:sp3d/>
+    <dgm:txPr/>
+    <dgm:style>
+      <a:lnRef idx="1">
+        <a:scrgbClr r="0" g="0" b="0"/>
+      </a:lnRef>
+      <a:fillRef idx="0">
+        <a:scrgbClr r="0" g="0" b="0"/>
+      </a:fillRef>
+      <a:effectRef idx="0">
+        <a:scrgbClr r="0" g="0" b="0"/>
+      </a:effectRef>
+      <a:fontRef idx="minor"/>
+    </dgm:style>
+  </dgm:styleLbl>
+  <dgm:styleLbl name="parChTrans1D2">
+    <dgm:scene3d>
+      <a:camera prst="orthographicFront"/>
+      <a:lightRig rig="threePt" dir="t"/>
+    </dgm:scene3d>
+    <dgm:sp3d/>
+    <dgm:txPr/>
+    <dgm:style>
+      <a:lnRef idx="1">
+        <a:scrgbClr r="0" g="0" b="0"/>
+      </a:lnRef>
+      <a:fillRef idx="0">
+        <a:scrgbClr r="0" g="0" b="0"/>
+      </a:fillRef>
+      <a:effectRef idx="0">
+        <a:scrgbClr r="0" g="0" b="0"/>
+      </a:effectRef>
+      <a:fontRef idx="minor"/>
+    </dgm:style>
+  </dgm:styleLbl>
+  <dgm:styleLbl name="parChTrans1D3">
+    <dgm:scene3d>
+      <a:camera prst="orthographicFront"/>
+      <a:lightRig rig="threePt" dir="t"/>
+    </dgm:scene3d>
+    <dgm:sp3d/>
+    <dgm:txPr/>
+    <dgm:style>
+      <a:lnRef idx="1">
+        <a:scrgbClr r="0" g="0" b="0"/>
+      </a:lnRef>
+      <a:fillRef idx="0">
+        <a:scrgbClr r="0" g="0" b="0"/>
+      </a:fillRef>
+      <a:effectRef idx="0">
+        <a:scrgbClr r="0" g="0" b="0"/>
+      </a:effectRef>
+      <a:fontRef idx="minor"/>
+    </dgm:style>
+  </dgm:styleLbl>
+  <dgm:styleLbl name="parChTrans1D4">
+    <dgm:scene3d>
+      <a:camera prst="orthographicFront"/>
+      <a:lightRig rig="threePt" dir="t"/>
+    </dgm:scene3d>
+    <dgm:sp3d/>
+    <dgm:txPr/>
+    <dgm:style>
+      <a:lnRef idx="1">
+        <a:scrgbClr r="0" g="0" b="0"/>
+      </a:lnRef>
+      <a:fillRef idx="0">
+        <a:scrgbClr r="0" g="0" b="0"/>
+      </a:fillRef>
+      <a:effectRef idx="0">
+        <a:scrgbClr r="0" g="0" b="0"/>
+      </a:effectRef>
+      <a:fontRef idx="minor"/>
+    </dgm:style>
+  </dgm:styleLbl>
+  <dgm:styleLbl name="fgAcc1">
+    <dgm:scene3d>
+      <a:camera prst="orthographicFront"/>
+      <a:lightRig rig="threePt" dir="t"/>
+    </dgm:scene3d>
+    <dgm:sp3d/>
+    <dgm:txPr/>
+    <dgm:style>
+      <a:lnRef idx="1">
+        <a:scrgbClr r="0" g="0" b="0"/>
+      </a:lnRef>
+      <a:fillRef idx="1">
+        <a:scrgbClr r="0" g="0" b="0"/>
+      </a:fillRef>
+      <a:effectRef idx="0">
+        <a:scrgbClr r="0" g="0" b="0"/>
+      </a:effectRef>
+      <a:fontRef idx="minor"/>
+    </dgm:style>
+  </dgm:styleLbl>
+  <dgm:styleLbl name="conFgAcc1">
+    <dgm:scene3d>
+      <a:camera prst="orthographicFront"/>
+      <a:lightRig rig="threePt" dir="t"/>
+    </dgm:scene3d>
+    <dgm:sp3d/>
+    <dgm:txPr/>
+    <dgm:style>
+      <a:lnRef idx="1">
+        <a:scrgbClr r="0" g="0" b="0"/>
+      </a:lnRef>
+      <a:fillRef idx="1">
+        <a:scrgbClr r="0" g="0" b="0"/>
+      </a:fillRef>
+      <a:effectRef idx="0">
+        <a:scrgbClr r="0" g="0" b="0"/>
+      </a:effectRef>
+      <a:fontRef idx="minor"/>
+    </dgm:style>
+  </dgm:styleLbl>
+  <dgm:styleLbl name="alignAcc1">
+    <dgm:scene3d>
+      <a:camera prst="orthographicFront"/>
+      <a:lightRig rig="threePt" dir="t"/>
+    </dgm:scene3d>
+    <dgm:sp3d/>
+    <dgm:txPr/>
+    <dgm:style>
+      <a:lnRef idx="1">
+        <a:scrgbClr r="0" g="0" b="0"/>
+      </a:lnRef>
+      <a:fillRef idx="1">
+        <a:scrgbClr r="0" g="0" b="0"/>
+      </a:fillRef>
+      <a:effectRef idx="0">
+        <a:scrgbClr r="0" g="0" b="0"/>
+      </a:effectRef>
+      <a:fontRef idx="minor"/>
+    </dgm:style>
+  </dgm:styleLbl>
+  <dgm:styleLbl name="trAlignAcc1">
+    <dgm:scene3d>
+      <a:camera prst="orthographicFront"/>
+      <a:lightRig rig="threePt" dir="t"/>
+    </dgm:scene3d>
+    <dgm:sp3d/>
+    <dgm:txPr/>
+    <dgm:style>
+      <a:lnRef idx="1">
+        <a:scrgbClr r="0" g="0" b="0"/>
+      </a:lnRef>
+      <a:fillRef idx="1">
+        <a:scrgbClr r="0" g="0" b="0"/>
+      </a:fillRef>
+      <a:effectRef idx="0">
+        <a:scrgbClr r="0" g="0" b="0"/>
+      </a:effectRef>
+      <a:fontRef idx="minor"/>
+    </dgm:style>
+  </dgm:styleLbl>
+  <dgm:styleLbl name="bgAcc1">
+    <dgm:scene3d>
+      <a:camera prst="orthographicFront"/>
+      <a:lightRig rig="threePt" dir="t"/>
+    </dgm:scene3d>
+    <dgm:sp3d/>
+    <dgm:txPr/>
+    <dgm:style>
+      <a:lnRef idx="1">
+        <a:scrgbClr r="0" g="0" b="0"/>
+      </a:lnRef>
+      <a:fillRef idx="1">
+        <a:scrgbClr r="0" g="0" b="0"/>
+      </a:fillRef>
+      <a:effectRef idx="0">
+        <a:scrgbClr r="0" g="0" b="0"/>
+      </a:effectRef>
+      <a:fontRef idx="minor"/>
+    </dgm:style>
+  </dgm:styleLbl>
+  <dgm:styleLbl name="solidFgAcc1">
+    <dgm:scene3d>
+      <a:camera prst="orthographicFront"/>
+      <a:lightRig rig="threePt" dir="t"/>
+    </dgm:scene3d>
+    <dgm:sp3d/>
+    <dgm:txPr/>
+    <dgm:style>
+      <a:lnRef idx="1">
+        <a:scrgbClr r="0" g="0" b="0"/>
+      </a:lnRef>
+      <a:fillRef idx="1">
+        <a:scrgbClr r="0" g="0" b="0"/>
+      </a:fillRef>
+      <a:effectRef idx="0">
+        <a:scrgbClr r="0" g="0" b="0"/>
+      </a:effectRef>
+      <a:fontRef idx="minor"/>
+    </dgm:style>
+  </dgm:styleLbl>
+  <dgm:styleLbl name="solidAlignAcc1">
+    <dgm:scene3d>
+      <a:camera prst="orthographicFront"/>
+      <a:lightRig rig="threePt" dir="t"/>
+    </dgm:scene3d>
+    <dgm:sp3d/>
+    <dgm:txPr/>
+    <dgm:style>
+      <a:lnRef idx="1">
+        <a:scrgbClr r="0" g="0" b="0"/>
+      </a:lnRef>
+      <a:fillRef idx="1">
+        <a:scrgbClr r="0" g="0" b="0"/>
+      </a:fillRef>
+      <a:effectRef idx="0">
+        <a:scrgbClr r="0" g="0" b="0"/>
+      </a:effectRef>
+      <a:fontRef idx="minor"/>
+    </dgm:style>
+  </dgm:styleLbl>
+  <dgm:styleLbl name="solidBgAcc1">
+    <dgm:scene3d>
+      <a:camera prst="orthographicFront"/>
+      <a:lightRig rig="threePt" dir="t"/>
+    </dgm:scene3d>
+    <dgm:sp3d/>
+    <dgm:txPr/>
+    <dgm:style>
+      <a:lnRef idx="1">
+        <a:scrgbClr r="0" g="0" b="0"/>
+      </a:lnRef>
+      <a:fillRef idx="1">
+        <a:scrgbClr r="0" g="0" b="0"/>
+      </a:fillRef>
+      <a:effectRef idx="0">
+        <a:scrgbClr r="0" g="0" b="0"/>
+      </a:effectRef>
+      <a:fontRef idx="minor"/>
+    </dgm:style>
+  </dgm:styleLbl>
+  <dgm:styleLbl name="fgAccFollowNode1">
+    <dgm:scene3d>
+      <a:camera prst="orthographicFront"/>
+      <a:lightRig rig="threePt" dir="t"/>
+    </dgm:scene3d>
+    <dgm:sp3d/>
+    <dgm:txPr/>
+    <dgm:style>
+      <a:lnRef idx="1">
+        <a:scrgbClr r="0" g="0" b="0"/>
+      </a:lnRef>
+      <a:fillRef idx="1">
+        <a:scrgbClr r="0" g="0" b="0"/>
+      </a:fillRef>
+      <a:effectRef idx="0">
+        <a:scrgbClr r="0" g="0" b="0"/>
+      </a:effectRef>
+      <a:fontRef idx="minor"/>
+    </dgm:style>
+  </dgm:styleLbl>
+  <dgm:styleLbl name="alignAccFollowNode1">
+    <dgm:scene3d>
+      <a:camera prst="orthographicFront"/>
+      <a:lightRig rig="threePt" dir="t"/>
+    </dgm:scene3d>
+    <dgm:sp3d/>
+    <dgm:txPr/>
+    <dgm:style>
+      <a:lnRef idx="1">
+        <a:scrgbClr r="0" g="0" b="0"/>
+      </a:lnRef>
+      <a:fillRef idx="1">
+        <a:scrgbClr r="0" g="0" b="0"/>
+      </a:fillRef>
+      <a:effectRef idx="0">
+        <a:scrgbClr r="0" g="0" b="0"/>
+      </a:effectRef>
+      <a:fontRef idx="minor"/>
+    </dgm:style>
+  </dgm:styleLbl>
+  <dgm:styleLbl name="bgAccFollowNode1">
+    <dgm:scene3d>
+      <a:camera prst="orthographicFront"/>
+      <a:lightRig rig="threePt" dir="t"/>
+    </dgm:scene3d>
+    <dgm:sp3d/>
+    <dgm:txPr/>
+    <dgm:style>
+      <a:lnRef idx="1">
+        <a:scrgbClr r="0" g="0" b="0"/>
+      </a:lnRef>
+      <a:fillRef idx="1">
+        <a:scrgbClr r="0" g="0" b="0"/>
+      </a:fillRef>
+      <a:effectRef idx="0">
+        <a:scrgbClr r="0" g="0" b="0"/>
+      </a:effectRef>
+      <a:fontRef idx="minor"/>
+    </dgm:style>
+  </dgm:styleLbl>
+  <dgm:styleLbl name="fgAcc0">
+    <dgm:scene3d>
+      <a:camera prst="orthographicFront"/>
+      <a:lightRig rig="threePt" dir="t"/>
+    </dgm:scene3d>
+    <dgm:sp3d/>
+    <dgm:txPr/>
+    <dgm:style>
+      <a:lnRef idx="1">
+        <a:scrgbClr r="0" g="0" b="0"/>
+      </a:lnRef>
+      <a:fillRef idx="1">
+        <a:scrgbClr r="0" g="0" b="0"/>
+      </a:fillRef>
+      <a:effectRef idx="0">
+        <a:scrgbClr r="0" g="0" b="0"/>
+      </a:effectRef>
+      <a:fontRef idx="minor"/>
+    </dgm:style>
+  </dgm:styleLbl>
+  <dgm:styleLbl name="fgAcc2">
+    <dgm:scene3d>
+      <a:camera prst="orthographicFront"/>
+      <a:lightRig rig="threePt" dir="t"/>
+    </dgm:scene3d>
+    <dgm:sp3d/>
+    <dgm:txPr/>
+    <dgm:style>
+      <a:lnRef idx="1">
+        <a:scrgbClr r="0" g="0" b="0"/>
+      </a:lnRef>
+      <a:fillRef idx="1">
+        <a:scrgbClr r="0" g="0" b="0"/>
+      </a:fillRef>
+      <a:effectRef idx="0">
+        <a:scrgbClr r="0" g="0" b="0"/>
+      </a:effectRef>
+      <a:fontRef idx="minor"/>
+    </dgm:style>
+  </dgm:styleLbl>
+  <dgm:styleLbl name="fgAcc3">
+    <dgm:scene3d>
+      <a:camera prst="orthographicFront"/>
+      <a:lightRig rig="threePt" dir="t"/>
+    </dgm:scene3d>
+    <dgm:sp3d/>
+    <dgm:txPr/>
+    <dgm:style>
+      <a:lnRef idx="1">
+        <a:scrgbClr r="0" g="0" b="0"/>
+      </a:lnRef>
+      <a:fillRef idx="1">
+        <a:scrgbClr r="0" g="0" b="0"/>
+      </a:fillRef>
+      <a:effectRef idx="0">
+        <a:scrgbClr r="0" g="0" b="0"/>
+      </a:effectRef>
+      <a:fontRef idx="minor"/>
+    </dgm:style>
+  </dgm:styleLbl>
+  <dgm:styleLbl name="fgAcc4">
+    <dgm:scene3d>
+      <a:camera prst="orthographicFront"/>
+      <a:lightRig rig="threePt" dir="t"/>
+    </dgm:scene3d>
+    <dgm:sp3d/>
+    <dgm:txPr/>
+    <dgm:style>
+      <a:lnRef idx="1">
+        <a:scrgbClr r="0" g="0" b="0"/>
+      </a:lnRef>
+      <a:fillRef idx="1">
+        <a:scrgbClr r="0" g="0" b="0"/>
+      </a:fillRef>
+      <a:effectRef idx="0">
+        <a:scrgbClr r="0" g="0" b="0"/>
+      </a:effectRef>
+      <a:fontRef idx="minor"/>
+    </dgm:style>
+  </dgm:styleLbl>
+  <dgm:styleLbl name="bgShp">
+    <dgm:scene3d>
+      <a:camera prst="orthographicFront"/>
+      <a:lightRig rig="threePt" dir="t"/>
+    </dgm:scene3d>
+    <dgm:sp3d/>
+    <dgm:txPr/>
+    <dgm:style>
+      <a:lnRef idx="0">
+        <a:scrgbClr r="0" g="0" b="0"/>
+      </a:lnRef>
+      <a:fillRef idx="1">
+        <a:scrgbClr r="0" g="0" b="0"/>
+      </a:fillRef>
+      <a:effectRef idx="2">
+        <a:scrgbClr r="0" g="0" b="0"/>
+      </a:effectRef>
+      <a:fontRef idx="minor"/>
+    </dgm:style>
+  </dgm:styleLbl>
+  <dgm:styleLbl name="dkBgShp">
+    <dgm:scene3d>
+      <a:camera prst="orthographicFront"/>
+      <a:lightRig rig="threePt" dir="t"/>
+    </dgm:scene3d>
+    <dgm:sp3d/>
+    <dgm:txPr/>
+    <dgm:style>
+      <a:lnRef idx="0">
+        <a:scrgbClr r="0" g="0" b="0"/>
+      </a:lnRef>
+      <a:fillRef idx="1">
+        <a:scrgbClr r="0" g="0" b="0"/>
+      </a:fillRef>
+      <a:effectRef idx="2">
+        <a:scrgbClr r="0" g="0" b="0"/>
+      </a:effectRef>
+      <a:fontRef idx="minor"/>
+    </dgm:style>
+  </dgm:styleLbl>
+  <dgm:styleLbl name="trBgShp">
+    <dgm:scene3d>
+      <a:camera prst="orthographicFront"/>
+      <a:lightRig rig="threePt" dir="t"/>
+    </dgm:scene3d>
+    <dgm:sp3d/>
+    <dgm:txPr/>
+    <dgm:style>
+      <a:lnRef idx="0">
+        <a:scrgbClr r="0" g="0" b="0"/>
+      </a:lnRef>
+      <a:fillRef idx="1">
+        <a:scrgbClr r="0" g="0" b="0"/>
+      </a:fillRef>
+      <a:effectRef idx="0">
+        <a:scrgbClr r="0" g="0" b="0"/>
+      </a:effectRef>
+      <a:fontRef idx="minor"/>
+    </dgm:style>
+  </dgm:styleLbl>
+  <dgm:styleLbl name="fgShp">
+    <dgm:scene3d>
+      <a:camera prst="orthographicFront"/>
+      <a:lightRig rig="threePt" dir="t"/>
+    </dgm:scene3d>
+    <dgm:sp3d/>
+    <dgm:txPr/>
+    <dgm:style>
+      <a:lnRef idx="0">
+        <a:scrgbClr r="0" g="0" b="0"/>
+      </a:lnRef>
+      <a:fillRef idx="3">
+        <a:scrgbClr r="0" g="0" b="0"/>
+      </a:fillRef>
+      <a:effectRef idx="2">
+        <a:scrgbClr r="0" g="0" b="0"/>
+      </a:effectRef>
+      <a:fontRef idx="minor"/>
+    </dgm:style>
+  </dgm:styleLbl>
+  <dgm:styleLbl name="revTx">
+    <dgm:scene3d>
+      <a:camera prst="orthographicFront"/>
+      <a:lightRig rig="threePt" dir="t"/>
+    </dgm:scene3d>
+    <dgm:sp3d/>
+    <dgm:txPr/>
+    <dgm:style>
+      <a:lnRef idx="0">
+        <a:scrgbClr r="0" g="0" b="0"/>
+      </a:lnRef>
+      <a:fillRef idx="0">
+        <a:scrgbClr r="0" g="0" b="0"/>
+      </a:fillRef>
+      <a:effectRef idx="0">
+        <a:scrgbClr r="0" g="0" b="0"/>
+      </a:effectRef>
+      <a:fontRef idx="minor"/>
+    </dgm:style>
+  </dgm:styleLbl>
+</dgm:styleDef>
+</file>
+
+<file path=ppt/diagrams/quickStyle4.xml><?xml version="1.0" encoding="utf-8"?>
 <dgm:styleDef xmlns:dgm="http://schemas.openxmlformats.org/drawingml/2006/diagram" xmlns:a="http://schemas.openxmlformats.org/drawingml/2006/main" uniqueId="urn:microsoft.com/office/officeart/2005/8/quickstyle/simple4">
   <dgm:title val=""/>
   <dgm:desc val=""/>
@@ -8439,7 +12968,7 @@
             <a:fld id="{5DCF01CD-BBCB-784E-AF43-2E7C0D198A93}" type="datetimeFigureOut">
               <a:rPr lang="en-US" smtClean="0"/>
               <a:pPr/>
-              <a:t>13-12-24</a:t>
+              <a:t>12/24/13</a:t>
             </a:fld>
             <a:endParaRPr lang="en-US"/>
           </a:p>
@@ -8607,7 +13136,7 @@
             <a:fld id="{7389D1EB-23EB-D046-9CA8-EB2F5A4E7ACB}" type="datetimeFigureOut">
               <a:rPr lang="en-US" smtClean="0"/>
               <a:pPr/>
-              <a:t>13-12-24</a:t>
+              <a:t>12/24/13</a:t>
             </a:fld>
             <a:endParaRPr lang="en-US"/>
           </a:p>
@@ -9243,7 +13772,7 @@
             <a:fld id="{1A1B34FB-08E0-7B49-A4FB-B491A83AAC7A}" type="datetime1">
               <a:rPr lang="en-HK" smtClean="0"/>
               <a:pPr/>
-              <a:t>13-12-24</a:t>
+              <a:t>12/24/13</a:t>
             </a:fld>
             <a:endParaRPr lang="en-US"/>
           </a:p>
@@ -9421,7 +13950,7 @@
             <a:fld id="{2C22D744-8B4C-B041-A7D2-4DF98F9AA572}" type="datetime1">
               <a:rPr lang="en-HK" smtClean="0"/>
               <a:pPr/>
-              <a:t>13-12-24</a:t>
+              <a:t>12/24/13</a:t>
             </a:fld>
             <a:endParaRPr lang="en-US"/>
           </a:p>
@@ -9603,7 +14132,7 @@
             <a:fld id="{27EAC437-70CA-D148-BCF2-DBFFD5ECB045}" type="datetime1">
               <a:rPr lang="en-HK" smtClean="0"/>
               <a:pPr/>
-              <a:t>13-12-24</a:t>
+              <a:t>12/24/13</a:t>
             </a:fld>
             <a:endParaRPr lang="en-US"/>
           </a:p>
@@ -9775,7 +14304,7 @@
             <a:fld id="{31DC336B-EE1D-0541-BD9A-6D7D3B8B9687}" type="datetime1">
               <a:rPr lang="en-HK" smtClean="0"/>
               <a:pPr/>
-              <a:t>13-12-24</a:t>
+              <a:t>12/24/13</a:t>
             </a:fld>
             <a:endParaRPr lang="en-US"/>
           </a:p>
@@ -10053,7 +14582,7 @@
             <a:fld id="{CB8A3765-53CE-674D-AE48-DD5246E73140}" type="datetime1">
               <a:rPr lang="en-HK" smtClean="0"/>
               <a:pPr/>
-              <a:t>13-12-24</a:t>
+              <a:t>12/24/13</a:t>
             </a:fld>
             <a:endParaRPr lang="en-US"/>
           </a:p>
@@ -10343,7 +14872,7 @@
             <a:fld id="{ACA19C97-71A8-0E47-85B2-819AC38C3395}" type="datetime1">
               <a:rPr lang="en-HK" smtClean="0"/>
               <a:pPr/>
-              <a:t>13-12-24</a:t>
+              <a:t>12/24/13</a:t>
             </a:fld>
             <a:endParaRPr lang="en-US"/>
           </a:p>
@@ -10767,7 +15296,7 @@
             <a:fld id="{B5E9F2A7-FED5-F042-9A67-6471A4F9AD82}" type="datetime1">
               <a:rPr lang="en-HK" smtClean="0"/>
               <a:pPr/>
-              <a:t>13-12-24</a:t>
+              <a:t>12/24/13</a:t>
             </a:fld>
             <a:endParaRPr lang="en-US"/>
           </a:p>
@@ -10887,7 +15416,7 @@
             <a:fld id="{E61ABB95-E20D-524C-A6CE-7861E511A8C6}" type="datetime1">
               <a:rPr lang="en-HK" smtClean="0"/>
               <a:pPr/>
-              <a:t>13-12-24</a:t>
+              <a:t>12/24/13</a:t>
             </a:fld>
             <a:endParaRPr lang="en-US"/>
           </a:p>
@@ -10984,7 +15513,7 @@
             <a:fld id="{4379A31E-49B0-3449-918C-B3229090BCFB}" type="datetime1">
               <a:rPr lang="en-HK" smtClean="0"/>
               <a:pPr/>
-              <a:t>13-12-24</a:t>
+              <a:t>12/24/13</a:t>
             </a:fld>
             <a:endParaRPr lang="en-US"/>
           </a:p>
@@ -11263,7 +15792,7 @@
             <a:fld id="{FC69E589-26EE-8749-8089-6F072687BF9B}" type="datetime1">
               <a:rPr lang="en-HK" smtClean="0"/>
               <a:pPr/>
-              <a:t>13-12-24</a:t>
+              <a:t>12/24/13</a:t>
             </a:fld>
             <a:endParaRPr lang="en-US"/>
           </a:p>
@@ -11518,7 +16047,7 @@
             <a:fld id="{0DF88A71-17CA-6347-A4B5-ECB359A47EE8}" type="datetime1">
               <a:rPr lang="en-HK" smtClean="0"/>
               <a:pPr/>
-              <a:t>13-12-24</a:t>
+              <a:t>12/24/13</a:t>
             </a:fld>
             <a:endParaRPr lang="en-US"/>
           </a:p>
@@ -11733,7 +16262,7 @@
             <a:fld id="{F0829251-2DFF-494B-BF2C-1EA8B1A68D0E}" type="datetime1">
               <a:rPr lang="en-HK" smtClean="0"/>
               <a:pPr/>
-              <a:t>13-12-24</a:t>
+              <a:t>12/24/13</a:t>
             </a:fld>
             <a:endParaRPr lang="en-US"/>
           </a:p>
@@ -14432,6 +18961,108 @@
 </file>
 
 <file path=ppt/slides/slide15.xml><?xml version="1.0" encoding="utf-8"?>
+<p:sld xmlns:a="http://schemas.openxmlformats.org/drawingml/2006/main" xmlns:r="http://schemas.openxmlformats.org/officeDocument/2006/relationships" xmlns:p="http://schemas.openxmlformats.org/presentationml/2006/main">
+  <p:cSld>
+    <p:spTree>
+      <p:nvGrpSpPr>
+        <p:cNvPr id="1" name=""/>
+        <p:cNvGrpSpPr/>
+        <p:nvPr/>
+      </p:nvGrpSpPr>
+      <p:grpSpPr>
+        <a:xfrm>
+          <a:off x="0" y="0"/>
+          <a:ext cx="0" cy="0"/>
+          <a:chOff x="0" y="0"/>
+          <a:chExt cx="0" cy="0"/>
+        </a:xfrm>
+      </p:grpSpPr>
+      <p:sp>
+        <p:nvSpPr>
+          <p:cNvPr id="2" name="Title 1"/>
+          <p:cNvSpPr>
+            <a:spLocks noGrp="1"/>
+          </p:cNvSpPr>
+          <p:nvPr>
+            <p:ph type="title"/>
+          </p:nvPr>
+        </p:nvSpPr>
+        <p:spPr/>
+        <p:txBody>
+          <a:bodyPr/>
+          <a:lstStyle/>
+          <a:p>
+            <a:r>
+              <a:rPr lang="zh-CN" altLang="en-US" dirty="0" smtClean="0"/>
+              <a:t>总结</a:t>
+            </a:r>
+            <a:endParaRPr lang="en-US" dirty="0"/>
+          </a:p>
+        </p:txBody>
+      </p:sp>
+      <p:graphicFrame>
+        <p:nvGraphicFramePr>
+          <p:cNvPr id="5" name="Content Placeholder 4"/>
+          <p:cNvGraphicFramePr>
+            <a:graphicFrameLocks noGrp="1"/>
+          </p:cNvGraphicFramePr>
+          <p:nvPr>
+            <p:ph idx="1"/>
+            <p:extLst>
+              <p:ext uri="{D42A27DB-BD31-4B8C-83A1-F6EECF244321}">
+                <p14:modId xmlns:p14="http://schemas.microsoft.com/office/powerpoint/2010/main" val="1173123417"/>
+              </p:ext>
+            </p:extLst>
+          </p:nvPr>
+        </p:nvGraphicFramePr>
+        <p:xfrm>
+          <a:off x="457200" y="1600200"/>
+          <a:ext cx="8229600" cy="4525963"/>
+        </p:xfrm>
+        <a:graphic>
+          <a:graphicData uri="http://schemas.openxmlformats.org/drawingml/2006/diagram">
+            <dgm:relIds xmlns:dgm="http://schemas.openxmlformats.org/drawingml/2006/diagram" xmlns:r="http://schemas.openxmlformats.org/officeDocument/2006/relationships" r:dm="rId2" r:lo="rId3" r:qs="rId4" r:cs="rId5"/>
+          </a:graphicData>
+        </a:graphic>
+      </p:graphicFrame>
+      <p:sp>
+        <p:nvSpPr>
+          <p:cNvPr id="4" name="Slide Number Placeholder 3"/>
+          <p:cNvSpPr>
+            <a:spLocks noGrp="1"/>
+          </p:cNvSpPr>
+          <p:nvPr>
+            <p:ph type="sldNum" sz="quarter" idx="12"/>
+          </p:nvPr>
+        </p:nvSpPr>
+        <p:spPr/>
+        <p:txBody>
+          <a:bodyPr/>
+          <a:lstStyle/>
+          <a:p>
+            <a:fld id="{B6A3D480-A58D-4747-9D04-FF1A8C99FAB7}" type="slidenum">
+              <a:rPr lang="en-US" smtClean="0"/>
+              <a:pPr/>
+              <a:t>15</a:t>
+            </a:fld>
+            <a:endParaRPr lang="en-US"/>
+          </a:p>
+        </p:txBody>
+      </p:sp>
+    </p:spTree>
+    <p:extLst>
+      <p:ext uri="{BB962C8B-B14F-4D97-AF65-F5344CB8AC3E}">
+        <p14:creationId xmlns:p14="http://schemas.microsoft.com/office/powerpoint/2010/main" val="1132415324"/>
+      </p:ext>
+    </p:extLst>
+  </p:cSld>
+  <p:clrMapOvr>
+    <a:masterClrMapping/>
+  </p:clrMapOvr>
+</p:sld>
+</file>
+
+<file path=ppt/slides/slide16.xml><?xml version="1.0" encoding="utf-8"?>
 <p:sld xmlns:a="http://schemas.openxmlformats.org/drawingml/2006/main" xmlns:r="http://schemas.openxmlformats.org/officeDocument/2006/relationships" xmlns:p="http://schemas.openxmlformats.org/presentationml/2006/main">
   <p:cSld>
     <p:bg>

</xml_diff>

<commit_message>
Added a directory for 付志勇 and changed XLPWorkflow.
</commit_message>
<xml_diff>
--- a/课程方案/XLP_WorkFLow_CHN.pptx
+++ b/课程方案/XLP_WorkFLow_CHN.pptx
@@ -5,10 +5,10 @@
     <p:sldMasterId id="2147483672" r:id="rId1"/>
   </p:sldMasterIdLst>
   <p:notesMasterIdLst>
-    <p:notesMasterId r:id="rId18"/>
+    <p:notesMasterId r:id="rId17"/>
   </p:notesMasterIdLst>
   <p:handoutMasterIdLst>
-    <p:handoutMasterId r:id="rId19"/>
+    <p:handoutMasterId r:id="rId18"/>
   </p:handoutMasterIdLst>
   <p:sldIdLst>
     <p:sldId id="256" r:id="rId2"/>
@@ -24,9 +24,8 @@
     <p:sldId id="361" r:id="rId12"/>
     <p:sldId id="301" r:id="rId13"/>
     <p:sldId id="318" r:id="rId14"/>
-    <p:sldId id="364" r:id="rId15"/>
+    <p:sldId id="365" r:id="rId15"/>
     <p:sldId id="366" r:id="rId16"/>
-    <p:sldId id="365" r:id="rId17"/>
   </p:sldIdLst>
   <p:sldSz cx="9144000" cy="6858000" type="screen4x3"/>
   <p:notesSz cx="6858000" cy="9144000"/>
@@ -5193,7 +5192,7 @@
         <a:p>
           <a:r>
             <a:rPr lang="zh-CN" altLang="en-US" sz="2000" dirty="0" smtClean="0"/>
-            <a:t>学校跨学科的选课机制的柔性与弹性</a:t>
+            <a:t>跨校跨学科的柔性选课机制</a:t>
           </a:r>
           <a:endParaRPr lang="en-US" sz="2000" dirty="0"/>
         </a:p>
@@ -5230,7 +5229,11 @@
         <a:p>
           <a:r>
             <a:rPr lang="zh-CN" altLang="en-US" sz="2000" dirty="0" smtClean="0"/>
-            <a:t>融合学生的活动来丰富学校整体的教学活动体验</a:t>
+            <a:t>结合</a:t>
+          </a:r>
+          <a:r>
+            <a:rPr lang="zh-CN" altLang="en-US" sz="2000" dirty="0" smtClean="0"/>
+            <a:t>学生活动来丰富整体的教学活动体验</a:t>
           </a:r>
           <a:endParaRPr lang="en-US" sz="2000" dirty="0"/>
         </a:p>
@@ -7614,7 +7617,7 @@
           </a:pPr>
           <a:r>
             <a:rPr lang="zh-CN" altLang="en-US" sz="2000" kern="1200" dirty="0" smtClean="0"/>
-            <a:t>学校跨学科的选课机制的柔性与弹性</a:t>
+            <a:t>跨校跨学科的柔性选课机制</a:t>
           </a:r>
           <a:endParaRPr lang="en-US" sz="2000" kern="1200" dirty="0"/>
         </a:p>
@@ -7740,7 +7743,11 @@
           </a:pPr>
           <a:r>
             <a:rPr lang="zh-CN" altLang="en-US" sz="2000" kern="1200" dirty="0" smtClean="0"/>
-            <a:t>融合学生的活动来丰富学校整体的教学活动体验</a:t>
+            <a:t>结合</a:t>
+          </a:r>
+          <a:r>
+            <a:rPr lang="zh-CN" altLang="en-US" sz="2000" kern="1200" dirty="0" smtClean="0"/>
+            <a:t>学生活动来丰富整体的教学活动体验</a:t>
           </a:r>
           <a:endParaRPr lang="en-US" sz="2000" kern="1200" dirty="0"/>
         </a:p>
@@ -17087,36 +17094,44 @@
           </a:p>
         </p:txBody>
       </p:sp>
-      <p:pic>
-        <p:nvPicPr>
-          <p:cNvPr id="7" name="Picture 6" descr="XPLSTRUC002B2.4.png"/>
-          <p:cNvPicPr>
-            <a:picLocks noChangeAspect="1"/>
-          </p:cNvPicPr>
+      <p:sp>
+        <p:nvSpPr>
+          <p:cNvPr id="4" name="TextBox 3"/>
+          <p:cNvSpPr txBox="1"/>
           <p:nvPr/>
-        </p:nvPicPr>
-        <p:blipFill>
-          <a:blip r:embed="rId2">
-            <a:extLst>
-              <a:ext uri="{28A0092B-C50C-407E-A947-70E740481C1C}">
-                <a14:useLocalDpi xmlns:a14="http://schemas.microsoft.com/office/drawing/2010/main" val="0"/>
-              </a:ext>
-            </a:extLst>
-          </a:blip>
-          <a:stretch>
-            <a:fillRect/>
-          </a:stretch>
-        </p:blipFill>
+        </p:nvSpPr>
         <p:spPr>
           <a:xfrm>
-            <a:off x="5389118" y="4324803"/>
-            <a:ext cx="3754881" cy="2533197"/>
+            <a:off x="2764694" y="4495199"/>
+            <a:ext cx="4698722" cy="769441"/>
           </a:xfrm>
           <a:prstGeom prst="rect">
             <a:avLst/>
           </a:prstGeom>
+          <a:noFill/>
         </p:spPr>
-      </p:pic>
+        <p:txBody>
+          <a:bodyPr wrap="none" rtlCol="0">
+            <a:spAutoFit/>
+          </a:bodyPr>
+          <a:lstStyle/>
+          <a:p>
+            <a:r>
+              <a:rPr lang="zh-CN" altLang="en-US" sz="4400" dirty="0" smtClean="0">
+                <a:solidFill>
+                  <a:srgbClr val="FF0000"/>
+                </a:solidFill>
+              </a:rPr>
+              <a:t>（四力的图示？）</a:t>
+            </a:r>
+            <a:endParaRPr lang="en-US" sz="4400" dirty="0">
+              <a:solidFill>
+                <a:srgbClr val="FF0000"/>
+              </a:solidFill>
+            </a:endParaRPr>
+          </a:p>
+        </p:txBody>
+      </p:sp>
     </p:spTree>
     <p:extLst>
       <p:ext uri="{BB962C8B-B14F-4D97-AF65-F5344CB8AC3E}">
@@ -17538,7 +17553,35 @@
             <a:pPr lvl="1"/>
             <a:r>
               <a:rPr lang="zh-CN" altLang="en-US" dirty="0" smtClean="0"/>
-              <a:t>“廉价”资金的供应，造成青年的创业潮</a:t>
+              <a:t>“廉价”资金的供应，</a:t>
+            </a:r>
+            <a:r>
+              <a:rPr lang="zh-CN" altLang="en-US" dirty="0" smtClean="0"/>
+              <a:t>造成</a:t>
+            </a:r>
+            <a:r>
+              <a:rPr lang="zh-CN" altLang="en-US" dirty="0"/>
+              <a:t>“</a:t>
+            </a:r>
+            <a:r>
+              <a:rPr lang="zh-CN" altLang="en-US" dirty="0" smtClean="0">
+                <a:solidFill>
+                  <a:srgbClr val="FF0000"/>
+                </a:solidFill>
+              </a:rPr>
+              <a:t>学生</a:t>
+            </a:r>
+            <a:r>
+              <a:rPr lang="zh-CN" altLang="en-US" dirty="0" smtClean="0"/>
+              <a:t>”</a:t>
+            </a:r>
+            <a:r>
+              <a:rPr lang="zh-CN" altLang="en-US" dirty="0" smtClean="0"/>
+              <a:t>的创业</a:t>
+            </a:r>
+            <a:r>
+              <a:rPr lang="zh-CN" altLang="en-US" dirty="0" smtClean="0"/>
+              <a:t>潮</a:t>
             </a:r>
             <a:endParaRPr lang="en-US" altLang="zh-CN" dirty="0" smtClean="0"/>
           </a:p>
@@ -17781,1523 +17824,6 @@
 </file>
 
 <file path=ppt/slides/slide14.xml><?xml version="1.0" encoding="utf-8"?>
-<p:sld xmlns:a="http://schemas.openxmlformats.org/drawingml/2006/main" xmlns:r="http://schemas.openxmlformats.org/officeDocument/2006/relationships" xmlns:p="http://schemas.openxmlformats.org/presentationml/2006/main">
-  <p:cSld>
-    <p:spTree>
-      <p:nvGrpSpPr>
-        <p:cNvPr id="1" name=""/>
-        <p:cNvGrpSpPr/>
-        <p:nvPr/>
-      </p:nvGrpSpPr>
-      <p:grpSpPr>
-        <a:xfrm>
-          <a:off x="0" y="0"/>
-          <a:ext cx="0" cy="0"/>
-          <a:chOff x="0" y="0"/>
-          <a:chExt cx="0" cy="0"/>
-        </a:xfrm>
-      </p:grpSpPr>
-      <p:sp>
-        <p:nvSpPr>
-          <p:cNvPr id="62" name="Oval 61"/>
-          <p:cNvSpPr/>
-          <p:nvPr/>
-        </p:nvSpPr>
-        <p:spPr>
-          <a:xfrm>
-            <a:off x="2057308" y="1236653"/>
-            <a:ext cx="5679842" cy="4294868"/>
-          </a:xfrm>
-          <a:prstGeom prst="ellipse">
-            <a:avLst/>
-          </a:prstGeom>
-          <a:solidFill>
-            <a:schemeClr val="accent1">
-              <a:lumMod val="20000"/>
-              <a:lumOff val="80000"/>
-            </a:schemeClr>
-          </a:solidFill>
-          <a:effectLst/>
-        </p:spPr>
-        <p:style>
-          <a:lnRef idx="1">
-            <a:schemeClr val="accent1"/>
-          </a:lnRef>
-          <a:fillRef idx="3">
-            <a:schemeClr val="accent1"/>
-          </a:fillRef>
-          <a:effectRef idx="2">
-            <a:schemeClr val="accent1"/>
-          </a:effectRef>
-          <a:fontRef idx="minor">
-            <a:schemeClr val="lt1"/>
-          </a:fontRef>
-        </p:style>
-        <p:txBody>
-          <a:bodyPr rot="0" spcFirstLastPara="0" vertOverflow="overflow" horzOverflow="overflow" vert="horz" wrap="square" lIns="108000" tIns="0" rIns="91440" bIns="45720" numCol="1" spcCol="0" rtlCol="0" fromWordArt="0" anchor="t" anchorCtr="0" forceAA="0" compatLnSpc="1">
-            <a:prstTxWarp prst="textNoShape">
-              <a:avLst/>
-            </a:prstTxWarp>
-            <a:noAutofit/>
-          </a:bodyPr>
-          <a:lstStyle/>
-          <a:p>
-            <a:pPr marL="266700"/>
-            <a:endParaRPr lang="en-US" sz="2400" dirty="0">
-              <a:solidFill>
-                <a:srgbClr val="A60046"/>
-              </a:solidFill>
-              <a:latin typeface="华文楷体"/>
-              <a:ea typeface="华文楷体"/>
-              <a:cs typeface="华文楷体"/>
-            </a:endParaRPr>
-          </a:p>
-        </p:txBody>
-      </p:sp>
-      <p:sp>
-        <p:nvSpPr>
-          <p:cNvPr id="55" name="Chevron 54"/>
-          <p:cNvSpPr/>
-          <p:nvPr/>
-        </p:nvSpPr>
-        <p:spPr>
-          <a:xfrm>
-            <a:off x="5915661" y="3990989"/>
-            <a:ext cx="2251757" cy="728008"/>
-          </a:xfrm>
-          <a:prstGeom prst="chevron">
-            <a:avLst/>
-          </a:prstGeom>
-        </p:spPr>
-        <p:style>
-          <a:lnRef idx="2">
-            <a:schemeClr val="accent2">
-              <a:shade val="50000"/>
-            </a:schemeClr>
-          </a:lnRef>
-          <a:fillRef idx="1">
-            <a:schemeClr val="accent2"/>
-          </a:fillRef>
-          <a:effectRef idx="0">
-            <a:schemeClr val="accent2"/>
-          </a:effectRef>
-          <a:fontRef idx="minor">
-            <a:schemeClr val="lt1"/>
-          </a:fontRef>
-        </p:style>
-        <p:txBody>
-          <a:bodyPr rot="0" spcFirstLastPara="0" vertOverflow="overflow" horzOverflow="overflow" vert="horz" wrap="square" lIns="91440" tIns="45720" rIns="91440" bIns="45720" numCol="1" spcCol="0" rtlCol="0" fromWordArt="0" anchor="ctr" anchorCtr="0" forceAA="0" compatLnSpc="1">
-            <a:prstTxWarp prst="textNoShape">
-              <a:avLst/>
-            </a:prstTxWarp>
-            <a:noAutofit/>
-          </a:bodyPr>
-          <a:lstStyle/>
-          <a:p>
-            <a:pPr algn="ctr"/>
-            <a:r>
-              <a:rPr lang="zh-CN" altLang="en-US" dirty="0" smtClean="0">
-                <a:solidFill>
-                  <a:srgbClr val="000000"/>
-                </a:solidFill>
-                <a:latin typeface="华文楷体"/>
-                <a:ea typeface="华文楷体"/>
-                <a:cs typeface="华文楷体"/>
-              </a:rPr>
-              <a:t>协同开发</a:t>
-            </a:r>
-            <a:endParaRPr lang="en-US" dirty="0">
-              <a:solidFill>
-                <a:srgbClr val="000000"/>
-              </a:solidFill>
-              <a:latin typeface="华文楷体"/>
-              <a:ea typeface="华文楷体"/>
-              <a:cs typeface="华文楷体"/>
-            </a:endParaRPr>
-          </a:p>
-        </p:txBody>
-      </p:sp>
-      <p:sp>
-        <p:nvSpPr>
-          <p:cNvPr id="53" name="Chevron 52"/>
-          <p:cNvSpPr/>
-          <p:nvPr/>
-        </p:nvSpPr>
-        <p:spPr>
-          <a:xfrm>
-            <a:off x="2155708" y="3990989"/>
-            <a:ext cx="2247578" cy="728008"/>
-          </a:xfrm>
-          <a:prstGeom prst="chevron">
-            <a:avLst/>
-          </a:prstGeom>
-          <a:solidFill>
-            <a:schemeClr val="accent6">
-              <a:lumMod val="60000"/>
-              <a:lumOff val="40000"/>
-            </a:schemeClr>
-          </a:solidFill>
-        </p:spPr>
-        <p:style>
-          <a:lnRef idx="2">
-            <a:schemeClr val="accent4">
-              <a:shade val="50000"/>
-            </a:schemeClr>
-          </a:lnRef>
-          <a:fillRef idx="1">
-            <a:schemeClr val="accent4"/>
-          </a:fillRef>
-          <a:effectRef idx="0">
-            <a:schemeClr val="accent4"/>
-          </a:effectRef>
-          <a:fontRef idx="minor">
-            <a:schemeClr val="lt1"/>
-          </a:fontRef>
-        </p:style>
-        <p:txBody>
-          <a:bodyPr rot="0" spcFirstLastPara="0" vertOverflow="overflow" horzOverflow="overflow" vert="horz" wrap="square" lIns="91440" tIns="45720" rIns="91440" bIns="45720" numCol="1" spcCol="0" rtlCol="0" fromWordArt="0" anchor="ctr" anchorCtr="0" forceAA="0" compatLnSpc="1">
-            <a:prstTxWarp prst="textNoShape">
-              <a:avLst/>
-            </a:prstTxWarp>
-            <a:noAutofit/>
-          </a:bodyPr>
-          <a:lstStyle/>
-          <a:p>
-            <a:pPr algn="ctr"/>
-            <a:r>
-              <a:rPr lang="zh-CN" altLang="en-US" dirty="0" smtClean="0">
-                <a:solidFill>
-                  <a:srgbClr val="000000"/>
-                </a:solidFill>
-                <a:latin typeface="华文楷体"/>
-                <a:ea typeface="华文楷体"/>
-                <a:cs typeface="华文楷体"/>
-              </a:rPr>
-              <a:t>内容挖掘</a:t>
-            </a:r>
-            <a:endParaRPr lang="en-US" dirty="0">
-              <a:solidFill>
-                <a:srgbClr val="000000"/>
-              </a:solidFill>
-            </a:endParaRPr>
-          </a:p>
-        </p:txBody>
-      </p:sp>
-      <p:sp>
-        <p:nvSpPr>
-          <p:cNvPr id="54" name="Chevron 53"/>
-          <p:cNvSpPr/>
-          <p:nvPr/>
-        </p:nvSpPr>
-        <p:spPr>
-          <a:xfrm>
-            <a:off x="4044041" y="3990989"/>
-            <a:ext cx="2226690" cy="728008"/>
-          </a:xfrm>
-          <a:prstGeom prst="chevron">
-            <a:avLst/>
-          </a:prstGeom>
-        </p:spPr>
-        <p:style>
-          <a:lnRef idx="2">
-            <a:schemeClr val="accent6">
-              <a:shade val="50000"/>
-            </a:schemeClr>
-          </a:lnRef>
-          <a:fillRef idx="1">
-            <a:schemeClr val="accent6"/>
-          </a:fillRef>
-          <a:effectRef idx="0">
-            <a:schemeClr val="accent6"/>
-          </a:effectRef>
-          <a:fontRef idx="minor">
-            <a:schemeClr val="lt1"/>
-          </a:fontRef>
-        </p:style>
-        <p:txBody>
-          <a:bodyPr rot="0" spcFirstLastPara="0" vertOverflow="overflow" horzOverflow="overflow" vert="horz" wrap="square" lIns="91440" tIns="45720" rIns="91440" bIns="45720" numCol="1" spcCol="0" rtlCol="0" fromWordArt="0" anchor="ctr" anchorCtr="0" forceAA="0" compatLnSpc="1">
-            <a:prstTxWarp prst="textNoShape">
-              <a:avLst/>
-            </a:prstTxWarp>
-            <a:noAutofit/>
-          </a:bodyPr>
-          <a:lstStyle/>
-          <a:p>
-            <a:pPr algn="ctr"/>
-            <a:r>
-              <a:rPr lang="zh-CN" altLang="en-US" dirty="0" smtClean="0">
-                <a:solidFill>
-                  <a:srgbClr val="000000"/>
-                </a:solidFill>
-                <a:latin typeface="华文楷体"/>
-                <a:ea typeface="华文楷体"/>
-                <a:cs typeface="华文楷体"/>
-              </a:rPr>
-              <a:t>项目选择</a:t>
-            </a:r>
-            <a:endParaRPr lang="en-US" dirty="0">
-              <a:solidFill>
-                <a:srgbClr val="000000"/>
-              </a:solidFill>
-              <a:latin typeface="华文楷体"/>
-              <a:ea typeface="华文楷体"/>
-              <a:cs typeface="华文楷体"/>
-            </a:endParaRPr>
-          </a:p>
-        </p:txBody>
-      </p:sp>
-      <p:sp>
-        <p:nvSpPr>
-          <p:cNvPr id="22" name="Rectangle 21"/>
-          <p:cNvSpPr/>
-          <p:nvPr/>
-        </p:nvSpPr>
-        <p:spPr>
-          <a:xfrm>
-            <a:off x="2548376" y="4718998"/>
-            <a:ext cx="5619042" cy="612004"/>
-          </a:xfrm>
-          <a:prstGeom prst="rect">
-            <a:avLst/>
-          </a:prstGeom>
-          <a:solidFill>
-            <a:srgbClr val="B3A2C7"/>
-          </a:solidFill>
-          <a:ln>
-            <a:solidFill>
-              <a:schemeClr val="accent4">
-                <a:lumMod val="75000"/>
-              </a:schemeClr>
-            </a:solidFill>
-          </a:ln>
-        </p:spPr>
-        <p:style>
-          <a:lnRef idx="2">
-            <a:schemeClr val="accent3">
-              <a:shade val="50000"/>
-            </a:schemeClr>
-          </a:lnRef>
-          <a:fillRef idx="1">
-            <a:schemeClr val="accent3"/>
-          </a:fillRef>
-          <a:effectRef idx="0">
-            <a:schemeClr val="accent3"/>
-          </a:effectRef>
-          <a:fontRef idx="minor">
-            <a:schemeClr val="lt1"/>
-          </a:fontRef>
-        </p:style>
-        <p:txBody>
-          <a:bodyPr rot="0" spcFirstLastPara="0" vertOverflow="overflow" horzOverflow="overflow" vert="horz" wrap="square" lIns="91440" tIns="45720" rIns="91440" bIns="45720" numCol="1" spcCol="0" rtlCol="0" fromWordArt="0" anchor="ctr" anchorCtr="0" forceAA="0" compatLnSpc="1">
-            <a:prstTxWarp prst="textNoShape">
-              <a:avLst/>
-            </a:prstTxWarp>
-            <a:noAutofit/>
-          </a:bodyPr>
-          <a:lstStyle/>
-          <a:p>
-            <a:pPr algn="ctr">
-              <a:lnSpc>
-                <a:spcPct val="80000"/>
-              </a:lnSpc>
-            </a:pPr>
-            <a:r>
-              <a:rPr lang="en-US" altLang="zh-CN" sz="2400" dirty="0" smtClean="0">
-                <a:solidFill>
-                  <a:srgbClr val="000000"/>
-                </a:solidFill>
-                <a:latin typeface="华文楷体"/>
-                <a:ea typeface="华文楷体"/>
-                <a:cs typeface="华文楷体"/>
-              </a:rPr>
-              <a:t>XLP</a:t>
-            </a:r>
-            <a:r>
-              <a:rPr lang="zh-CN" altLang="en-US" sz="2400" dirty="0" smtClean="0">
-                <a:solidFill>
-                  <a:srgbClr val="000000"/>
-                </a:solidFill>
-                <a:latin typeface="华文楷体"/>
-                <a:ea typeface="华文楷体"/>
-                <a:cs typeface="华文楷体"/>
-              </a:rPr>
-              <a:t>项目设计</a:t>
-            </a:r>
-            <a:endParaRPr lang="en-US" sz="2400" dirty="0">
-              <a:solidFill>
-                <a:srgbClr val="000000"/>
-              </a:solidFill>
-              <a:latin typeface="华文楷体"/>
-              <a:cs typeface="华文楷体"/>
-            </a:endParaRPr>
-          </a:p>
-        </p:txBody>
-      </p:sp>
-      <p:sp>
-        <p:nvSpPr>
-          <p:cNvPr id="7" name="Rectangle 6"/>
-          <p:cNvSpPr/>
-          <p:nvPr/>
-        </p:nvSpPr>
-        <p:spPr>
-          <a:xfrm>
-            <a:off x="2057308" y="5331002"/>
-            <a:ext cx="6110110" cy="894068"/>
-          </a:xfrm>
-          <a:prstGeom prst="rect">
-            <a:avLst/>
-          </a:prstGeom>
-          <a:solidFill>
-            <a:schemeClr val="accent1">
-              <a:lumMod val="20000"/>
-              <a:lumOff val="80000"/>
-            </a:schemeClr>
-          </a:solidFill>
-          <a:ln>
-            <a:solidFill>
-              <a:srgbClr val="604A7B"/>
-            </a:solidFill>
-          </a:ln>
-        </p:spPr>
-        <p:style>
-          <a:lnRef idx="2">
-            <a:schemeClr val="accent4">
-              <a:shade val="50000"/>
-            </a:schemeClr>
-          </a:lnRef>
-          <a:fillRef idx="1">
-            <a:schemeClr val="accent4"/>
-          </a:fillRef>
-          <a:effectRef idx="0">
-            <a:schemeClr val="accent4"/>
-          </a:effectRef>
-          <a:fontRef idx="minor">
-            <a:schemeClr val="lt1"/>
-          </a:fontRef>
-        </p:style>
-        <p:txBody>
-          <a:bodyPr rot="0" spcFirstLastPara="0" vertOverflow="overflow" horzOverflow="overflow" vert="horz" wrap="square" lIns="91440" tIns="45720" rIns="91440" bIns="45720" numCol="1" spcCol="0" rtlCol="0" fromWordArt="0" anchor="ctr" anchorCtr="0" forceAA="0" compatLnSpc="1">
-            <a:prstTxWarp prst="textNoShape">
-              <a:avLst/>
-            </a:prstTxWarp>
-            <a:noAutofit/>
-          </a:bodyPr>
-          <a:lstStyle/>
-          <a:p>
-            <a:pPr algn="ctr"/>
-            <a:r>
-              <a:rPr lang="zh-CN" altLang="en-US" sz="2400" dirty="0" smtClean="0">
-                <a:solidFill>
-                  <a:srgbClr val="A60046"/>
-                </a:solidFill>
-                <a:latin typeface="华文楷体"/>
-                <a:ea typeface="华文楷体"/>
-                <a:cs typeface="华文楷体"/>
-              </a:rPr>
-              <a:t>学习成果累积</a:t>
-            </a:r>
-            <a:endParaRPr lang="en-US" sz="2400" dirty="0" smtClean="0">
-              <a:solidFill>
-                <a:srgbClr val="A60046"/>
-              </a:solidFill>
-              <a:latin typeface="华文楷体"/>
-              <a:cs typeface="华文楷体"/>
-            </a:endParaRPr>
-          </a:p>
-        </p:txBody>
-      </p:sp>
-      <p:sp>
-        <p:nvSpPr>
-          <p:cNvPr id="8" name="Title 1"/>
-          <p:cNvSpPr txBox="1">
-            <a:spLocks/>
-          </p:cNvSpPr>
-          <p:nvPr/>
-        </p:nvSpPr>
-        <p:spPr>
-          <a:xfrm>
-            <a:off x="457200" y="274638"/>
-            <a:ext cx="8229600" cy="1143000"/>
-          </a:xfrm>
-          <a:prstGeom prst="rect">
-            <a:avLst/>
-          </a:prstGeom>
-        </p:spPr>
-        <p:txBody>
-          <a:bodyPr/>
-          <a:lstStyle>
-            <a:lvl1pPr algn="ctr" defTabSz="457200" rtl="0" eaLnBrk="1" latinLnBrk="0" hangingPunct="1">
-              <a:spcBef>
-                <a:spcPct val="0"/>
-              </a:spcBef>
-              <a:buNone/>
-              <a:defRPr sz="4400" kern="1200">
-                <a:solidFill>
-                  <a:schemeClr val="tx1"/>
-                </a:solidFill>
-                <a:latin typeface="+mj-lt"/>
-                <a:ea typeface="+mj-ea"/>
-                <a:cs typeface="+mj-cs"/>
-              </a:defRPr>
-            </a:lvl1pPr>
-          </a:lstStyle>
-          <a:p>
-            <a:r>
-              <a:rPr lang="zh-CN" altLang="en-US" dirty="0" smtClean="0">
-                <a:latin typeface="华文楷体"/>
-                <a:ea typeface="华文楷体"/>
-                <a:cs typeface="华文楷体"/>
-              </a:rPr>
-              <a:t>极限学习工作流</a:t>
-            </a:r>
-            <a:endParaRPr lang="en-US" dirty="0">
-              <a:latin typeface="华文楷体"/>
-              <a:cs typeface="华文楷体"/>
-            </a:endParaRPr>
-          </a:p>
-        </p:txBody>
-      </p:sp>
-      <p:sp>
-        <p:nvSpPr>
-          <p:cNvPr id="4" name="Trapezoid 3"/>
-          <p:cNvSpPr/>
-          <p:nvPr/>
-        </p:nvSpPr>
-        <p:spPr>
-          <a:xfrm rot="5400000">
-            <a:off x="741528" y="4409867"/>
-            <a:ext cx="3122625" cy="491067"/>
-          </a:xfrm>
-          <a:prstGeom prst="trapezoid">
-            <a:avLst>
-              <a:gd name="adj" fmla="val 180121"/>
-            </a:avLst>
-          </a:prstGeom>
-          <a:solidFill>
-            <a:srgbClr val="B3A2C7"/>
-          </a:solidFill>
-          <a:ln>
-            <a:solidFill>
-              <a:schemeClr val="accent4">
-                <a:lumMod val="75000"/>
-              </a:schemeClr>
-            </a:solidFill>
-          </a:ln>
-        </p:spPr>
-        <p:style>
-          <a:lnRef idx="2">
-            <a:schemeClr val="accent4">
-              <a:shade val="50000"/>
-            </a:schemeClr>
-          </a:lnRef>
-          <a:fillRef idx="1">
-            <a:schemeClr val="accent4"/>
-          </a:fillRef>
-          <a:effectRef idx="0">
-            <a:schemeClr val="accent4"/>
-          </a:effectRef>
-          <a:fontRef idx="minor">
-            <a:schemeClr val="lt1"/>
-          </a:fontRef>
-        </p:style>
-        <p:txBody>
-          <a:bodyPr vert="vert270" rtlCol="0" anchor="ctr"/>
-          <a:lstStyle/>
-          <a:p>
-            <a:pPr algn="ctr"/>
-            <a:r>
-              <a:rPr lang="zh-CN" altLang="en-US" dirty="0" smtClean="0">
-                <a:solidFill>
-                  <a:srgbClr val="000000"/>
-                </a:solidFill>
-                <a:latin typeface="华文楷体"/>
-                <a:ea typeface="华文楷体"/>
-                <a:cs typeface="华文楷体"/>
-              </a:rPr>
-              <a:t>导引课</a:t>
-            </a:r>
-            <a:endParaRPr lang="en-US" altLang="zh-CN" dirty="0" smtClean="0">
-              <a:solidFill>
-                <a:srgbClr val="000000"/>
-              </a:solidFill>
-              <a:latin typeface="宋体 (Body)"/>
-              <a:cs typeface="宋体 (Body)"/>
-            </a:endParaRPr>
-          </a:p>
-        </p:txBody>
-      </p:sp>
-      <p:sp>
-        <p:nvSpPr>
-          <p:cNvPr id="13" name="Manual Operation 12"/>
-          <p:cNvSpPr/>
-          <p:nvPr/>
-        </p:nvSpPr>
-        <p:spPr>
-          <a:xfrm>
-            <a:off x="2556735" y="3417608"/>
-            <a:ext cx="1654381" cy="651751"/>
-          </a:xfrm>
-          <a:prstGeom prst="flowChartManualOperation">
-            <a:avLst/>
-          </a:prstGeom>
-          <a:solidFill>
-            <a:schemeClr val="accent6"/>
-          </a:solidFill>
-          <a:ln>
-            <a:noFill/>
-          </a:ln>
-          <a:effectLst/>
-        </p:spPr>
-        <p:style>
-          <a:lnRef idx="1">
-            <a:schemeClr val="accent1"/>
-          </a:lnRef>
-          <a:fillRef idx="3">
-            <a:schemeClr val="accent1"/>
-          </a:fillRef>
-          <a:effectRef idx="2">
-            <a:schemeClr val="accent1"/>
-          </a:effectRef>
-          <a:fontRef idx="minor">
-            <a:schemeClr val="lt1"/>
-          </a:fontRef>
-        </p:style>
-        <p:txBody>
-          <a:bodyPr wrap="none" rtlCol="0" anchor="ctr"/>
-          <a:lstStyle/>
-          <a:p>
-            <a:pPr algn="ctr"/>
-            <a:r>
-              <a:rPr lang="en-US" altLang="zh-CN" dirty="0" smtClean="0">
-                <a:solidFill>
-                  <a:srgbClr val="632523"/>
-                </a:solidFill>
-                <a:latin typeface="华文楷体"/>
-                <a:ea typeface="华文楷体"/>
-                <a:cs typeface="华文楷体"/>
-              </a:rPr>
-              <a:t>TEDxTHU</a:t>
-            </a:r>
-          </a:p>
-          <a:p>
-            <a:pPr algn="ctr"/>
-            <a:r>
-              <a:rPr lang="zh-CN" altLang="en-US" dirty="0" smtClean="0">
-                <a:solidFill>
-                  <a:srgbClr val="632523"/>
-                </a:solidFill>
-                <a:latin typeface="华文楷体"/>
-                <a:ea typeface="华文楷体"/>
-                <a:cs typeface="华文楷体"/>
-              </a:rPr>
-              <a:t>演讲</a:t>
-            </a:r>
-            <a:endParaRPr lang="en-US" dirty="0">
-              <a:solidFill>
-                <a:srgbClr val="632523"/>
-              </a:solidFill>
-            </a:endParaRPr>
-          </a:p>
-        </p:txBody>
-      </p:sp>
-      <p:sp>
-        <p:nvSpPr>
-          <p:cNvPr id="16" name="Manual Operation 15"/>
-          <p:cNvSpPr/>
-          <p:nvPr/>
-        </p:nvSpPr>
-        <p:spPr>
-          <a:xfrm>
-            <a:off x="2924369" y="2569528"/>
-            <a:ext cx="1654381" cy="651751"/>
-          </a:xfrm>
-          <a:prstGeom prst="flowChartManualOperation">
-            <a:avLst/>
-          </a:prstGeom>
-          <a:solidFill>
-            <a:schemeClr val="accent6">
-              <a:lumMod val="40000"/>
-              <a:lumOff val="60000"/>
-            </a:schemeClr>
-          </a:solidFill>
-          <a:ln>
-            <a:noFill/>
-          </a:ln>
-          <a:effectLst/>
-        </p:spPr>
-        <p:style>
-          <a:lnRef idx="1">
-            <a:schemeClr val="accent1"/>
-          </a:lnRef>
-          <a:fillRef idx="3">
-            <a:schemeClr val="accent1"/>
-          </a:fillRef>
-          <a:effectRef idx="2">
-            <a:schemeClr val="accent1"/>
-          </a:effectRef>
-          <a:fontRef idx="minor">
-            <a:schemeClr val="lt1"/>
-          </a:fontRef>
-        </p:style>
-        <p:txBody>
-          <a:bodyPr wrap="none" rtlCol="0" anchor="ctr"/>
-          <a:lstStyle/>
-          <a:p>
-            <a:pPr algn="ctr"/>
-            <a:r>
-              <a:rPr lang="zh-CN" altLang="en-US" dirty="0" smtClean="0">
-                <a:solidFill>
-                  <a:schemeClr val="accent2">
-                    <a:lumMod val="50000"/>
-                  </a:schemeClr>
-                </a:solidFill>
-                <a:latin typeface="华文楷体"/>
-                <a:ea typeface="华文楷体"/>
-                <a:cs typeface="华文楷体"/>
-              </a:rPr>
-              <a:t>实验室</a:t>
-            </a:r>
-            <a:endParaRPr lang="en-US" altLang="zh-CN" dirty="0" smtClean="0">
-              <a:solidFill>
-                <a:schemeClr val="accent2">
-                  <a:lumMod val="50000"/>
-                </a:schemeClr>
-              </a:solidFill>
-              <a:latin typeface="华文楷体"/>
-              <a:ea typeface="华文楷体"/>
-              <a:cs typeface="华文楷体"/>
-            </a:endParaRPr>
-          </a:p>
-          <a:p>
-            <a:pPr algn="ctr"/>
-            <a:r>
-              <a:rPr lang="zh-CN" altLang="en-US" dirty="0" smtClean="0">
-                <a:solidFill>
-                  <a:schemeClr val="accent2">
-                    <a:lumMod val="50000"/>
-                  </a:schemeClr>
-                </a:solidFill>
-                <a:latin typeface="华文楷体"/>
-                <a:ea typeface="华文楷体"/>
-                <a:cs typeface="华文楷体"/>
-              </a:rPr>
-              <a:t>探究课</a:t>
-            </a:r>
-            <a:endParaRPr lang="en-US" dirty="0">
-              <a:solidFill>
-                <a:schemeClr val="accent2">
-                  <a:lumMod val="50000"/>
-                </a:schemeClr>
-              </a:solidFill>
-            </a:endParaRPr>
-          </a:p>
-        </p:txBody>
-      </p:sp>
-      <p:sp>
-        <p:nvSpPr>
-          <p:cNvPr id="17" name="Rounded Rectangle 16"/>
-          <p:cNvSpPr/>
-          <p:nvPr/>
-        </p:nvSpPr>
-        <p:spPr>
-          <a:xfrm>
-            <a:off x="5330150" y="1878184"/>
-            <a:ext cx="1236608" cy="609897"/>
-          </a:xfrm>
-          <a:prstGeom prst="roundRect">
-            <a:avLst/>
-          </a:prstGeom>
-          <a:solidFill>
-            <a:srgbClr val="FF6600"/>
-          </a:solidFill>
-          <a:ln>
-            <a:noFill/>
-          </a:ln>
-        </p:spPr>
-        <p:style>
-          <a:lnRef idx="2">
-            <a:schemeClr val="accent6">
-              <a:shade val="50000"/>
-            </a:schemeClr>
-          </a:lnRef>
-          <a:fillRef idx="1">
-            <a:schemeClr val="accent6"/>
-          </a:fillRef>
-          <a:effectRef idx="0">
-            <a:schemeClr val="accent6"/>
-          </a:effectRef>
-          <a:fontRef idx="minor">
-            <a:schemeClr val="lt1"/>
-          </a:fontRef>
-        </p:style>
-        <p:txBody>
-          <a:bodyPr rot="0" spcFirstLastPara="0" vertOverflow="overflow" horzOverflow="overflow" vert="horz" wrap="square" lIns="91440" tIns="45720" rIns="91440" bIns="45720" numCol="1" spcCol="0" rtlCol="0" fromWordArt="0" anchor="ctr" anchorCtr="0" forceAA="0" compatLnSpc="1">
-            <a:prstTxWarp prst="textNoShape">
-              <a:avLst/>
-            </a:prstTxWarp>
-            <a:noAutofit/>
-          </a:bodyPr>
-          <a:lstStyle/>
-          <a:p>
-            <a:pPr algn="ctr"/>
-            <a:r>
-              <a:rPr lang="zh-CN" altLang="en-US" dirty="0" smtClean="0">
-                <a:solidFill>
-                  <a:schemeClr val="accent6">
-                    <a:lumMod val="20000"/>
-                    <a:lumOff val="80000"/>
-                  </a:schemeClr>
-                </a:solidFill>
-                <a:latin typeface="华文楷体"/>
-                <a:ea typeface="华文楷体"/>
-                <a:cs typeface="华文楷体"/>
-              </a:rPr>
-              <a:t>社团活动</a:t>
-            </a:r>
-            <a:endParaRPr lang="en-US" altLang="zh-CN" dirty="0" smtClean="0">
-              <a:solidFill>
-                <a:schemeClr val="accent6">
-                  <a:lumMod val="20000"/>
-                  <a:lumOff val="80000"/>
-                </a:schemeClr>
-              </a:solidFill>
-              <a:latin typeface="华文楷体"/>
-              <a:ea typeface="华文楷体"/>
-              <a:cs typeface="华文楷体"/>
-            </a:endParaRPr>
-          </a:p>
-        </p:txBody>
-      </p:sp>
-      <p:sp>
-        <p:nvSpPr>
-          <p:cNvPr id="18" name="Rounded Rectangle 17"/>
-          <p:cNvSpPr/>
-          <p:nvPr/>
-        </p:nvSpPr>
-        <p:spPr>
-          <a:xfrm>
-            <a:off x="4921323" y="2563280"/>
-            <a:ext cx="1236608" cy="719999"/>
-          </a:xfrm>
-          <a:prstGeom prst="roundRect">
-            <a:avLst/>
-          </a:prstGeom>
-          <a:solidFill>
-            <a:schemeClr val="accent6"/>
-          </a:solidFill>
-          <a:ln>
-            <a:noFill/>
-          </a:ln>
-        </p:spPr>
-        <p:style>
-          <a:lnRef idx="2">
-            <a:schemeClr val="accent6">
-              <a:shade val="50000"/>
-            </a:schemeClr>
-          </a:lnRef>
-          <a:fillRef idx="1">
-            <a:schemeClr val="accent6"/>
-          </a:fillRef>
-          <a:effectRef idx="0">
-            <a:schemeClr val="accent6"/>
-          </a:effectRef>
-          <a:fontRef idx="minor">
-            <a:schemeClr val="lt1"/>
-          </a:fontRef>
-        </p:style>
-        <p:txBody>
-          <a:bodyPr rot="0" spcFirstLastPara="0" vertOverflow="overflow" horzOverflow="overflow" vert="horz" wrap="square" lIns="91440" tIns="45720" rIns="91440" bIns="45720" numCol="1" spcCol="0" rtlCol="0" fromWordArt="0" anchor="ctr" anchorCtr="0" forceAA="0" compatLnSpc="1">
-            <a:prstTxWarp prst="textNoShape">
-              <a:avLst/>
-            </a:prstTxWarp>
-            <a:noAutofit/>
-          </a:bodyPr>
-          <a:lstStyle/>
-          <a:p>
-            <a:pPr algn="ctr"/>
-            <a:r>
-              <a:rPr lang="zh-CN" altLang="en-US" dirty="0" smtClean="0">
-                <a:solidFill>
-                  <a:schemeClr val="accent6">
-                    <a:lumMod val="50000"/>
-                  </a:schemeClr>
-                </a:solidFill>
-                <a:latin typeface="华文楷体"/>
-                <a:ea typeface="华文楷体"/>
-                <a:cs typeface="华文楷体"/>
-              </a:rPr>
-              <a:t>驻校创客系列讲座</a:t>
-            </a:r>
-            <a:endParaRPr lang="en-US" altLang="zh-CN" dirty="0" smtClean="0">
-              <a:solidFill>
-                <a:schemeClr val="accent6">
-                  <a:lumMod val="50000"/>
-                </a:schemeClr>
-              </a:solidFill>
-              <a:latin typeface="华文楷体"/>
-              <a:ea typeface="华文楷体"/>
-              <a:cs typeface="华文楷体"/>
-            </a:endParaRPr>
-          </a:p>
-        </p:txBody>
-      </p:sp>
-      <p:sp>
-        <p:nvSpPr>
-          <p:cNvPr id="19" name="Rounded Rectangle 18"/>
-          <p:cNvSpPr/>
-          <p:nvPr/>
-        </p:nvSpPr>
-        <p:spPr>
-          <a:xfrm>
-            <a:off x="4511906" y="3346615"/>
-            <a:ext cx="1236608" cy="719999"/>
-          </a:xfrm>
-          <a:prstGeom prst="roundRect">
-            <a:avLst/>
-          </a:prstGeom>
-          <a:solidFill>
-            <a:schemeClr val="accent6">
-              <a:lumMod val="75000"/>
-            </a:schemeClr>
-          </a:solidFill>
-          <a:ln>
-            <a:noFill/>
-          </a:ln>
-        </p:spPr>
-        <p:style>
-          <a:lnRef idx="2">
-            <a:schemeClr val="accent6">
-              <a:shade val="50000"/>
-            </a:schemeClr>
-          </a:lnRef>
-          <a:fillRef idx="1">
-            <a:schemeClr val="accent6"/>
-          </a:fillRef>
-          <a:effectRef idx="0">
-            <a:schemeClr val="accent6"/>
-          </a:effectRef>
-          <a:fontRef idx="minor">
-            <a:schemeClr val="lt1"/>
-          </a:fontRef>
-        </p:style>
-        <p:txBody>
-          <a:bodyPr rot="0" spcFirstLastPara="0" vertOverflow="overflow" horzOverflow="overflow" vert="horz" wrap="square" lIns="91440" tIns="45720" rIns="91440" bIns="45720" numCol="1" spcCol="0" rtlCol="0" fromWordArt="0" anchor="ctr" anchorCtr="0" forceAA="0" compatLnSpc="1">
-            <a:prstTxWarp prst="textNoShape">
-              <a:avLst/>
-            </a:prstTxWarp>
-            <a:noAutofit/>
-          </a:bodyPr>
-          <a:lstStyle/>
-          <a:p>
-            <a:pPr algn="ctr"/>
-            <a:r>
-              <a:rPr lang="zh-CN" altLang="en-US" dirty="0" smtClean="0">
-                <a:latin typeface="华文楷体"/>
-                <a:ea typeface="华文楷体"/>
-                <a:cs typeface="华文楷体"/>
-              </a:rPr>
-              <a:t>驻校创客项目</a:t>
-            </a:r>
-            <a:endParaRPr lang="en-US" altLang="zh-CN" dirty="0" smtClean="0">
-              <a:latin typeface="华文楷体"/>
-              <a:ea typeface="华文楷体"/>
-              <a:cs typeface="华文楷体"/>
-            </a:endParaRPr>
-          </a:p>
-        </p:txBody>
-      </p:sp>
-      <p:sp>
-        <p:nvSpPr>
-          <p:cNvPr id="20" name="Rounded Rectangle 19"/>
-          <p:cNvSpPr/>
-          <p:nvPr/>
-        </p:nvSpPr>
-        <p:spPr>
-          <a:xfrm>
-            <a:off x="6730281" y="2338730"/>
-            <a:ext cx="576526" cy="1811022"/>
-          </a:xfrm>
-          <a:prstGeom prst="roundRect">
-            <a:avLst/>
-          </a:prstGeom>
-          <a:solidFill>
-            <a:schemeClr val="accent2">
-              <a:lumMod val="75000"/>
-            </a:schemeClr>
-          </a:solidFill>
-          <a:ln>
-            <a:noFill/>
-          </a:ln>
-        </p:spPr>
-        <p:style>
-          <a:lnRef idx="2">
-            <a:schemeClr val="accent6">
-              <a:shade val="50000"/>
-            </a:schemeClr>
-          </a:lnRef>
-          <a:fillRef idx="1">
-            <a:schemeClr val="accent6"/>
-          </a:fillRef>
-          <a:effectRef idx="0">
-            <a:schemeClr val="accent6"/>
-          </a:effectRef>
-          <a:fontRef idx="minor">
-            <a:schemeClr val="lt1"/>
-          </a:fontRef>
-        </p:style>
-        <p:txBody>
-          <a:bodyPr rot="0" spcFirstLastPara="0" vertOverflow="overflow" horzOverflow="overflow" vert="horz" wrap="square" lIns="91440" tIns="45720" rIns="91440" bIns="45720" numCol="1" spcCol="0" rtlCol="0" fromWordArt="0" anchor="ctr" anchorCtr="0" forceAA="0" compatLnSpc="1">
-            <a:prstTxWarp prst="textNoShape">
-              <a:avLst/>
-            </a:prstTxWarp>
-            <a:noAutofit/>
-          </a:bodyPr>
-          <a:lstStyle/>
-          <a:p>
-            <a:pPr algn="ctr"/>
-            <a:r>
-              <a:rPr lang="zh-CN" altLang="en-US" dirty="0" smtClean="0">
-                <a:latin typeface="华文楷体"/>
-                <a:ea typeface="华文楷体"/>
-                <a:cs typeface="华文楷体"/>
-              </a:rPr>
-              <a:t>创客马拉松</a:t>
-            </a:r>
-            <a:endParaRPr lang="en-US" altLang="zh-CN" dirty="0" smtClean="0">
-              <a:latin typeface="华文楷体"/>
-              <a:ea typeface="华文楷体"/>
-              <a:cs typeface="华文楷体"/>
-            </a:endParaRPr>
-          </a:p>
-        </p:txBody>
-      </p:sp>
-      <p:sp>
-        <p:nvSpPr>
-          <p:cNvPr id="57" name="Right Arrow 56"/>
-          <p:cNvSpPr/>
-          <p:nvPr/>
-        </p:nvSpPr>
-        <p:spPr>
-          <a:xfrm rot="900000">
-            <a:off x="467253" y="3866061"/>
-            <a:ext cx="1281952" cy="680414"/>
-          </a:xfrm>
-          <a:prstGeom prst="rightArrow">
-            <a:avLst/>
-          </a:prstGeom>
-        </p:spPr>
-        <p:style>
-          <a:lnRef idx="2">
-            <a:schemeClr val="accent1"/>
-          </a:lnRef>
-          <a:fillRef idx="1">
-            <a:schemeClr val="lt1"/>
-          </a:fillRef>
-          <a:effectRef idx="0">
-            <a:schemeClr val="accent1"/>
-          </a:effectRef>
-          <a:fontRef idx="minor">
-            <a:schemeClr val="dk1"/>
-          </a:fontRef>
-        </p:style>
-        <p:txBody>
-          <a:bodyPr wrap="none" rtlCol="0" anchor="ctr"/>
-          <a:lstStyle/>
-          <a:p>
-            <a:pPr algn="ctr"/>
-            <a:r>
-              <a:rPr lang="zh-CN" altLang="en-US" dirty="0" smtClean="0">
-                <a:latin typeface="华文楷体"/>
-                <a:ea typeface="华文楷体"/>
-                <a:cs typeface="华文楷体"/>
-              </a:rPr>
-              <a:t>来校新生</a:t>
-            </a:r>
-            <a:endParaRPr lang="en-US" dirty="0">
-              <a:latin typeface="华文楷体"/>
-              <a:ea typeface="华文楷体"/>
-              <a:cs typeface="华文楷体"/>
-            </a:endParaRPr>
-          </a:p>
-        </p:txBody>
-      </p:sp>
-      <p:sp>
-        <p:nvSpPr>
-          <p:cNvPr id="58" name="Right Arrow 57"/>
-          <p:cNvSpPr/>
-          <p:nvPr/>
-        </p:nvSpPr>
-        <p:spPr>
-          <a:xfrm rot="1800000">
-            <a:off x="1689095" y="1712563"/>
-            <a:ext cx="1296000" cy="680414"/>
-          </a:xfrm>
-          <a:prstGeom prst="rightArrow">
-            <a:avLst/>
-          </a:prstGeom>
-        </p:spPr>
-        <p:style>
-          <a:lnRef idx="2">
-            <a:schemeClr val="accent1"/>
-          </a:lnRef>
-          <a:fillRef idx="1">
-            <a:schemeClr val="lt1"/>
-          </a:fillRef>
-          <a:effectRef idx="0">
-            <a:schemeClr val="accent1"/>
-          </a:effectRef>
-          <a:fontRef idx="minor">
-            <a:schemeClr val="dk1"/>
-          </a:fontRef>
-        </p:style>
-        <p:txBody>
-          <a:bodyPr rtlCol="0" anchor="ctr"/>
-          <a:lstStyle/>
-          <a:p>
-            <a:pPr algn="ctr"/>
-            <a:r>
-              <a:rPr lang="zh-CN" altLang="en-US" dirty="0" smtClean="0">
-                <a:latin typeface="华文楷体"/>
-                <a:ea typeface="华文楷体"/>
-                <a:cs typeface="华文楷体"/>
-              </a:rPr>
-              <a:t>驻校创客</a:t>
-            </a:r>
-            <a:endParaRPr lang="en-US" dirty="0">
-              <a:latin typeface="华文楷体"/>
-              <a:ea typeface="华文楷体"/>
-              <a:cs typeface="华文楷体"/>
-            </a:endParaRPr>
-          </a:p>
-        </p:txBody>
-      </p:sp>
-      <p:sp>
-        <p:nvSpPr>
-          <p:cNvPr id="59" name="Right Arrow 58"/>
-          <p:cNvSpPr/>
-          <p:nvPr/>
-        </p:nvSpPr>
-        <p:spPr>
-          <a:xfrm rot="20700000">
-            <a:off x="467252" y="4904387"/>
-            <a:ext cx="1281952" cy="680414"/>
-          </a:xfrm>
-          <a:prstGeom prst="rightArrow">
-            <a:avLst/>
-          </a:prstGeom>
-        </p:spPr>
-        <p:style>
-          <a:lnRef idx="2">
-            <a:schemeClr val="accent1"/>
-          </a:lnRef>
-          <a:fillRef idx="1">
-            <a:schemeClr val="lt1"/>
-          </a:fillRef>
-          <a:effectRef idx="0">
-            <a:schemeClr val="accent1"/>
-          </a:effectRef>
-          <a:fontRef idx="minor">
-            <a:schemeClr val="dk1"/>
-          </a:fontRef>
-        </p:style>
-        <p:txBody>
-          <a:bodyPr wrap="none" rtlCol="0" anchor="ctr"/>
-          <a:lstStyle/>
-          <a:p>
-            <a:pPr algn="ctr"/>
-            <a:r>
-              <a:rPr lang="zh-CN" altLang="en-US" dirty="0" smtClean="0">
-                <a:latin typeface="华文楷体"/>
-                <a:ea typeface="华文楷体"/>
-                <a:cs typeface="华文楷体"/>
-              </a:rPr>
-              <a:t>校外创客</a:t>
-            </a:r>
-            <a:endParaRPr lang="en-US" dirty="0">
-              <a:latin typeface="华文楷体"/>
-              <a:ea typeface="华文楷体"/>
-              <a:cs typeface="华文楷体"/>
-            </a:endParaRPr>
-          </a:p>
-        </p:txBody>
-      </p:sp>
-      <p:sp>
-        <p:nvSpPr>
-          <p:cNvPr id="60" name="Right Arrow 59"/>
-          <p:cNvSpPr/>
-          <p:nvPr/>
-        </p:nvSpPr>
-        <p:spPr>
-          <a:xfrm rot="900000">
-            <a:off x="1562397" y="2477717"/>
-            <a:ext cx="1296000" cy="680414"/>
-          </a:xfrm>
-          <a:prstGeom prst="rightArrow">
-            <a:avLst/>
-          </a:prstGeom>
-        </p:spPr>
-        <p:style>
-          <a:lnRef idx="2">
-            <a:schemeClr val="accent1"/>
-          </a:lnRef>
-          <a:fillRef idx="1">
-            <a:schemeClr val="lt1"/>
-          </a:fillRef>
-          <a:effectRef idx="0">
-            <a:schemeClr val="accent1"/>
-          </a:effectRef>
-          <a:fontRef idx="minor">
-            <a:schemeClr val="dk1"/>
-          </a:fontRef>
-        </p:style>
-        <p:txBody>
-          <a:bodyPr rtlCol="0" anchor="ctr"/>
-          <a:lstStyle/>
-          <a:p>
-            <a:pPr algn="ctr"/>
-            <a:r>
-              <a:rPr lang="zh-CN" altLang="en-US" dirty="0" smtClean="0">
-                <a:latin typeface="华文楷体"/>
-                <a:ea typeface="华文楷体"/>
-                <a:cs typeface="华文楷体"/>
-              </a:rPr>
-              <a:t>在校学生</a:t>
-            </a:r>
-            <a:endParaRPr lang="en-US" dirty="0">
-              <a:latin typeface="华文楷体"/>
-              <a:ea typeface="华文楷体"/>
-              <a:cs typeface="华文楷体"/>
-            </a:endParaRPr>
-          </a:p>
-        </p:txBody>
-      </p:sp>
-      <p:sp>
-        <p:nvSpPr>
-          <p:cNvPr id="61" name="TextBox 60"/>
-          <p:cNvSpPr txBox="1"/>
-          <p:nvPr/>
-        </p:nvSpPr>
-        <p:spPr>
-          <a:xfrm>
-            <a:off x="157742" y="2875760"/>
-            <a:ext cx="1509527" cy="646331"/>
-          </a:xfrm>
-          <a:prstGeom prst="rect">
-            <a:avLst/>
-          </a:prstGeom>
-          <a:noFill/>
-        </p:spPr>
-        <p:txBody>
-          <a:bodyPr wrap="square" rtlCol="0">
-            <a:spAutoFit/>
-          </a:bodyPr>
-          <a:lstStyle/>
-          <a:p>
-            <a:pPr lvl="0"/>
-            <a:r>
-              <a:rPr lang="zh-CN" altLang="en-US" dirty="0">
-                <a:latin typeface="华文楷体"/>
-                <a:ea typeface="华文楷体"/>
-                <a:cs typeface="华文楷体"/>
-              </a:rPr>
-              <a:t>内容的筛选、发布与传</a:t>
-            </a:r>
-            <a:r>
-              <a:rPr lang="zh-CN" altLang="en-US" dirty="0" smtClean="0">
-                <a:latin typeface="华文楷体"/>
-                <a:ea typeface="华文楷体"/>
-                <a:cs typeface="华文楷体"/>
-              </a:rPr>
-              <a:t>播</a:t>
-            </a:r>
-            <a:endParaRPr lang="en-US" dirty="0">
-              <a:latin typeface="华文楷体"/>
-              <a:ea typeface="华文楷体"/>
-              <a:cs typeface="华文楷体"/>
-            </a:endParaRPr>
-          </a:p>
-        </p:txBody>
-      </p:sp>
-      <p:sp>
-        <p:nvSpPr>
-          <p:cNvPr id="2" name="TextBox 1"/>
-          <p:cNvSpPr txBox="1"/>
-          <p:nvPr/>
-        </p:nvSpPr>
-        <p:spPr>
-          <a:xfrm>
-            <a:off x="2935159" y="1504235"/>
-            <a:ext cx="2339102" cy="966418"/>
-          </a:xfrm>
-          <a:prstGeom prst="rect">
-            <a:avLst/>
-          </a:prstGeom>
-          <a:noFill/>
-        </p:spPr>
-        <p:txBody>
-          <a:bodyPr wrap="none" rtlCol="0">
-            <a:spAutoFit/>
-          </a:bodyPr>
-          <a:lstStyle/>
-          <a:p>
-            <a:pPr algn="ctr">
-              <a:lnSpc>
-                <a:spcPct val="120000"/>
-              </a:lnSpc>
-            </a:pPr>
-            <a:r>
-              <a:rPr lang="zh-CN" altLang="en-US" sz="2400" dirty="0">
-                <a:solidFill>
-                  <a:srgbClr val="A60046"/>
-                </a:solidFill>
-                <a:latin typeface="华文楷体"/>
-                <a:ea typeface="华文楷体"/>
-                <a:cs typeface="华文楷体"/>
-              </a:rPr>
-              <a:t>分布式数据</a:t>
-            </a:r>
-            <a:endParaRPr lang="en-US" altLang="zh-CN" sz="2400" dirty="0">
-              <a:solidFill>
-                <a:srgbClr val="A60046"/>
-              </a:solidFill>
-              <a:latin typeface="华文楷体"/>
-              <a:ea typeface="华文楷体"/>
-              <a:cs typeface="华文楷体"/>
-            </a:endParaRPr>
-          </a:p>
-          <a:p>
-            <a:pPr algn="ctr">
-              <a:lnSpc>
-                <a:spcPct val="120000"/>
-              </a:lnSpc>
-            </a:pPr>
-            <a:r>
-              <a:rPr lang="zh-CN" altLang="en-US" sz="2400" dirty="0" smtClean="0">
-                <a:solidFill>
-                  <a:srgbClr val="A60046"/>
-                </a:solidFill>
-                <a:latin typeface="华文楷体"/>
-                <a:ea typeface="华文楷体"/>
-                <a:cs typeface="华文楷体"/>
-              </a:rPr>
-              <a:t>内容分发与管理</a:t>
-            </a:r>
-            <a:endParaRPr lang="en-US" sz="2400" dirty="0">
-              <a:solidFill>
-                <a:srgbClr val="A60046"/>
-              </a:solidFill>
-              <a:latin typeface="华文楷体"/>
-              <a:ea typeface="华文楷体"/>
-              <a:cs typeface="华文楷体"/>
-            </a:endParaRPr>
-          </a:p>
-        </p:txBody>
-      </p:sp>
-      <p:pic>
-        <p:nvPicPr>
-          <p:cNvPr id="25" name="Picture 24"/>
-          <p:cNvPicPr>
-            <a:picLocks noChangeAspect="1"/>
-          </p:cNvPicPr>
-          <p:nvPr/>
-        </p:nvPicPr>
-        <p:blipFill>
-          <a:blip r:embed="rId2" cstate="print">
-            <a:extLst>
-              <a:ext uri="{28A0092B-C50C-407E-A947-70E740481C1C}">
-                <a14:useLocalDpi xmlns:a14="http://schemas.microsoft.com/office/drawing/2010/main"/>
-              </a:ext>
-            </a:extLst>
-          </a:blip>
-          <a:stretch>
-            <a:fillRect/>
-          </a:stretch>
-        </p:blipFill>
-        <p:spPr>
-          <a:xfrm>
-            <a:off x="7509338" y="1236653"/>
-            <a:ext cx="945418" cy="945418"/>
-          </a:xfrm>
-          <a:prstGeom prst="rect">
-            <a:avLst/>
-          </a:prstGeom>
-        </p:spPr>
-      </p:pic>
-      <p:pic>
-        <p:nvPicPr>
-          <p:cNvPr id="27" name="Picture 26" descr="Screen Shot 2013-12-24 at 上午10.34.50.png"/>
-          <p:cNvPicPr>
-            <a:picLocks noChangeAspect="1"/>
-          </p:cNvPicPr>
-          <p:nvPr/>
-        </p:nvPicPr>
-        <p:blipFill>
-          <a:blip r:embed="rId3">
-            <a:extLst>
-              <a:ext uri="{28A0092B-C50C-407E-A947-70E740481C1C}">
-                <a14:useLocalDpi xmlns:a14="http://schemas.microsoft.com/office/drawing/2010/main" val="0"/>
-              </a:ext>
-            </a:extLst>
-          </a:blip>
-          <a:stretch>
-            <a:fillRect/>
-          </a:stretch>
-        </p:blipFill>
-        <p:spPr>
-          <a:xfrm>
-            <a:off x="6280630" y="5173676"/>
-            <a:ext cx="2178604" cy="1440000"/>
-          </a:xfrm>
-          <a:prstGeom prst="rect">
-            <a:avLst/>
-          </a:prstGeom>
-        </p:spPr>
-      </p:pic>
-      <p:pic>
-        <p:nvPicPr>
-          <p:cNvPr id="26" name="Picture 25" descr="Screen Shot 2013-12-24 at 上午10.29.44.png"/>
-          <p:cNvPicPr>
-            <a:picLocks noChangeAspect="1"/>
-          </p:cNvPicPr>
-          <p:nvPr/>
-        </p:nvPicPr>
-        <p:blipFill rotWithShape="1">
-          <a:blip r:embed="rId4">
-            <a:extLst>
-              <a:ext uri="{28A0092B-C50C-407E-A947-70E740481C1C}">
-                <a14:useLocalDpi xmlns:a14="http://schemas.microsoft.com/office/drawing/2010/main" val="0"/>
-              </a:ext>
-            </a:extLst>
-          </a:blip>
-          <a:srcRect r="22613" b="22613"/>
-          <a:stretch/>
-        </p:blipFill>
-        <p:spPr>
-          <a:xfrm>
-            <a:off x="2326712" y="5173675"/>
-            <a:ext cx="1718615" cy="1440000"/>
-          </a:xfrm>
-          <a:prstGeom prst="rect">
-            <a:avLst/>
-          </a:prstGeom>
-        </p:spPr>
-      </p:pic>
-    </p:spTree>
-    <p:extLst>
-      <p:ext uri="{BB962C8B-B14F-4D97-AF65-F5344CB8AC3E}">
-        <p14:creationId xmlns:p14="http://schemas.microsoft.com/office/powerpoint/2010/main" val="563923195"/>
-      </p:ext>
-    </p:extLst>
-  </p:cSld>
-  <p:clrMapOvr>
-    <a:masterClrMapping/>
-  </p:clrMapOvr>
-</p:sld>
-</file>
-
-<file path=ppt/slides/slide15.xml><?xml version="1.0" encoding="utf-8"?>
-<p:sld xmlns:a="http://schemas.openxmlformats.org/drawingml/2006/main" xmlns:r="http://schemas.openxmlformats.org/officeDocument/2006/relationships" xmlns:p="http://schemas.openxmlformats.org/presentationml/2006/main">
-  <p:cSld>
-    <p:spTree>
-      <p:nvGrpSpPr>
-        <p:cNvPr id="1" name=""/>
-        <p:cNvGrpSpPr/>
-        <p:nvPr/>
-      </p:nvGrpSpPr>
-      <p:grpSpPr>
-        <a:xfrm>
-          <a:off x="0" y="0"/>
-          <a:ext cx="0" cy="0"/>
-          <a:chOff x="0" y="0"/>
-          <a:chExt cx="0" cy="0"/>
-        </a:xfrm>
-      </p:grpSpPr>
-      <p:sp>
-        <p:nvSpPr>
-          <p:cNvPr id="2" name="Title 1"/>
-          <p:cNvSpPr>
-            <a:spLocks noGrp="1"/>
-          </p:cNvSpPr>
-          <p:nvPr>
-            <p:ph type="title"/>
-          </p:nvPr>
-        </p:nvSpPr>
-        <p:spPr/>
-        <p:txBody>
-          <a:bodyPr/>
-          <a:lstStyle/>
-          <a:p>
-            <a:r>
-              <a:rPr lang="zh-CN" altLang="en-US" dirty="0" smtClean="0"/>
-              <a:t>总结</a:t>
-            </a:r>
-            <a:endParaRPr lang="en-US" dirty="0"/>
-          </a:p>
-        </p:txBody>
-      </p:sp>
-      <p:graphicFrame>
-        <p:nvGraphicFramePr>
-          <p:cNvPr id="5" name="Content Placeholder 4"/>
-          <p:cNvGraphicFramePr>
-            <a:graphicFrameLocks noGrp="1"/>
-          </p:cNvGraphicFramePr>
-          <p:nvPr>
-            <p:ph idx="1"/>
-            <p:extLst>
-              <p:ext uri="{D42A27DB-BD31-4B8C-83A1-F6EECF244321}">
-                <p14:modId xmlns:p14="http://schemas.microsoft.com/office/powerpoint/2010/main" val="1978465561"/>
-              </p:ext>
-            </p:extLst>
-          </p:nvPr>
-        </p:nvGraphicFramePr>
-        <p:xfrm>
-          <a:off x="457200" y="1600200"/>
-          <a:ext cx="8229600" cy="4525963"/>
-        </p:xfrm>
-        <a:graphic>
-          <a:graphicData uri="http://schemas.openxmlformats.org/drawingml/2006/diagram">
-            <dgm:relIds xmlns:dgm="http://schemas.openxmlformats.org/drawingml/2006/diagram" xmlns:r="http://schemas.openxmlformats.org/officeDocument/2006/relationships" r:dm="rId2" r:lo="rId3" r:qs="rId4" r:cs="rId5"/>
-          </a:graphicData>
-        </a:graphic>
-      </p:graphicFrame>
-      <p:sp>
-        <p:nvSpPr>
-          <p:cNvPr id="4" name="Slide Number Placeholder 3"/>
-          <p:cNvSpPr>
-            <a:spLocks noGrp="1"/>
-          </p:cNvSpPr>
-          <p:nvPr>
-            <p:ph type="sldNum" sz="quarter" idx="12"/>
-          </p:nvPr>
-        </p:nvSpPr>
-        <p:spPr/>
-        <p:txBody>
-          <a:bodyPr/>
-          <a:lstStyle/>
-          <a:p>
-            <a:fld id="{B6A3D480-A58D-4747-9D04-FF1A8C99FAB7}" type="slidenum">
-              <a:rPr lang="en-US" smtClean="0"/>
-              <a:pPr/>
-              <a:t>15</a:t>
-            </a:fld>
-            <a:endParaRPr lang="en-US"/>
-          </a:p>
-        </p:txBody>
-      </p:sp>
-    </p:spTree>
-    <p:extLst>
-      <p:ext uri="{BB962C8B-B14F-4D97-AF65-F5344CB8AC3E}">
-        <p14:creationId xmlns:p14="http://schemas.microsoft.com/office/powerpoint/2010/main" val="1132415324"/>
-      </p:ext>
-    </p:extLst>
-  </p:cSld>
-  <p:clrMapOvr>
-    <a:masterClrMapping/>
-  </p:clrMapOvr>
-</p:sld>
-</file>
-
-<file path=ppt/slides/slide16.xml><?xml version="1.0" encoding="utf-8"?>
 <p:sld xmlns:a="http://schemas.openxmlformats.org/drawingml/2006/main" xmlns:r="http://schemas.openxmlformats.org/officeDocument/2006/relationships" xmlns:p="http://schemas.openxmlformats.org/presentationml/2006/main">
   <p:cSld>
     <p:bg>
@@ -19978,6 +18504,108 @@
 </p:sld>
 </file>
 
+<file path=ppt/slides/slide15.xml><?xml version="1.0" encoding="utf-8"?>
+<p:sld xmlns:a="http://schemas.openxmlformats.org/drawingml/2006/main" xmlns:r="http://schemas.openxmlformats.org/officeDocument/2006/relationships" xmlns:p="http://schemas.openxmlformats.org/presentationml/2006/main">
+  <p:cSld>
+    <p:spTree>
+      <p:nvGrpSpPr>
+        <p:cNvPr id="1" name=""/>
+        <p:cNvGrpSpPr/>
+        <p:nvPr/>
+      </p:nvGrpSpPr>
+      <p:grpSpPr>
+        <a:xfrm>
+          <a:off x="0" y="0"/>
+          <a:ext cx="0" cy="0"/>
+          <a:chOff x="0" y="0"/>
+          <a:chExt cx="0" cy="0"/>
+        </a:xfrm>
+      </p:grpSpPr>
+      <p:sp>
+        <p:nvSpPr>
+          <p:cNvPr id="2" name="Title 1"/>
+          <p:cNvSpPr>
+            <a:spLocks noGrp="1"/>
+          </p:cNvSpPr>
+          <p:nvPr>
+            <p:ph type="title"/>
+          </p:nvPr>
+        </p:nvSpPr>
+        <p:spPr/>
+        <p:txBody>
+          <a:bodyPr/>
+          <a:lstStyle/>
+          <a:p>
+            <a:r>
+              <a:rPr lang="zh-CN" altLang="en-US" dirty="0" smtClean="0"/>
+              <a:t>总结</a:t>
+            </a:r>
+            <a:endParaRPr lang="en-US" dirty="0"/>
+          </a:p>
+        </p:txBody>
+      </p:sp>
+      <p:graphicFrame>
+        <p:nvGraphicFramePr>
+          <p:cNvPr id="5" name="Content Placeholder 4"/>
+          <p:cNvGraphicFramePr>
+            <a:graphicFrameLocks noGrp="1"/>
+          </p:cNvGraphicFramePr>
+          <p:nvPr>
+            <p:ph idx="1"/>
+            <p:extLst>
+              <p:ext uri="{D42A27DB-BD31-4B8C-83A1-F6EECF244321}">
+                <p14:modId xmlns:p14="http://schemas.microsoft.com/office/powerpoint/2010/main" val="2210777805"/>
+              </p:ext>
+            </p:extLst>
+          </p:nvPr>
+        </p:nvGraphicFramePr>
+        <p:xfrm>
+          <a:off x="457200" y="1600200"/>
+          <a:ext cx="8229600" cy="4525963"/>
+        </p:xfrm>
+        <a:graphic>
+          <a:graphicData uri="http://schemas.openxmlformats.org/drawingml/2006/diagram">
+            <dgm:relIds xmlns:dgm="http://schemas.openxmlformats.org/drawingml/2006/diagram" xmlns:r="http://schemas.openxmlformats.org/officeDocument/2006/relationships" r:dm="rId2" r:lo="rId3" r:qs="rId4" r:cs="rId5"/>
+          </a:graphicData>
+        </a:graphic>
+      </p:graphicFrame>
+      <p:sp>
+        <p:nvSpPr>
+          <p:cNvPr id="4" name="Slide Number Placeholder 3"/>
+          <p:cNvSpPr>
+            <a:spLocks noGrp="1"/>
+          </p:cNvSpPr>
+          <p:nvPr>
+            <p:ph type="sldNum" sz="quarter" idx="12"/>
+          </p:nvPr>
+        </p:nvSpPr>
+        <p:spPr/>
+        <p:txBody>
+          <a:bodyPr/>
+          <a:lstStyle/>
+          <a:p>
+            <a:fld id="{B6A3D480-A58D-4747-9D04-FF1A8C99FAB7}" type="slidenum">
+              <a:rPr lang="en-US" smtClean="0"/>
+              <a:pPr/>
+              <a:t>15</a:t>
+            </a:fld>
+            <a:endParaRPr lang="en-US"/>
+          </a:p>
+        </p:txBody>
+      </p:sp>
+    </p:spTree>
+    <p:extLst>
+      <p:ext uri="{BB962C8B-B14F-4D97-AF65-F5344CB8AC3E}">
+        <p14:creationId xmlns:p14="http://schemas.microsoft.com/office/powerpoint/2010/main" val="1132415324"/>
+      </p:ext>
+    </p:extLst>
+  </p:cSld>
+  <p:clrMapOvr>
+    <a:masterClrMapping/>
+  </p:clrMapOvr>
+</p:sld>
+</file>
+
 <file path=ppt/slides/slide2.xml><?xml version="1.0" encoding="utf-8"?>
 <p:sld xmlns:a="http://schemas.openxmlformats.org/drawingml/2006/main" xmlns:r="http://schemas.openxmlformats.org/officeDocument/2006/relationships" xmlns:p="http://schemas.openxmlformats.org/presentationml/2006/main">
   <p:cSld>
@@ -20062,6 +18690,66 @@
               <a:t>2</a:t>
             </a:fld>
             <a:endParaRPr lang="en-US"/>
+          </a:p>
+        </p:txBody>
+      </p:sp>
+      <p:sp>
+        <p:nvSpPr>
+          <p:cNvPr id="5" name="TextBox 4"/>
+          <p:cNvSpPr txBox="1"/>
+          <p:nvPr/>
+        </p:nvSpPr>
+        <p:spPr>
+          <a:xfrm>
+            <a:off x="1689653" y="3316298"/>
+            <a:ext cx="2062997" cy="923330"/>
+          </a:xfrm>
+          <a:prstGeom prst="rect">
+            <a:avLst/>
+          </a:prstGeom>
+          <a:noFill/>
+        </p:spPr>
+        <p:txBody>
+          <a:bodyPr wrap="none" rtlCol="0">
+            <a:spAutoFit/>
+          </a:bodyPr>
+          <a:lstStyle/>
+          <a:p>
+            <a:r>
+              <a:rPr lang="en-US" altLang="zh-CN" sz="5400" dirty="0" smtClean="0"/>
+              <a:t>MOOC</a:t>
+            </a:r>
+            <a:endParaRPr lang="en-US" dirty="0"/>
+          </a:p>
+        </p:txBody>
+      </p:sp>
+      <p:sp>
+        <p:nvSpPr>
+          <p:cNvPr id="6" name="TextBox 5"/>
+          <p:cNvSpPr txBox="1"/>
+          <p:nvPr/>
+        </p:nvSpPr>
+        <p:spPr>
+          <a:xfrm>
+            <a:off x="1689653" y="4239628"/>
+            <a:ext cx="2053417" cy="1200329"/>
+          </a:xfrm>
+          <a:prstGeom prst="rect">
+            <a:avLst/>
+          </a:prstGeom>
+          <a:noFill/>
+        </p:spPr>
+        <p:txBody>
+          <a:bodyPr wrap="none" rtlCol="0">
+            <a:spAutoFit/>
+          </a:bodyPr>
+          <a:lstStyle/>
+          <a:p>
+            <a:r>
+              <a:rPr lang="en-US" altLang="zh-CN" sz="7200" dirty="0" err="1" smtClean="0"/>
+              <a:t>TEDx</a:t>
+            </a:r>
+            <a:endParaRPr lang="en-US" sz="7200" dirty="0"/>
           </a:p>
         </p:txBody>
       </p:sp>
@@ -20438,8 +19126,8 @@
         </p:nvSpPr>
         <p:spPr>
           <a:xfrm>
-            <a:off x="4482125" y="1417638"/>
-            <a:ext cx="4436994" cy="1200328"/>
+            <a:off x="4533611" y="1743540"/>
+            <a:ext cx="4436994" cy="461665"/>
           </a:xfrm>
           <a:prstGeom prst="rect">
             <a:avLst/>
@@ -20633,7 +19321,33 @@
                   </a:outerShdw>
                 </a:effectLst>
               </a:rPr>
-              <a:t>学分，前三天草船借箭，最后一天攻下赤壁</a:t>
+              <a:t>学分</a:t>
+            </a:r>
+            <a:r>
+              <a:rPr lang="zh-CN" altLang="en-US" sz="2400" b="1" dirty="0" smtClean="0">
+                <a:ln w="12700">
+                  <a:solidFill>
+                    <a:schemeClr val="tx2">
+                      <a:satMod val="155000"/>
+                    </a:schemeClr>
+                  </a:solidFill>
+                  <a:prstDash val="solid"/>
+                </a:ln>
+                <a:solidFill>
+                  <a:schemeClr val="bg2">
+                    <a:tint val="85000"/>
+                    <a:satMod val="155000"/>
+                  </a:schemeClr>
+                </a:solidFill>
+                <a:effectLst>
+                  <a:outerShdw blurRad="41275" dist="20320" dir="1800000" algn="tl" rotWithShape="0">
+                    <a:srgbClr val="000000">
+                      <a:alpha val="40000"/>
+                    </a:srgbClr>
+                  </a:outerShdw>
+                </a:effectLst>
+              </a:rPr>
+              <a:t>，</a:t>
             </a:r>
             <a:endParaRPr lang="en-US" altLang="zh-CN" sz="2400" b="1" dirty="0" smtClean="0">
               <a:ln w="12700">
@@ -20693,8 +19407,8 @@
         </p:nvCxnSpPr>
         <p:spPr>
           <a:xfrm flipH="1">
-            <a:off x="6649967" y="2617966"/>
-            <a:ext cx="50655" cy="402386"/>
+            <a:off x="6462191" y="2205205"/>
+            <a:ext cx="289917" cy="707646"/>
           </a:xfrm>
           <a:prstGeom prst="line">
             <a:avLst/>
@@ -20931,6 +19645,36 @@
           </a:p>
         </p:txBody>
       </p:sp>
+      <p:pic>
+        <p:nvPicPr>
+          <p:cNvPr id="14" name="Picture 13" descr="XPLSTRUC002B2.4.png"/>
+          <p:cNvPicPr>
+            <a:picLocks noChangeAspect="1"/>
+          </p:cNvPicPr>
+          <p:nvPr/>
+        </p:nvPicPr>
+        <p:blipFill>
+          <a:blip r:embed="rId12">
+            <a:extLst>
+              <a:ext uri="{28A0092B-C50C-407E-A947-70E740481C1C}">
+                <a14:useLocalDpi xmlns:a14="http://schemas.microsoft.com/office/drawing/2010/main" val="0"/>
+              </a:ext>
+            </a:extLst>
+          </a:blip>
+          <a:stretch>
+            <a:fillRect/>
+          </a:stretch>
+        </p:blipFill>
+        <p:spPr>
+          <a:xfrm>
+            <a:off x="5268661" y="3503824"/>
+            <a:ext cx="3754881" cy="2533197"/>
+          </a:xfrm>
+          <a:prstGeom prst="rect">
+            <a:avLst/>
+          </a:prstGeom>
+        </p:spPr>
+      </p:pic>
     </p:spTree>
     <p:extLst>
       <p:ext uri="{BB962C8B-B14F-4D97-AF65-F5344CB8AC3E}">
@@ -22799,14 +21543,14 @@
           <p:nvPr>
             <p:extLst>
               <p:ext uri="{D42A27DB-BD31-4B8C-83A1-F6EECF244321}">
-                <p14:modId xmlns:p14="http://schemas.microsoft.com/office/powerpoint/2010/main" val="3818433487"/>
+                <p14:modId xmlns:p14="http://schemas.microsoft.com/office/powerpoint/2010/main" val="937083390"/>
               </p:ext>
             </p:extLst>
           </p:nvPr>
         </p:nvGraphicFramePr>
         <p:xfrm>
-          <a:off x="74164" y="2262049"/>
-          <a:ext cx="3902799" cy="3597033"/>
+          <a:off x="130359" y="1605519"/>
+          <a:ext cx="3657049" cy="3399475"/>
         </p:xfrm>
         <a:graphic>
           <a:graphicData uri="http://schemas.openxmlformats.org/drawingml/2006/chart">
@@ -22826,34 +21570,34 @@
         </p:nvSpPr>
         <p:spPr>
           <a:xfrm>
-            <a:off x="2215603" y="1529663"/>
-            <a:ext cx="5961329" cy="519161"/>
+            <a:off x="1406424" y="5039412"/>
+            <a:ext cx="6325728" cy="1041969"/>
           </a:xfrm>
         </p:spPr>
         <p:txBody>
           <a:bodyPr>
-            <a:normAutofit fontScale="47500" lnSpcReduction="20000"/>
+            <a:noAutofit/>
           </a:bodyPr>
           <a:lstStyle/>
           <a:p>
             <a:r>
-              <a:rPr lang="zh-CN" altLang="en-US" dirty="0" smtClean="0"/>
+              <a:rPr lang="zh-CN" altLang="en-US" sz="2800" dirty="0" smtClean="0"/>
               <a:t>清华驻校创客项目已启动</a:t>
             </a:r>
-            <a:endParaRPr lang="en-US" altLang="zh-CN" dirty="0" smtClean="0"/>
-          </a:p>
-          <a:p>
-            <a:r>
-              <a:rPr lang="zh-CN" altLang="en-US" dirty="0" smtClean="0"/>
+            <a:endParaRPr lang="en-US" altLang="zh-CN" sz="2800" dirty="0" smtClean="0"/>
+          </a:p>
+          <a:p>
+            <a:r>
+              <a:rPr lang="zh-CN" altLang="en-US" sz="2800" dirty="0" smtClean="0"/>
               <a:t>让清华成为全球最大的创客空间</a:t>
             </a:r>
-            <a:endParaRPr lang="en-US" altLang="zh-CN" dirty="0" smtClean="0"/>
+            <a:endParaRPr lang="en-US" altLang="zh-CN" sz="2800" dirty="0" smtClean="0"/>
           </a:p>
           <a:p>
             <a:pPr marL="0" indent="0">
               <a:buNone/>
             </a:pPr>
-            <a:endParaRPr lang="en-US" dirty="0"/>
+            <a:endParaRPr lang="en-US" sz="2400" dirty="0"/>
           </a:p>
         </p:txBody>
       </p:sp>
@@ -22873,8 +21617,8 @@
         </p:blipFill>
         <p:spPr>
           <a:xfrm>
-            <a:off x="6899203" y="2624633"/>
-            <a:ext cx="2042967" cy="3050520"/>
+            <a:off x="3888556" y="1605519"/>
+            <a:ext cx="2299716" cy="3433893"/>
           </a:xfrm>
           <a:prstGeom prst="rect">
             <a:avLst/>
@@ -22903,8 +21647,8 @@
         </p:blipFill>
         <p:spPr>
           <a:xfrm>
-            <a:off x="3976963" y="2178613"/>
-            <a:ext cx="2720306" cy="3845495"/>
+            <a:off x="6338204" y="1639937"/>
+            <a:ext cx="2404791" cy="3399475"/>
           </a:xfrm>
           <a:prstGeom prst="rect">
             <a:avLst/>

</xml_diff>

<commit_message>
Modified ActivityList for 12/25 progress
</commit_message>
<xml_diff>
--- a/课程方案/XLP_WorkFLow_CHN.pptx
+++ b/课程方案/XLP_WorkFLow_CHN.pptx
@@ -5266,7 +5266,31 @@
         <a:p>
           <a:r>
             <a:rPr lang="zh-CN" altLang="en-US" sz="2000" dirty="0" smtClean="0"/>
-            <a:t>提供一套可赶上摩尔定律的课程系列</a:t>
+            <a:t>提供一套</a:t>
+          </a:r>
+          <a:r>
+            <a:rPr lang="zh-CN" altLang="en-US" sz="2000" dirty="0" smtClean="0"/>
+            <a:t>符合“</a:t>
+          </a:r>
+          <a:r>
+            <a:rPr lang="zh-CN" altLang="en-US" sz="2000" smtClean="0"/>
+            <a:t>摩尔</a:t>
+          </a:r>
+          <a:r>
+            <a:rPr lang="zh-CN" altLang="en-US" sz="2000" smtClean="0"/>
+            <a:t>速率”的跨学科</a:t>
+          </a:r>
+          <a:r>
+            <a:rPr lang="zh-CN" altLang="en-US" sz="2000" smtClean="0"/>
+            <a:t>课</a:t>
+          </a:r>
+          <a:r>
+            <a:rPr lang="zh-CN" altLang="en-US" sz="2000" dirty="0" smtClean="0"/>
+            <a:t>程</a:t>
+          </a:r>
+          <a:r>
+            <a:rPr lang="zh-CN" altLang="en-US" sz="2000" dirty="0" smtClean="0"/>
+            <a:t>群</a:t>
           </a:r>
           <a:endParaRPr lang="en-US" sz="2000" dirty="0"/>
         </a:p>
@@ -7865,7 +7889,31 @@
           </a:pPr>
           <a:r>
             <a:rPr lang="zh-CN" altLang="en-US" sz="2000" kern="1200" dirty="0" smtClean="0"/>
-            <a:t>提供一套可赶上摩尔定律的课程系列</a:t>
+            <a:t>提供一套</a:t>
+          </a:r>
+          <a:r>
+            <a:rPr lang="zh-CN" altLang="en-US" sz="2000" kern="1200" dirty="0" smtClean="0"/>
+            <a:t>符合“</a:t>
+          </a:r>
+          <a:r>
+            <a:rPr lang="zh-CN" altLang="en-US" sz="2000" kern="1200" smtClean="0"/>
+            <a:t>摩尔</a:t>
+          </a:r>
+          <a:r>
+            <a:rPr lang="zh-CN" altLang="en-US" sz="2000" kern="1200" smtClean="0"/>
+            <a:t>速率”的跨学科</a:t>
+          </a:r>
+          <a:r>
+            <a:rPr lang="zh-CN" altLang="en-US" sz="2000" kern="1200" smtClean="0"/>
+            <a:t>课</a:t>
+          </a:r>
+          <a:r>
+            <a:rPr lang="zh-CN" altLang="en-US" sz="2000" kern="1200" dirty="0" smtClean="0"/>
+            <a:t>程</a:t>
+          </a:r>
+          <a:r>
+            <a:rPr lang="zh-CN" altLang="en-US" sz="2000" kern="1200" dirty="0" smtClean="0"/>
+            <a:t>群</a:t>
           </a:r>
           <a:endParaRPr lang="en-US" sz="2000" kern="1200" dirty="0"/>
         </a:p>
@@ -18534,7 +18582,7 @@
             <p:ph idx="1"/>
             <p:extLst>
               <p:ext uri="{D42A27DB-BD31-4B8C-83A1-F6EECF244321}">
-                <p14:modId xmlns:p14="http://schemas.microsoft.com/office/powerpoint/2010/main" val="2210777805"/>
+                <p14:modId xmlns:p14="http://schemas.microsoft.com/office/powerpoint/2010/main" val="2438472670"/>
               </p:ext>
             </p:extLst>
           </p:nvPr>

</xml_diff>